<commit_message>
update Data1001 for 2021 sem1
</commit_message>
<xml_diff>
--- a/VM_instructions.pptx
+++ b/VM_instructions.pptx
@@ -294,7 +294,7 @@
           <a:p>
             <a:fld id="{A97D098C-81A2-4741-849D-B3F04101F1CD}" type="datetimeFigureOut">
               <a:rPr lang="en-AU" smtClean="0"/>
-              <a:t>28/01/2021</a:t>
+              <a:t>24/02/2021</a:t>
             </a:fld>
             <a:endParaRPr lang="en-AU"/>
           </a:p>
@@ -609,7 +609,7 @@
           <a:p>
             <a:fld id="{A97D098C-81A2-4741-849D-B3F04101F1CD}" type="datetimeFigureOut">
               <a:rPr lang="en-AU" smtClean="0"/>
-              <a:t>28/01/2021</a:t>
+              <a:t>24/02/2021</a:t>
             </a:fld>
             <a:endParaRPr lang="en-AU"/>
           </a:p>
@@ -831,7 +831,7 @@
           <a:p>
             <a:fld id="{A97D098C-81A2-4741-849D-B3F04101F1CD}" type="datetimeFigureOut">
               <a:rPr lang="en-AU" smtClean="0"/>
-              <a:t>28/01/2021</a:t>
+              <a:t>24/02/2021</a:t>
             </a:fld>
             <a:endParaRPr lang="en-AU"/>
           </a:p>
@@ -1122,7 +1122,7 @@
           <a:p>
             <a:fld id="{A97D098C-81A2-4741-849D-B3F04101F1CD}" type="datetimeFigureOut">
               <a:rPr lang="en-AU" smtClean="0"/>
-              <a:t>28/01/2021</a:t>
+              <a:t>24/02/2021</a:t>
             </a:fld>
             <a:endParaRPr lang="en-AU"/>
           </a:p>
@@ -1576,7 +1576,7 @@
           <a:p>
             <a:fld id="{A97D098C-81A2-4741-849D-B3F04101F1CD}" type="datetimeFigureOut">
               <a:rPr lang="en-AU" smtClean="0"/>
-              <a:t>28/01/2021</a:t>
+              <a:t>24/02/2021</a:t>
             </a:fld>
             <a:endParaRPr lang="en-AU"/>
           </a:p>
@@ -2152,7 +2152,7 @@
           <a:p>
             <a:fld id="{A97D098C-81A2-4741-849D-B3F04101F1CD}" type="datetimeFigureOut">
               <a:rPr lang="en-AU" smtClean="0"/>
-              <a:t>28/01/2021</a:t>
+              <a:t>24/02/2021</a:t>
             </a:fld>
             <a:endParaRPr lang="en-AU"/>
           </a:p>
@@ -3013,7 +3013,7 @@
           <a:p>
             <a:fld id="{A97D098C-81A2-4741-849D-B3F04101F1CD}" type="datetimeFigureOut">
               <a:rPr lang="en-AU" smtClean="0"/>
-              <a:t>28/01/2021</a:t>
+              <a:t>24/02/2021</a:t>
             </a:fld>
             <a:endParaRPr lang="en-AU"/>
           </a:p>
@@ -3218,7 +3218,7 @@
           <a:p>
             <a:fld id="{A97D098C-81A2-4741-849D-B3F04101F1CD}" type="datetimeFigureOut">
               <a:rPr lang="en-AU" smtClean="0"/>
-              <a:t>28/01/2021</a:t>
+              <a:t>24/02/2021</a:t>
             </a:fld>
             <a:endParaRPr lang="en-AU"/>
           </a:p>
@@ -3432,7 +3432,7 @@
           <a:p>
             <a:fld id="{A97D098C-81A2-4741-849D-B3F04101F1CD}" type="datetimeFigureOut">
               <a:rPr lang="en-AU" smtClean="0"/>
-              <a:t>28/01/2021</a:t>
+              <a:t>24/02/2021</a:t>
             </a:fld>
             <a:endParaRPr lang="en-AU"/>
           </a:p>
@@ -3637,7 +3637,7 @@
           <a:p>
             <a:fld id="{A97D098C-81A2-4741-849D-B3F04101F1CD}" type="datetimeFigureOut">
               <a:rPr lang="en-AU" smtClean="0"/>
-              <a:t>28/01/2021</a:t>
+              <a:t>24/02/2021</a:t>
             </a:fld>
             <a:endParaRPr lang="en-AU"/>
           </a:p>
@@ -3917,7 +3917,7 @@
           <a:p>
             <a:fld id="{A97D098C-81A2-4741-849D-B3F04101F1CD}" type="datetimeFigureOut">
               <a:rPr lang="en-AU" smtClean="0"/>
-              <a:t>28/01/2021</a:t>
+              <a:t>24/02/2021</a:t>
             </a:fld>
             <a:endParaRPr lang="en-AU"/>
           </a:p>
@@ -4184,7 +4184,7 @@
           <a:p>
             <a:fld id="{A97D098C-81A2-4741-849D-B3F04101F1CD}" type="datetimeFigureOut">
               <a:rPr lang="en-AU" smtClean="0"/>
-              <a:t>28/01/2021</a:t>
+              <a:t>24/02/2021</a:t>
             </a:fld>
             <a:endParaRPr lang="en-AU"/>
           </a:p>
@@ -4599,7 +4599,7 @@
           <a:p>
             <a:fld id="{A97D098C-81A2-4741-849D-B3F04101F1CD}" type="datetimeFigureOut">
               <a:rPr lang="en-AU" smtClean="0"/>
-              <a:t>28/01/2021</a:t>
+              <a:t>24/02/2021</a:t>
             </a:fld>
             <a:endParaRPr lang="en-AU"/>
           </a:p>
@@ -4747,7 +4747,7 @@
           <a:p>
             <a:fld id="{A97D098C-81A2-4741-849D-B3F04101F1CD}" type="datetimeFigureOut">
               <a:rPr lang="en-AU" smtClean="0"/>
-              <a:t>28/01/2021</a:t>
+              <a:t>24/02/2021</a:t>
             </a:fld>
             <a:endParaRPr lang="en-AU"/>
           </a:p>
@@ -4872,7 +4872,7 @@
           <a:p>
             <a:fld id="{A97D098C-81A2-4741-849D-B3F04101F1CD}" type="datetimeFigureOut">
               <a:rPr lang="en-AU" smtClean="0"/>
-              <a:t>28/01/2021</a:t>
+              <a:t>24/02/2021</a:t>
             </a:fld>
             <a:endParaRPr lang="en-AU"/>
           </a:p>
@@ -5151,7 +5151,7 @@
           <a:p>
             <a:fld id="{A97D098C-81A2-4741-849D-B3F04101F1CD}" type="datetimeFigureOut">
               <a:rPr lang="en-AU" smtClean="0"/>
-              <a:t>28/01/2021</a:t>
+              <a:t>24/02/2021</a:t>
             </a:fld>
             <a:endParaRPr lang="en-AU"/>
           </a:p>
@@ -5466,7 +5466,7 @@
           <a:p>
             <a:fld id="{A97D098C-81A2-4741-849D-B3F04101F1CD}" type="datetimeFigureOut">
               <a:rPr lang="en-AU" smtClean="0"/>
-              <a:t>28/01/2021</a:t>
+              <a:t>24/02/2021</a:t>
             </a:fld>
             <a:endParaRPr lang="en-AU"/>
           </a:p>
@@ -5719,7 +5719,7 @@
           <a:p>
             <a:fld id="{A97D098C-81A2-4741-849D-B3F04101F1CD}" type="datetimeFigureOut">
               <a:rPr lang="en-AU" smtClean="0"/>
-              <a:t>28/01/2021</a:t>
+              <a:t>24/02/2021</a:t>
             </a:fld>
             <a:endParaRPr lang="en-AU"/>
           </a:p>
@@ -6289,7 +6289,7 @@
               <a:rPr lang="en-AU" dirty="0" smtClean="0">
                 <a:latin typeface="Lucida Sans Typewriter" panose="020B0509030504030204" pitchFamily="49" charset="0"/>
               </a:rPr>
-              <a:t>StaT1400</a:t>
+              <a:t>Data1001</a:t>
             </a:r>
             <a:endParaRPr lang="en-AU" dirty="0">
               <a:latin typeface="Lucida Sans Typewriter" panose="020B0509030504030204" pitchFamily="49" charset="0"/>
@@ -7114,14 +7114,63 @@
                 <a:latin typeface="Lucida Sans Typewriter" panose="020B0509030504030204" pitchFamily="49" charset="0"/>
                 <a:cs typeface="Arial" panose="020B0604020202020204" pitchFamily="34" charset="0"/>
               </a:rPr>
-              <a:t>cd </a:t>
-            </a:r>
+              <a:t>cd Data1001</a:t>
+            </a:r>
+          </a:p>
+          <a:p>
+            <a:pPr marL="742950" lvl="1" indent="-285750">
+              <a:buFont typeface="Wingdings" panose="05000000000000000000" pitchFamily="2" charset="2"/>
+              <a:buChar char="Ø"/>
+            </a:pPr>
             <a:r>
               <a:rPr lang="en-AU" dirty="0" smtClean="0">
                 <a:latin typeface="Lucida Sans Typewriter" panose="020B0509030504030204" pitchFamily="49" charset="0"/>
                 <a:cs typeface="Arial" panose="020B0604020202020204" pitchFamily="34" charset="0"/>
               </a:rPr>
-              <a:t>Data1001</a:t>
+              <a:t>vagrant up</a:t>
+            </a:r>
+          </a:p>
+          <a:p>
+            <a:r>
+              <a:rPr lang="en-AU" dirty="0" smtClean="0">
+                <a:latin typeface="Arial" panose="020B0604020202020204" pitchFamily="34" charset="0"/>
+                <a:cs typeface="Arial" panose="020B0604020202020204" pitchFamily="34" charset="0"/>
+              </a:rPr>
+              <a:t>Step 4  - use </a:t>
+            </a:r>
+            <a:r>
+              <a:rPr lang="en-AU" dirty="0" err="1" smtClean="0">
+                <a:latin typeface="Arial" panose="020B0604020202020204" pitchFamily="34" charset="0"/>
+                <a:cs typeface="Arial" panose="020B0604020202020204" pitchFamily="34" charset="0"/>
+              </a:rPr>
+              <a:t>ssh</a:t>
+            </a:r>
+            <a:r>
+              <a:rPr lang="en-AU" dirty="0" smtClean="0">
+                <a:latin typeface="Arial" panose="020B0604020202020204" pitchFamily="34" charset="0"/>
+                <a:cs typeface="Arial" panose="020B0604020202020204" pitchFamily="34" charset="0"/>
+              </a:rPr>
+              <a:t> to login to the virtual machine (VM)</a:t>
+            </a:r>
+          </a:p>
+          <a:p>
+            <a:pPr marL="742950" lvl="1" indent="-285750">
+              <a:buFont typeface="Wingdings" panose="05000000000000000000" pitchFamily="2" charset="2"/>
+              <a:buChar char="Ø"/>
+            </a:pPr>
+            <a:r>
+              <a:rPr lang="en-AU" dirty="0" smtClean="0">
+                <a:latin typeface="Lucida Sans Typewriter" panose="020B0509030504030204" pitchFamily="49" charset="0"/>
+                <a:cs typeface="Arial" panose="020B0604020202020204" pitchFamily="34" charset="0"/>
+              </a:rPr>
+              <a:t>vagrant </a:t>
+            </a:r>
+            <a:r>
+              <a:rPr lang="en-AU" dirty="0" err="1" smtClean="0">
+                <a:latin typeface="Lucida Sans Typewriter" panose="020B0509030504030204" pitchFamily="49" charset="0"/>
+                <a:cs typeface="Arial" panose="020B0604020202020204" pitchFamily="34" charset="0"/>
+              </a:rPr>
+              <a:t>ssh</a:t>
             </a:r>
             <a:endParaRPr lang="en-AU" dirty="0" smtClean="0">
               <a:latin typeface="Lucida Sans Typewriter" panose="020B0509030504030204" pitchFamily="49" charset="0"/>
@@ -7129,6 +7178,54 @@
             </a:endParaRPr>
           </a:p>
           <a:p>
+            <a:r>
+              <a:rPr lang="en-AU" dirty="0" smtClean="0">
+                <a:latin typeface="Arial" panose="020B0604020202020204" pitchFamily="34" charset="0"/>
+                <a:cs typeface="Arial" panose="020B0604020202020204" pitchFamily="34" charset="0"/>
+              </a:rPr>
+              <a:t>Step </a:t>
+            </a:r>
+            <a:r>
+              <a:rPr lang="en-AU" dirty="0">
+                <a:latin typeface="Arial" panose="020B0604020202020204" pitchFamily="34" charset="0"/>
+                <a:cs typeface="Arial" panose="020B0604020202020204" pitchFamily="34" charset="0"/>
+              </a:rPr>
+              <a:t>5</a:t>
+            </a:r>
+            <a:r>
+              <a:rPr lang="en-AU" dirty="0" smtClean="0">
+                <a:latin typeface="Arial" panose="020B0604020202020204" pitchFamily="34" charset="0"/>
+                <a:cs typeface="Arial" panose="020B0604020202020204" pitchFamily="34" charset="0"/>
+              </a:rPr>
+              <a:t> - start the </a:t>
+            </a:r>
+            <a:r>
+              <a:rPr lang="en-AU" dirty="0" err="1" smtClean="0">
+                <a:latin typeface="Arial" panose="020B0604020202020204" pitchFamily="34" charset="0"/>
+                <a:cs typeface="Arial" panose="020B0604020202020204" pitchFamily="34" charset="0"/>
+              </a:rPr>
+              <a:t>jupyter</a:t>
+            </a:r>
+            <a:r>
+              <a:rPr lang="en-AU" dirty="0" smtClean="0">
+                <a:latin typeface="Arial" panose="020B0604020202020204" pitchFamily="34" charset="0"/>
+                <a:cs typeface="Arial" panose="020B0604020202020204" pitchFamily="34" charset="0"/>
+              </a:rPr>
+              <a:t> notebook server in your </a:t>
+            </a:r>
+            <a:r>
+              <a:rPr lang="en-AU" smtClean="0">
+                <a:latin typeface="Arial" panose="020B0604020202020204" pitchFamily="34" charset="0"/>
+                <a:cs typeface="Arial" panose="020B0604020202020204" pitchFamily="34" charset="0"/>
+              </a:rPr>
+              <a:t>virtual machine (VM)</a:t>
+            </a:r>
+            <a:endParaRPr lang="en-AU" dirty="0" smtClean="0">
+              <a:latin typeface="Arial" panose="020B0604020202020204" pitchFamily="34" charset="0"/>
+              <a:cs typeface="Arial" panose="020B0604020202020204" pitchFamily="34" charset="0"/>
+            </a:endParaRPr>
+          </a:p>
+          <a:p>
             <a:pPr marL="742950" lvl="1" indent="-285750">
               <a:buFont typeface="Wingdings" panose="05000000000000000000" pitchFamily="2" charset="2"/>
               <a:buChar char="Ø"/>
@@ -7138,226 +7235,58 @@
                 <a:latin typeface="Lucida Sans Typewriter" panose="020B0509030504030204" pitchFamily="49" charset="0"/>
                 <a:cs typeface="Arial" panose="020B0604020202020204" pitchFamily="34" charset="0"/>
               </a:rPr>
-              <a:t>vagrant up</a:t>
-            </a:r>
-          </a:p>
-          <a:p>
-            <a:r>
-              <a:rPr lang="en-AU" dirty="0" smtClean="0">
-                <a:latin typeface="Arial" panose="020B0604020202020204" pitchFamily="34" charset="0"/>
-                <a:cs typeface="Arial" panose="020B0604020202020204" pitchFamily="34" charset="0"/>
-              </a:rPr>
-              <a:t>Step 4  - </a:t>
-            </a:r>
-            <a:r>
-              <a:rPr lang="en-AU" dirty="0" smtClean="0">
-                <a:latin typeface="Arial" panose="020B0604020202020204" pitchFamily="34" charset="0"/>
-                <a:cs typeface="Arial" panose="020B0604020202020204" pitchFamily="34" charset="0"/>
-              </a:rPr>
-              <a:t>use </a:t>
+              <a:t> </a:t>
             </a:r>
             <a:r>
               <a:rPr lang="en-AU" dirty="0" err="1" smtClean="0">
-                <a:latin typeface="Arial" panose="020B0604020202020204" pitchFamily="34" charset="0"/>
-                <a:cs typeface="Arial" panose="020B0604020202020204" pitchFamily="34" charset="0"/>
-              </a:rPr>
-              <a:t>ssh</a:t>
-            </a:r>
-            <a:r>
-              <a:rPr lang="en-AU" dirty="0" smtClean="0">
-                <a:latin typeface="Arial" panose="020B0604020202020204" pitchFamily="34" charset="0"/>
-                <a:cs typeface="Arial" panose="020B0604020202020204" pitchFamily="34" charset="0"/>
-              </a:rPr>
-              <a:t> to login </a:t>
-            </a:r>
-            <a:r>
-              <a:rPr lang="en-AU" dirty="0" smtClean="0">
-                <a:latin typeface="Arial" panose="020B0604020202020204" pitchFamily="34" charset="0"/>
-                <a:cs typeface="Arial" panose="020B0604020202020204" pitchFamily="34" charset="0"/>
-              </a:rPr>
-              <a:t>to the virtual machine </a:t>
-            </a:r>
-            <a:r>
-              <a:rPr lang="en-AU" dirty="0" smtClean="0">
-                <a:latin typeface="Arial" panose="020B0604020202020204" pitchFamily="34" charset="0"/>
-                <a:cs typeface="Arial" panose="020B0604020202020204" pitchFamily="34" charset="0"/>
-              </a:rPr>
-              <a:t>(VM)</a:t>
-            </a:r>
-            <a:endParaRPr lang="en-AU" dirty="0" smtClean="0">
-              <a:latin typeface="Arial" panose="020B0604020202020204" pitchFamily="34" charset="0"/>
-              <a:cs typeface="Arial" panose="020B0604020202020204" pitchFamily="34" charset="0"/>
-            </a:endParaRPr>
-          </a:p>
-          <a:p>
-            <a:pPr marL="742950" lvl="1" indent="-285750">
-              <a:buFont typeface="Wingdings" panose="05000000000000000000" pitchFamily="2" charset="2"/>
-              <a:buChar char="Ø"/>
-            </a:pPr>
+                <a:latin typeface="Lucida Sans Typewriter" panose="020B0509030504030204" pitchFamily="49" charset="0"/>
+                <a:cs typeface="Arial" panose="020B0604020202020204" pitchFamily="34" charset="0"/>
+              </a:rPr>
+              <a:t>jupyter</a:t>
+            </a:r>
             <a:r>
               <a:rPr lang="en-AU" dirty="0" smtClean="0">
                 <a:latin typeface="Lucida Sans Typewriter" panose="020B0509030504030204" pitchFamily="49" charset="0"/>
                 <a:cs typeface="Arial" panose="020B0604020202020204" pitchFamily="34" charset="0"/>
               </a:rPr>
-              <a:t>vagrant </a:t>
+              <a:t> notebook –</a:t>
             </a:r>
             <a:r>
               <a:rPr lang="en-AU" dirty="0" err="1" smtClean="0">
                 <a:latin typeface="Lucida Sans Typewriter" panose="020B0509030504030204" pitchFamily="49" charset="0"/>
                 <a:cs typeface="Arial" panose="020B0604020202020204" pitchFamily="34" charset="0"/>
               </a:rPr>
-              <a:t>ssh</a:t>
-            </a:r>
-            <a:endParaRPr lang="en-AU" dirty="0" smtClean="0">
-              <a:latin typeface="Lucida Sans Typewriter" panose="020B0509030504030204" pitchFamily="49" charset="0"/>
-              <a:cs typeface="Arial" panose="020B0604020202020204" pitchFamily="34" charset="0"/>
-            </a:endParaRPr>
-          </a:p>
-          <a:p>
-            <a:r>
-              <a:rPr lang="en-AU" dirty="0" smtClean="0">
-                <a:latin typeface="Arial" panose="020B0604020202020204" pitchFamily="34" charset="0"/>
-                <a:cs typeface="Arial" panose="020B0604020202020204" pitchFamily="34" charset="0"/>
-              </a:rPr>
-              <a:t>Step </a:t>
-            </a:r>
-            <a:r>
-              <a:rPr lang="en-AU" dirty="0">
-                <a:latin typeface="Arial" panose="020B0604020202020204" pitchFamily="34" charset="0"/>
-                <a:cs typeface="Arial" panose="020B0604020202020204" pitchFamily="34" charset="0"/>
-              </a:rPr>
-              <a:t>5</a:t>
-            </a:r>
-            <a:r>
-              <a:rPr lang="en-AU" dirty="0" smtClean="0">
-                <a:latin typeface="Arial" panose="020B0604020202020204" pitchFamily="34" charset="0"/>
-                <a:cs typeface="Arial" panose="020B0604020202020204" pitchFamily="34" charset="0"/>
-              </a:rPr>
-              <a:t> </a:t>
-            </a:r>
-            <a:r>
-              <a:rPr lang="en-AU" dirty="0" smtClean="0">
-                <a:latin typeface="Arial" panose="020B0604020202020204" pitchFamily="34" charset="0"/>
-                <a:cs typeface="Arial" panose="020B0604020202020204" pitchFamily="34" charset="0"/>
-              </a:rPr>
-              <a:t>- start </a:t>
-            </a:r>
-            <a:r>
-              <a:rPr lang="en-AU" dirty="0" smtClean="0">
-                <a:latin typeface="Arial" panose="020B0604020202020204" pitchFamily="34" charset="0"/>
-                <a:cs typeface="Arial" panose="020B0604020202020204" pitchFamily="34" charset="0"/>
-              </a:rPr>
-              <a:t>the</a:t>
-            </a:r>
-            <a:r>
-              <a:rPr lang="en-AU" dirty="0" smtClean="0">
-                <a:latin typeface="Arial" panose="020B0604020202020204" pitchFamily="34" charset="0"/>
-                <a:cs typeface="Arial" panose="020B0604020202020204" pitchFamily="34" charset="0"/>
-              </a:rPr>
-              <a:t> </a:t>
-            </a:r>
-            <a:r>
-              <a:rPr lang="en-AU" dirty="0" err="1" smtClean="0">
-                <a:latin typeface="Arial" panose="020B0604020202020204" pitchFamily="34" charset="0"/>
-                <a:cs typeface="Arial" panose="020B0604020202020204" pitchFamily="34" charset="0"/>
-              </a:rPr>
-              <a:t>jupyter</a:t>
-            </a:r>
-            <a:r>
-              <a:rPr lang="en-AU" dirty="0" smtClean="0">
-                <a:latin typeface="Arial" panose="020B0604020202020204" pitchFamily="34" charset="0"/>
-                <a:cs typeface="Arial" panose="020B0604020202020204" pitchFamily="34" charset="0"/>
-              </a:rPr>
-              <a:t> </a:t>
-            </a:r>
-            <a:r>
-              <a:rPr lang="en-AU" dirty="0" smtClean="0">
-                <a:latin typeface="Arial" panose="020B0604020202020204" pitchFamily="34" charset="0"/>
-                <a:cs typeface="Arial" panose="020B0604020202020204" pitchFamily="34" charset="0"/>
-              </a:rPr>
-              <a:t>notebook server in your </a:t>
-            </a:r>
-            <a:r>
-              <a:rPr lang="en-AU" smtClean="0">
-                <a:latin typeface="Arial" panose="020B0604020202020204" pitchFamily="34" charset="0"/>
-                <a:cs typeface="Arial" panose="020B0604020202020204" pitchFamily="34" charset="0"/>
-              </a:rPr>
-              <a:t>virtual machine (VM)</a:t>
-            </a:r>
-            <a:endParaRPr lang="en-AU" dirty="0" smtClean="0">
-              <a:latin typeface="Arial" panose="020B0604020202020204" pitchFamily="34" charset="0"/>
-              <a:cs typeface="Arial" panose="020B0604020202020204" pitchFamily="34" charset="0"/>
-            </a:endParaRPr>
-          </a:p>
-          <a:p>
-            <a:pPr marL="742950" lvl="1" indent="-285750">
-              <a:buFont typeface="Wingdings" panose="05000000000000000000" pitchFamily="2" charset="2"/>
-              <a:buChar char="Ø"/>
-            </a:pPr>
+              <a:t>ip</a:t>
+            </a:r>
             <a:r>
               <a:rPr lang="en-AU" dirty="0" smtClean="0">
                 <a:latin typeface="Lucida Sans Typewriter" panose="020B0509030504030204" pitchFamily="49" charset="0"/>
                 <a:cs typeface="Arial" panose="020B0604020202020204" pitchFamily="34" charset="0"/>
               </a:rPr>
-              <a:t> </a:t>
-            </a:r>
-            <a:r>
-              <a:rPr lang="en-AU" dirty="0" err="1" smtClean="0">
-                <a:latin typeface="Lucida Sans Typewriter" panose="020B0509030504030204" pitchFamily="49" charset="0"/>
-                <a:cs typeface="Arial" panose="020B0604020202020204" pitchFamily="34" charset="0"/>
-              </a:rPr>
-              <a:t>jupyter</a:t>
-            </a:r>
+              <a:t>=0.0.0.0 –-no-browser</a:t>
+            </a:r>
+          </a:p>
+          <a:p>
             <a:r>
               <a:rPr lang="en-AU" dirty="0" smtClean="0">
-                <a:latin typeface="Lucida Sans Typewriter" panose="020B0509030504030204" pitchFamily="49" charset="0"/>
-                <a:cs typeface="Arial" panose="020B0604020202020204" pitchFamily="34" charset="0"/>
-              </a:rPr>
-              <a:t> notebook –</a:t>
-            </a:r>
-            <a:r>
-              <a:rPr lang="en-AU" dirty="0" err="1" smtClean="0">
-                <a:latin typeface="Lucida Sans Typewriter" panose="020B0509030504030204" pitchFamily="49" charset="0"/>
-                <a:cs typeface="Arial" panose="020B0604020202020204" pitchFamily="34" charset="0"/>
-              </a:rPr>
-              <a:t>ip</a:t>
+                <a:latin typeface="Arial" panose="020B0604020202020204" pitchFamily="34" charset="0"/>
+                <a:cs typeface="Arial" panose="020B0604020202020204" pitchFamily="34" charset="0"/>
+              </a:rPr>
+              <a:t>Step </a:t>
+            </a:r>
+            <a:r>
+              <a:rPr lang="en-AU" dirty="0">
+                <a:latin typeface="Arial" panose="020B0604020202020204" pitchFamily="34" charset="0"/>
+                <a:cs typeface="Arial" panose="020B0604020202020204" pitchFamily="34" charset="0"/>
+              </a:rPr>
+              <a:t>6</a:t>
             </a:r>
             <a:r>
               <a:rPr lang="en-AU" dirty="0" smtClean="0">
-                <a:latin typeface="Lucida Sans Typewriter" panose="020B0509030504030204" pitchFamily="49" charset="0"/>
-                <a:cs typeface="Arial" panose="020B0604020202020204" pitchFamily="34" charset="0"/>
-              </a:rPr>
-              <a:t>=0.0.0.0 –-no-browser</a:t>
-            </a:r>
-          </a:p>
-          <a:p>
-            <a:r>
-              <a:rPr lang="en-AU" dirty="0" smtClean="0">
-                <a:latin typeface="Arial" panose="020B0604020202020204" pitchFamily="34" charset="0"/>
-                <a:cs typeface="Arial" panose="020B0604020202020204" pitchFamily="34" charset="0"/>
-              </a:rPr>
-              <a:t>Step </a:t>
-            </a:r>
-            <a:r>
-              <a:rPr lang="en-AU" dirty="0">
-                <a:latin typeface="Arial" panose="020B0604020202020204" pitchFamily="34" charset="0"/>
-                <a:cs typeface="Arial" panose="020B0604020202020204" pitchFamily="34" charset="0"/>
-              </a:rPr>
-              <a:t>6</a:t>
-            </a:r>
-            <a:r>
-              <a:rPr lang="en-AU" dirty="0" smtClean="0">
-                <a:latin typeface="Arial" panose="020B0604020202020204" pitchFamily="34" charset="0"/>
-                <a:cs typeface="Arial" panose="020B0604020202020204" pitchFamily="34" charset="0"/>
-              </a:rPr>
-              <a:t> </a:t>
-            </a:r>
-            <a:r>
-              <a:rPr lang="en-AU" dirty="0" smtClean="0">
-                <a:latin typeface="Arial" panose="020B0604020202020204" pitchFamily="34" charset="0"/>
-                <a:cs typeface="Arial" panose="020B0604020202020204" pitchFamily="34" charset="0"/>
-              </a:rPr>
-              <a:t>– open </a:t>
+                <a:latin typeface="Arial" panose="020B0604020202020204" pitchFamily="34" charset="0"/>
+                <a:cs typeface="Arial" panose="020B0604020202020204" pitchFamily="34" charset="0"/>
+              </a:rPr>
+              <a:t> – open </a:t>
             </a:r>
             <a:r>
               <a:rPr lang="en-AU" dirty="0" err="1" smtClean="0">
@@ -7799,9 +7728,38 @@
           </a:p>
         </p:txBody>
       </p:sp>
+      <p:sp>
+        <p:nvSpPr>
+          <p:cNvPr id="11" name="TextBox 10"/>
+          <p:cNvSpPr txBox="1"/>
+          <p:nvPr/>
+        </p:nvSpPr>
+        <p:spPr>
+          <a:xfrm>
+            <a:off x="1008529" y="5647764"/>
+            <a:ext cx="7221071" cy="369332"/>
+          </a:xfrm>
+          <a:prstGeom prst="rect">
+            <a:avLst/>
+          </a:prstGeom>
+          <a:noFill/>
+        </p:spPr>
+        <p:txBody>
+          <a:bodyPr wrap="square" rtlCol="0">
+            <a:spAutoFit/>
+          </a:bodyPr>
+          <a:lstStyle/>
+          <a:p>
+            <a:r>
+              <a:rPr lang="en-AU" dirty="0" smtClean="0"/>
+              <a:t>If it returns the version number as shown above you are good to go! </a:t>
+            </a:r>
+          </a:p>
+        </p:txBody>
+      </p:sp>
       <p:pic>
         <p:nvPicPr>
-          <p:cNvPr id="10" name="Picture 9"/>
+          <p:cNvPr id="7" name="Picture 6"/>
           <p:cNvPicPr>
             <a:picLocks noChangeAspect="1"/>
           </p:cNvPicPr>
@@ -7821,43 +7779,14 @@
         </p:blipFill>
         <p:spPr>
           <a:xfrm>
-            <a:off x="1008529" y="3215483"/>
-            <a:ext cx="4427604" cy="1958510"/>
+            <a:off x="1008529" y="3584085"/>
+            <a:ext cx="5997460" cy="1364098"/>
           </a:xfrm>
           <a:prstGeom prst="rect">
             <a:avLst/>
           </a:prstGeom>
         </p:spPr>
       </p:pic>
-      <p:sp>
-        <p:nvSpPr>
-          <p:cNvPr id="11" name="TextBox 10"/>
-          <p:cNvSpPr txBox="1"/>
-          <p:nvPr/>
-        </p:nvSpPr>
-        <p:spPr>
-          <a:xfrm>
-            <a:off x="1008529" y="5647764"/>
-            <a:ext cx="7221071" cy="369332"/>
-          </a:xfrm>
-          <a:prstGeom prst="rect">
-            <a:avLst/>
-          </a:prstGeom>
-          <a:noFill/>
-        </p:spPr>
-        <p:txBody>
-          <a:bodyPr wrap="square" rtlCol="0">
-            <a:spAutoFit/>
-          </a:bodyPr>
-          <a:lstStyle/>
-          <a:p>
-            <a:r>
-              <a:rPr lang="en-AU" dirty="0" smtClean="0"/>
-              <a:t>If it returns the version number as shown above you are good to go! </a:t>
-            </a:r>
-          </a:p>
-        </p:txBody>
-      </p:sp>
     </p:spTree>
     <p:extLst>
       <p:ext uri="{BB962C8B-B14F-4D97-AF65-F5344CB8AC3E}">
@@ -7956,8 +7885,8 @@
         </p:nvSpPr>
         <p:spPr>
           <a:xfrm>
-            <a:off x="3070363" y="3809673"/>
-            <a:ext cx="6051272" cy="1200329"/>
+            <a:off x="3097133" y="3809673"/>
+            <a:ext cx="5997732" cy="1231106"/>
           </a:xfrm>
           <a:prstGeom prst="rect">
             <a:avLst/>
@@ -7986,12 +7915,12 @@
               <a:buChar char="•"/>
             </a:pPr>
             <a:r>
-              <a:rPr lang="en-AU" dirty="0">
+              <a:rPr lang="en-AU" sz="2000" dirty="0">
                 <a:hlinkClick r:id="rId3"/>
               </a:rPr>
               <a:t>https://gitforwindows.org/</a:t>
             </a:r>
-            <a:endParaRPr lang="en-AU" dirty="0"/>
+            <a:endParaRPr lang="en-AU" sz="2000" dirty="0"/>
           </a:p>
           <a:p>
             <a:pPr algn="ctr"/>
@@ -8203,19 +8132,8 @@
                 <a:latin typeface="Lucida Sans" panose="020B0602030504020204" pitchFamily="34" charset="0"/>
                 <a:cs typeface="Arial" panose="020B0604020202020204" pitchFamily="34" charset="0"/>
               </a:rPr>
-              <a:t> </a:t>
-            </a:r>
-            <a:r>
-              <a:rPr lang="en-AU" dirty="0" smtClean="0">
-                <a:latin typeface="Lucida Sans" panose="020B0602030504020204" pitchFamily="34" charset="0"/>
-                <a:cs typeface="Arial" panose="020B0604020202020204" pitchFamily="34" charset="0"/>
-              </a:rPr>
-              <a:t>Courses</a:t>
-            </a:r>
-            <a:endParaRPr lang="en-AU" dirty="0" smtClean="0">
-              <a:latin typeface="Lucida Sans" panose="020B0602030504020204" pitchFamily="34" charset="0"/>
-              <a:cs typeface="Arial" panose="020B0604020202020204" pitchFamily="34" charset="0"/>
-            </a:endParaRPr>
+              <a:t> Courses</a:t>
+            </a:r>
           </a:p>
           <a:p>
             <a:pPr marL="285750" indent="-285750">
@@ -8285,19 +8203,8 @@
                 <a:latin typeface="Lucida Sans" panose="020B0602030504020204" pitchFamily="34" charset="0"/>
                 <a:cs typeface="Arial" panose="020B0604020202020204" pitchFamily="34" charset="0"/>
               </a:rPr>
-              <a:t> </a:t>
-            </a:r>
-            <a:r>
-              <a:rPr lang="en-AU" dirty="0" smtClean="0">
-                <a:latin typeface="Lucida Sans" panose="020B0602030504020204" pitchFamily="34" charset="0"/>
-                <a:cs typeface="Arial" panose="020B0604020202020204" pitchFamily="34" charset="0"/>
-              </a:rPr>
-              <a:t>Courses</a:t>
-            </a:r>
-            <a:endParaRPr lang="en-AU" dirty="0" smtClean="0">
-              <a:latin typeface="Lucida Sans" panose="020B0602030504020204" pitchFamily="34" charset="0"/>
-              <a:cs typeface="Arial" panose="020B0604020202020204" pitchFamily="34" charset="0"/>
-            </a:endParaRPr>
+              <a:t> Courses</a:t>
+            </a:r>
           </a:p>
           <a:p>
             <a:pPr marL="285750" indent="-285750">
@@ -8348,19 +8255,8 @@
                 <a:latin typeface="Lucida Sans" panose="020B0602030504020204" pitchFamily="34" charset="0"/>
                 <a:cs typeface="Arial" panose="020B0604020202020204" pitchFamily="34" charset="0"/>
               </a:rPr>
-              <a:t>% cd </a:t>
-            </a:r>
-            <a:r>
-              <a:rPr lang="en-AU" dirty="0" smtClean="0">
-                <a:latin typeface="Lucida Sans" panose="020B0602030504020204" pitchFamily="34" charset="0"/>
-                <a:cs typeface="Arial" panose="020B0604020202020204" pitchFamily="34" charset="0"/>
-              </a:rPr>
-              <a:t>Courses</a:t>
-            </a:r>
-            <a:endParaRPr lang="en-AU" dirty="0" smtClean="0">
-              <a:latin typeface="Lucida Sans" panose="020B0602030504020204" pitchFamily="34" charset="0"/>
-              <a:cs typeface="Arial" panose="020B0604020202020204" pitchFamily="34" charset="0"/>
-            </a:endParaRPr>
+              <a:t>% cd Courses</a:t>
+            </a:r>
           </a:p>
           <a:p>
             <a:endParaRPr lang="en-AU" dirty="0"/>
@@ -8488,10 +8384,6 @@
               </a:rPr>
               <a:t>github.com/chrisbpawsey/Data1001.git</a:t>
             </a:r>
-            <a:endParaRPr lang="en-AU" dirty="0" smtClean="0">
-              <a:latin typeface="Lucida Sans" panose="020B0602030504020204" pitchFamily="34" charset="0"/>
-              <a:cs typeface="Arial" panose="020B0604020202020204" pitchFamily="34" charset="0"/>
-            </a:endParaRPr>
           </a:p>
           <a:p>
             <a:pPr lvl="1"/>
@@ -8503,21 +8395,8 @@
           <a:p>
             <a:r>
               <a:rPr lang="en-AU" dirty="0" smtClean="0"/>
-              <a:t>To verify that the </a:t>
-            </a:r>
-            <a:r>
-              <a:rPr lang="en-AU" dirty="0" smtClean="0"/>
-              <a:t>command </a:t>
-            </a:r>
-            <a:r>
-              <a:rPr lang="en-AU" dirty="0" smtClean="0"/>
-              <a:t>worked you can inspect the current directory fo</a:t>
-            </a:r>
-            <a:r>
-              <a:rPr lang="en-AU" dirty="0" smtClean="0"/>
-              <a:t>r the new folder.</a:t>
-            </a:r>
-            <a:endParaRPr lang="en-AU" dirty="0" smtClean="0"/>
+              <a:t>To verify that the command worked you can inspect the current directory for the new folder.</a:t>
+            </a:r>
           </a:p>
           <a:p>
             <a:r>
@@ -8702,35 +8581,7 @@
                 <a:latin typeface="Arial" panose="020B0604020202020204" pitchFamily="34" charset="0"/>
                 <a:cs typeface="Arial" panose="020B0604020202020204" pitchFamily="34" charset="0"/>
               </a:rPr>
-              <a:t>Step 3: </a:t>
-            </a:r>
-            <a:r>
-              <a:rPr lang="en-AU" dirty="0" smtClean="0">
-                <a:latin typeface="Arial" panose="020B0604020202020204" pitchFamily="34" charset="0"/>
-                <a:cs typeface="Arial" panose="020B0604020202020204" pitchFamily="34" charset="0"/>
-              </a:rPr>
-              <a:t>Change </a:t>
-            </a:r>
-            <a:r>
-              <a:rPr lang="en-AU" dirty="0" smtClean="0">
-                <a:latin typeface="Arial" panose="020B0604020202020204" pitchFamily="34" charset="0"/>
-                <a:cs typeface="Arial" panose="020B0604020202020204" pitchFamily="34" charset="0"/>
-              </a:rPr>
-              <a:t>director into the </a:t>
-            </a:r>
-            <a:r>
-              <a:rPr lang="en-AU" dirty="0" smtClean="0">
-                <a:latin typeface="Arial" panose="020B0604020202020204" pitchFamily="34" charset="0"/>
-                <a:cs typeface="Arial" panose="020B0604020202020204" pitchFamily="34" charset="0"/>
-              </a:rPr>
-              <a:t>course/Data1001 </a:t>
-            </a:r>
-            <a:r>
-              <a:rPr lang="en-AU" dirty="0" smtClean="0">
-                <a:latin typeface="Arial" panose="020B0604020202020204" pitchFamily="34" charset="0"/>
-                <a:cs typeface="Arial" panose="020B0604020202020204" pitchFamily="34" charset="0"/>
-              </a:rPr>
-              <a:t>directory</a:t>
+              <a:t>Step 3: Change director into the course/Data1001 directory</a:t>
             </a:r>
           </a:p>
           <a:p>
@@ -8740,41 +8591,53 @@
                 <a:latin typeface="Lucida Sans" panose="020B0602030504020204" pitchFamily="34" charset="0"/>
                 <a:cs typeface="Arial" panose="020B0604020202020204" pitchFamily="34" charset="0"/>
               </a:rPr>
-              <a:t>% </a:t>
-            </a:r>
+              <a:t>% cd Course </a:t>
+            </a:r>
+          </a:p>
+          <a:p>
             <a:r>
               <a:rPr lang="en-AU" dirty="0" smtClean="0">
-                <a:latin typeface="Lucida Sans" panose="020B0602030504020204" pitchFamily="34" charset="0"/>
-                <a:cs typeface="Arial" panose="020B0604020202020204" pitchFamily="34" charset="0"/>
-              </a:rPr>
-              <a:t>cd Course </a:t>
-            </a:r>
-            <a:endParaRPr lang="en-AU" dirty="0" smtClean="0">
-              <a:latin typeface="Lucida Sans" panose="020B0602030504020204" pitchFamily="34" charset="0"/>
-              <a:cs typeface="Arial" panose="020B0604020202020204" pitchFamily="34" charset="0"/>
-            </a:endParaRPr>
-          </a:p>
-          <a:p>
+                <a:latin typeface="Arial" panose="020B0604020202020204" pitchFamily="34" charset="0"/>
+                <a:cs typeface="Arial" panose="020B0604020202020204" pitchFamily="34" charset="0"/>
+              </a:rPr>
+              <a:t>You can check that it worked using the “ls” or “</a:t>
+            </a:r>
+            <a:r>
+              <a:rPr lang="en-AU" dirty="0" err="1" smtClean="0">
+                <a:latin typeface="Arial" panose="020B0604020202020204" pitchFamily="34" charset="0"/>
+                <a:cs typeface="Arial" panose="020B0604020202020204" pitchFamily="34" charset="0"/>
+              </a:rPr>
+              <a:t>dir</a:t>
+            </a:r>
             <a:r>
               <a:rPr lang="en-AU" dirty="0" smtClean="0">
                 <a:latin typeface="Arial" panose="020B0604020202020204" pitchFamily="34" charset="0"/>
                 <a:cs typeface="Arial" panose="020B0604020202020204" pitchFamily="34" charset="0"/>
               </a:rPr>
-              <a:t>You can check that it worked using the “ls” or “</a:t>
+              <a:t>” command and you should see a file named</a:t>
+            </a:r>
+          </a:p>
+          <a:p>
+            <a:r>
+              <a:rPr lang="en-AU" dirty="0" smtClean="0">
+                <a:latin typeface="Arial" panose="020B0604020202020204" pitchFamily="34" charset="0"/>
+                <a:cs typeface="Arial" panose="020B0604020202020204" pitchFamily="34" charset="0"/>
+              </a:rPr>
+              <a:t>“</a:t>
             </a:r>
             <a:r>
               <a:rPr lang="en-AU" dirty="0" err="1" smtClean="0">
                 <a:latin typeface="Arial" panose="020B0604020202020204" pitchFamily="34" charset="0"/>
                 <a:cs typeface="Arial" panose="020B0604020202020204" pitchFamily="34" charset="0"/>
               </a:rPr>
-              <a:t>dir</a:t>
+              <a:t>Vagrantfile</a:t>
             </a:r>
             <a:r>
               <a:rPr lang="en-AU" dirty="0" smtClean="0">
                 <a:latin typeface="Arial" panose="020B0604020202020204" pitchFamily="34" charset="0"/>
                 <a:cs typeface="Arial" panose="020B0604020202020204" pitchFamily="34" charset="0"/>
               </a:rPr>
-              <a:t>” command and you should see a file named</a:t>
+              <a:t>”  it contains the instructions to setup the Virtual Machine.  You don’t need to make </a:t>
             </a:r>
           </a:p>
           <a:p>
@@ -8783,37 +8646,7 @@
                 <a:latin typeface="Arial" panose="020B0604020202020204" pitchFamily="34" charset="0"/>
                 <a:cs typeface="Arial" panose="020B0604020202020204" pitchFamily="34" charset="0"/>
               </a:rPr>
-              <a:t>“</a:t>
-            </a:r>
-            <a:r>
-              <a:rPr lang="en-AU" dirty="0" err="1" smtClean="0">
-                <a:latin typeface="Arial" panose="020B0604020202020204" pitchFamily="34" charset="0"/>
-                <a:cs typeface="Arial" panose="020B0604020202020204" pitchFamily="34" charset="0"/>
-              </a:rPr>
-              <a:t>Vagrantfile</a:t>
-            </a:r>
-            <a:r>
-              <a:rPr lang="en-AU" dirty="0" smtClean="0">
-                <a:latin typeface="Arial" panose="020B0604020202020204" pitchFamily="34" charset="0"/>
-                <a:cs typeface="Arial" panose="020B0604020202020204" pitchFamily="34" charset="0"/>
-              </a:rPr>
-              <a:t>”  it contains the instructions to setup the Virtual Machine.  You don’t need to make </a:t>
-            </a:r>
-          </a:p>
-          <a:p>
-            <a:r>
-              <a:rPr lang="en-AU" dirty="0" smtClean="0">
-                <a:latin typeface="Arial" panose="020B0604020202020204" pitchFamily="34" charset="0"/>
-                <a:cs typeface="Arial" panose="020B0604020202020204" pitchFamily="34" charset="0"/>
-              </a:rPr>
-              <a:t>changes to it</a:t>
-            </a:r>
-            <a:r>
-              <a:rPr lang="en-AU" dirty="0" smtClean="0">
-                <a:latin typeface="Arial" panose="020B0604020202020204" pitchFamily="34" charset="0"/>
-                <a:cs typeface="Arial" panose="020B0604020202020204" pitchFamily="34" charset="0"/>
-              </a:rPr>
-              <a:t>.</a:t>
+              <a:t>changes to it.</a:t>
             </a:r>
           </a:p>
           <a:p>
@@ -8841,104 +8674,44 @@
                 <a:latin typeface="Arial" panose="020B0604020202020204" pitchFamily="34" charset="0"/>
                 <a:cs typeface="Arial" panose="020B0604020202020204" pitchFamily="34" charset="0"/>
               </a:rPr>
-              <a:t>To create </a:t>
+              <a:t>To create the VM, you must be in same directory as </a:t>
+            </a:r>
+            <a:r>
+              <a:rPr lang="en-AU" dirty="0" err="1" smtClean="0">
+                <a:latin typeface="Arial" panose="020B0604020202020204" pitchFamily="34" charset="0"/>
+                <a:cs typeface="Arial" panose="020B0604020202020204" pitchFamily="34" charset="0"/>
+              </a:rPr>
+              <a:t>Vagrantfile</a:t>
             </a:r>
             <a:r>
               <a:rPr lang="en-AU" dirty="0" smtClean="0">
                 <a:latin typeface="Arial" panose="020B0604020202020204" pitchFamily="34" charset="0"/>
                 <a:cs typeface="Arial" panose="020B0604020202020204" pitchFamily="34" charset="0"/>
               </a:rPr>
-              <a:t>the VM, </a:t>
+              <a:t> which is the </a:t>
+            </a:r>
+            <a:r>
+              <a:rPr lang="en-AU" b="1" dirty="0" smtClean="0">
+                <a:latin typeface="Arial" panose="020B0604020202020204" pitchFamily="34" charset="0"/>
+                <a:cs typeface="Arial" panose="020B0604020202020204" pitchFamily="34" charset="0"/>
+              </a:rPr>
+              <a:t>Data1001 </a:t>
             </a:r>
             <a:r>
               <a:rPr lang="en-AU" dirty="0" smtClean="0">
                 <a:latin typeface="Arial" panose="020B0604020202020204" pitchFamily="34" charset="0"/>
                 <a:cs typeface="Arial" panose="020B0604020202020204" pitchFamily="34" charset="0"/>
               </a:rPr>
-              <a:t>you must </a:t>
-            </a:r>
+              <a:t>directory.</a:t>
+            </a:r>
+          </a:p>
+          <a:p>
             <a:r>
               <a:rPr lang="en-AU" dirty="0" smtClean="0">
                 <a:latin typeface="Arial" panose="020B0604020202020204" pitchFamily="34" charset="0"/>
                 <a:cs typeface="Arial" panose="020B0604020202020204" pitchFamily="34" charset="0"/>
               </a:rPr>
-              <a:t>be in </a:t>
-            </a:r>
-            <a:r>
-              <a:rPr lang="en-AU" dirty="0" smtClean="0">
-                <a:latin typeface="Arial" panose="020B0604020202020204" pitchFamily="34" charset="0"/>
-                <a:cs typeface="Arial" panose="020B0604020202020204" pitchFamily="34" charset="0"/>
-              </a:rPr>
-              <a:t>same directory as </a:t>
-            </a:r>
-            <a:r>
-              <a:rPr lang="en-AU" dirty="0" err="1" smtClean="0">
-                <a:latin typeface="Arial" panose="020B0604020202020204" pitchFamily="34" charset="0"/>
-                <a:cs typeface="Arial" panose="020B0604020202020204" pitchFamily="34" charset="0"/>
-              </a:rPr>
-              <a:t>Vagrantfile</a:t>
-            </a:r>
-            <a:r>
-              <a:rPr lang="en-AU" dirty="0" smtClean="0">
-                <a:latin typeface="Arial" panose="020B0604020202020204" pitchFamily="34" charset="0"/>
-                <a:cs typeface="Arial" panose="020B0604020202020204" pitchFamily="34" charset="0"/>
-              </a:rPr>
-              <a:t> which is the </a:t>
-            </a:r>
-            <a:r>
-              <a:rPr lang="en-AU" b="1" dirty="0" smtClean="0">
-                <a:latin typeface="Arial" panose="020B0604020202020204" pitchFamily="34" charset="0"/>
-                <a:cs typeface="Arial" panose="020B0604020202020204" pitchFamily="34" charset="0"/>
-              </a:rPr>
-              <a:t>Data1001</a:t>
-            </a:r>
-            <a:r>
-              <a:rPr lang="en-AU" b="1" dirty="0" smtClean="0">
-                <a:latin typeface="Arial" panose="020B0604020202020204" pitchFamily="34" charset="0"/>
-                <a:cs typeface="Arial" panose="020B0604020202020204" pitchFamily="34" charset="0"/>
-              </a:rPr>
-              <a:t> </a:t>
-            </a:r>
-            <a:r>
-              <a:rPr lang="en-AU" dirty="0" smtClean="0">
-                <a:latin typeface="Arial" panose="020B0604020202020204" pitchFamily="34" charset="0"/>
-                <a:cs typeface="Arial" panose="020B0604020202020204" pitchFamily="34" charset="0"/>
-              </a:rPr>
-              <a:t>directory.</a:t>
-            </a:r>
-            <a:endParaRPr lang="en-AU" dirty="0" smtClean="0">
-              <a:latin typeface="Arial" panose="020B0604020202020204" pitchFamily="34" charset="0"/>
-              <a:cs typeface="Arial" panose="020B0604020202020204" pitchFamily="34" charset="0"/>
-            </a:endParaRPr>
-          </a:p>
-          <a:p>
-            <a:r>
-              <a:rPr lang="en-AU" dirty="0" smtClean="0">
-                <a:latin typeface="Arial" panose="020B0604020202020204" pitchFamily="34" charset="0"/>
-                <a:cs typeface="Arial" panose="020B0604020202020204" pitchFamily="34" charset="0"/>
-              </a:rPr>
-              <a:t>To </a:t>
-            </a:r>
-            <a:r>
-              <a:rPr lang="en-AU" dirty="0" smtClean="0">
-                <a:latin typeface="Arial" panose="020B0604020202020204" pitchFamily="34" charset="0"/>
-                <a:cs typeface="Arial" panose="020B0604020202020204" pitchFamily="34" charset="0"/>
-              </a:rPr>
-              <a:t>create</a:t>
-            </a:r>
-            <a:r>
-              <a:rPr lang="en-AU" dirty="0" smtClean="0">
-                <a:latin typeface="Arial" panose="020B0604020202020204" pitchFamily="34" charset="0"/>
-                <a:cs typeface="Arial" panose="020B0604020202020204" pitchFamily="34" charset="0"/>
-              </a:rPr>
-              <a:t> </a:t>
-            </a:r>
-            <a:r>
-              <a:rPr lang="en-AU" dirty="0" smtClean="0">
-                <a:latin typeface="Arial" panose="020B0604020202020204" pitchFamily="34" charset="0"/>
-                <a:cs typeface="Arial" panose="020B0604020202020204" pitchFamily="34" charset="0"/>
-              </a:rPr>
-              <a:t>the VM the Vagrant command is </a:t>
+              <a:t>To create the VM the Vagrant command is </a:t>
             </a:r>
             <a:endParaRPr lang="en-AU" dirty="0">
               <a:latin typeface="Arial" panose="020B0604020202020204" pitchFamily="34" charset="0"/>
@@ -8952,14 +8725,7 @@
                 <a:latin typeface="Lucida Sans" panose="020B0602030504020204" pitchFamily="34" charset="0"/>
                 <a:cs typeface="Arial" panose="020B0604020202020204" pitchFamily="34" charset="0"/>
               </a:rPr>
-              <a:t>% vagrant </a:t>
-            </a:r>
-            <a:r>
-              <a:rPr lang="en-AU" dirty="0" smtClean="0">
-                <a:latin typeface="Lucida Sans" panose="020B0602030504020204" pitchFamily="34" charset="0"/>
-                <a:cs typeface="Arial" panose="020B0604020202020204" pitchFamily="34" charset="0"/>
-              </a:rPr>
-              <a:t>up</a:t>
+              <a:t>% vagrant up</a:t>
             </a:r>
           </a:p>
           <a:p>
@@ -8978,17 +8744,7 @@
                 <a:latin typeface="Arial" panose="020B0604020202020204" pitchFamily="34" charset="0"/>
                 <a:cs typeface="Arial" panose="020B0604020202020204" pitchFamily="34" charset="0"/>
               </a:rPr>
-              <a:t>Coffee/Tea </a:t>
-            </a:r>
-            <a:r>
-              <a:rPr lang="en-AU" sz="2000" dirty="0" smtClean="0">
-                <a:solidFill>
-                  <a:srgbClr val="FF0000"/>
-                </a:solidFill>
-                <a:latin typeface="Arial" panose="020B0604020202020204" pitchFamily="34" charset="0"/>
-                <a:cs typeface="Arial" panose="020B0604020202020204" pitchFamily="34" charset="0"/>
-              </a:rPr>
-              <a:t>Break:</a:t>
+              <a:t>Coffee/Tea Break:</a:t>
             </a:r>
           </a:p>
           <a:p>
@@ -9129,8 +8885,10 @@
                 <a:latin typeface="Arial" panose="020B0604020202020204" pitchFamily="34" charset="0"/>
                 <a:cs typeface="Arial" panose="020B0604020202020204" pitchFamily="34" charset="0"/>
               </a:rPr>
-              <a:t>Coffee/Tea </a:t>
-            </a:r>
+              <a:t>Coffee/Tea Break:</a:t>
+            </a:r>
+          </a:p>
+          <a:p>
             <a:r>
               <a:rPr lang="en-AU" sz="2000" dirty="0" smtClean="0">
                 <a:solidFill>
@@ -9139,10 +8897,18 @@
                 <a:latin typeface="Arial" panose="020B0604020202020204" pitchFamily="34" charset="0"/>
                 <a:cs typeface="Arial" panose="020B0604020202020204" pitchFamily="34" charset="0"/>
               </a:rPr>
-              <a:t>Break:</a:t>
-            </a:r>
-          </a:p>
-          <a:p>
+              <a:t>This </a:t>
+            </a:r>
+            <a:r>
+              <a:rPr lang="en-AU" sz="2000" b="1" dirty="0" smtClean="0">
+                <a:solidFill>
+                  <a:srgbClr val="FF0000"/>
+                </a:solidFill>
+                <a:latin typeface="Arial" panose="020B0604020202020204" pitchFamily="34" charset="0"/>
+                <a:cs typeface="Arial" panose="020B0604020202020204" pitchFamily="34" charset="0"/>
+              </a:rPr>
+              <a:t>will take some time (UP to 60 MINUTES!)</a:t>
+            </a:r>
             <a:r>
               <a:rPr lang="en-AU" sz="2000" dirty="0" smtClean="0">
                 <a:solidFill>
@@ -9151,47 +8917,7 @@
                 <a:latin typeface="Arial" panose="020B0604020202020204" pitchFamily="34" charset="0"/>
                 <a:cs typeface="Arial" panose="020B0604020202020204" pitchFamily="34" charset="0"/>
               </a:rPr>
-              <a:t>This </a:t>
-            </a:r>
-            <a:r>
-              <a:rPr lang="en-AU" sz="2000" b="1" dirty="0" smtClean="0">
-                <a:solidFill>
-                  <a:srgbClr val="FF0000"/>
-                </a:solidFill>
-                <a:latin typeface="Arial" panose="020B0604020202020204" pitchFamily="34" charset="0"/>
-                <a:cs typeface="Arial" panose="020B0604020202020204" pitchFamily="34" charset="0"/>
-              </a:rPr>
-              <a:t>will take some </a:t>
-            </a:r>
-            <a:r>
-              <a:rPr lang="en-AU" sz="2000" b="1" dirty="0" smtClean="0">
-                <a:solidFill>
-                  <a:srgbClr val="FF0000"/>
-                </a:solidFill>
-                <a:latin typeface="Arial" panose="020B0604020202020204" pitchFamily="34" charset="0"/>
-                <a:cs typeface="Arial" panose="020B0604020202020204" pitchFamily="34" charset="0"/>
-              </a:rPr>
-              <a:t>time (UP to 60 MINUTES!)</a:t>
-            </a:r>
-            <a:r>
-              <a:rPr lang="en-AU" sz="2000" dirty="0" smtClean="0">
-                <a:solidFill>
-                  <a:srgbClr val="FF0000"/>
-                </a:solidFill>
-                <a:latin typeface="Arial" panose="020B0604020202020204" pitchFamily="34" charset="0"/>
-                <a:cs typeface="Arial" panose="020B0604020202020204" pitchFamily="34" charset="0"/>
-              </a:rPr>
-              <a:t> </a:t>
-            </a:r>
-            <a:r>
-              <a:rPr lang="en-AU" sz="2000" dirty="0" smtClean="0">
-                <a:solidFill>
-                  <a:srgbClr val="FF0000"/>
-                </a:solidFill>
-                <a:latin typeface="Arial" panose="020B0604020202020204" pitchFamily="34" charset="0"/>
-                <a:cs typeface="Arial" panose="020B0604020202020204" pitchFamily="34" charset="0"/>
-              </a:rPr>
-              <a:t>as it automatically downloading and configuring the base Ubuntu OS image that is used for your VM</a:t>
+              <a:t> as it automatically downloading and configuring the base Ubuntu OS image that is used for your VM</a:t>
             </a:r>
             <a:r>
               <a:rPr lang="en-AU" sz="2000" dirty="0" smtClean="0">
@@ -9200,16 +8926,7 @@
                 </a:solidFill>
                 <a:latin typeface="Lucida Sans" panose="020B0602030504020204" pitchFamily="34" charset="0"/>
               </a:rPr>
-              <a:t>.  It is dependent on your internet connection and laptop</a:t>
-            </a:r>
-            <a:r>
-              <a:rPr lang="en-AU" sz="2000" dirty="0" smtClean="0">
-                <a:solidFill>
-                  <a:srgbClr val="FF0000"/>
-                </a:solidFill>
-                <a:latin typeface="Lucida Sans" panose="020B0602030504020204" pitchFamily="34" charset="0"/>
-              </a:rPr>
-              <a:t>.</a:t>
+              <a:t>.  It is dependent on your internet connection and laptop.</a:t>
             </a:r>
           </a:p>
           <a:p>
@@ -9380,21 +9097,7 @@
                 <a:latin typeface="Arial" panose="020B0604020202020204" pitchFamily="34" charset="0"/>
                 <a:cs typeface="Arial" panose="020B0604020202020204" pitchFamily="34" charset="0"/>
               </a:rPr>
-              <a:t>Step 4: </a:t>
-            </a:r>
-            <a:r>
-              <a:rPr lang="en-AU" dirty="0" smtClean="0">
-                <a:latin typeface="Arial" panose="020B0604020202020204" pitchFamily="34" charset="0"/>
-                <a:cs typeface="Arial" panose="020B0604020202020204" pitchFamily="34" charset="0"/>
-              </a:rPr>
-              <a:t>Secure Shell </a:t>
-            </a:r>
-            <a:r>
-              <a:rPr lang="en-AU" dirty="0" smtClean="0">
-                <a:latin typeface="Arial" panose="020B0604020202020204" pitchFamily="34" charset="0"/>
-                <a:cs typeface="Arial" panose="020B0604020202020204" pitchFamily="34" charset="0"/>
-              </a:rPr>
-              <a:t>(SSH) is used to login to your VM.  This process of accessing you VM </a:t>
+              <a:t>Step 4: Secure Shell (SSH) is used to login to your VM.  This process of accessing you VM </a:t>
             </a:r>
           </a:p>
           <a:p>
@@ -9424,14 +9127,7 @@
                 <a:latin typeface="Lucida Sans" panose="020B0602030504020204" pitchFamily="34" charset="0"/>
                 <a:cs typeface="Arial" panose="020B0604020202020204" pitchFamily="34" charset="0"/>
               </a:rPr>
-              <a:t> </a:t>
-            </a:r>
-            <a:r>
-              <a:rPr lang="en-AU" dirty="0" smtClean="0">
-                <a:latin typeface="Lucida Sans" panose="020B0602030504020204" pitchFamily="34" charset="0"/>
-                <a:cs typeface="Arial" panose="020B0604020202020204" pitchFamily="34" charset="0"/>
-              </a:rPr>
-              <a:t>vagrant </a:t>
+              <a:t> vagrant </a:t>
             </a:r>
             <a:r>
               <a:rPr lang="en-AU" dirty="0" err="1" smtClean="0">
@@ -9765,6 +9461,21 @@
 </file>
 
 <file path=customXml/item1.xml><?xml version="1.0" encoding="utf-8"?>
+<?mso-contentType ?>
+<FormTemplates xmlns="http://schemas.microsoft.com/sharepoint/v3/contenttype/forms">
+  <Display>DocumentLibraryForm</Display>
+  <Edit>DocumentLibraryForm</Edit>
+  <New>DocumentLibraryForm</New>
+</FormTemplates>
+</file>
+
+<file path=customXml/item2.xml><?xml version="1.0" encoding="utf-8"?>
+<p:properties xmlns:p="http://schemas.microsoft.com/office/2006/metadata/properties" xmlns:xsi="http://www.w3.org/2001/XMLSchema-instance" xmlns:pc="http://schemas.microsoft.com/office/infopath/2007/PartnerControls">
+  <documentManagement/>
+</p:properties>
+</file>
+
+<file path=customXml/item3.xml><?xml version="1.0" encoding="utf-8"?>
 <ct:contentTypeSchema xmlns:ct="http://schemas.microsoft.com/office/2006/metadata/contentType" xmlns:ma="http://schemas.microsoft.com/office/2006/metadata/properties/metaAttributes" ct:_="" ma:_="" ma:contentTypeName="Document" ma:contentTypeID="0x0101000C3F0734F22D774883C052A360730DF9" ma:contentTypeVersion="7" ma:contentTypeDescription="Create a new document." ma:contentTypeScope="" ma:versionID="68dbab044d50f9bfa9580c1de6249254">
   <xsd:schema xmlns:xsd="http://www.w3.org/2001/XMLSchema" xmlns:xs="http://www.w3.org/2001/XMLSchema" xmlns:p="http://schemas.microsoft.com/office/2006/metadata/properties" xmlns:ns3="c0477a94-a81b-4865-9707-6c9300ae147f" xmlns:ns4="45fda36c-df07-4f55-9922-29409b58d9d3" targetNamespace="http://schemas.microsoft.com/office/2006/metadata/properties" ma:root="true" ma:fieldsID="ea92a476c86701b878abbd8645c4be93" ns3:_="" ns4:_="">
     <xsd:import namespace="c0477a94-a81b-4865-9707-6c9300ae147f"/>
@@ -9949,36 +9660,10 @@
 </ct:contentTypeSchema>
 </file>
 
-<file path=customXml/item2.xml><?xml version="1.0" encoding="utf-8"?>
-<p:properties xmlns:p="http://schemas.microsoft.com/office/2006/metadata/properties" xmlns:xsi="http://www.w3.org/2001/XMLSchema-instance" xmlns:pc="http://schemas.microsoft.com/office/infopath/2007/PartnerControls">
-  <documentManagement/>
-</p:properties>
-</file>
-
-<file path=customXml/item3.xml><?xml version="1.0" encoding="utf-8"?>
-<?mso-contentType ?>
-<FormTemplates xmlns="http://schemas.microsoft.com/sharepoint/v3/contenttype/forms">
-  <Display>DocumentLibraryForm</Display>
-  <Edit>DocumentLibraryForm</Edit>
-  <New>DocumentLibraryForm</New>
-</FormTemplates>
-</file>
-
 <file path=customXml/itemProps1.xml><?xml version="1.0" encoding="utf-8"?>
-<ds:datastoreItem xmlns:ds="http://schemas.openxmlformats.org/officeDocument/2006/customXml" ds:itemID="{328FAD76-43D1-414B-B6EC-7811CDF23869}">
+<ds:datastoreItem xmlns:ds="http://schemas.openxmlformats.org/officeDocument/2006/customXml" ds:itemID="{10127F0B-EA07-4AFF-8549-55D4D4284DC4}">
   <ds:schemaRefs>
-    <ds:schemaRef ds:uri="http://schemas.microsoft.com/office/2006/metadata/contentType"/>
-    <ds:schemaRef ds:uri="http://schemas.microsoft.com/office/2006/metadata/properties/metaAttributes"/>
-    <ds:schemaRef ds:uri="http://www.w3.org/2001/XMLSchema"/>
-    <ds:schemaRef ds:uri="http://schemas.microsoft.com/office/2006/metadata/properties"/>
-    <ds:schemaRef ds:uri="c0477a94-a81b-4865-9707-6c9300ae147f"/>
-    <ds:schemaRef ds:uri="45fda36c-df07-4f55-9922-29409b58d9d3"/>
-    <ds:schemaRef ds:uri="http://schemas.microsoft.com/office/2006/documentManagement/types"/>
-    <ds:schemaRef ds:uri="http://schemas.microsoft.com/office/infopath/2007/PartnerControls"/>
-    <ds:schemaRef ds:uri="http://schemas.openxmlformats.org/package/2006/metadata/core-properties"/>
-    <ds:schemaRef ds:uri="http://purl.org/dc/elements/1.1/"/>
-    <ds:schemaRef ds:uri="http://purl.org/dc/terms/"/>
-    <ds:schemaRef ds:uri="http://schemas.microsoft.com/internal/obd"/>
+    <ds:schemaRef ds:uri="http://schemas.microsoft.com/sharepoint/v3/contenttype/forms"/>
   </ds:schemaRefs>
 </ds:datastoreItem>
 </file>
@@ -10001,9 +9686,20 @@
 </file>
 
 <file path=customXml/itemProps3.xml><?xml version="1.0" encoding="utf-8"?>
-<ds:datastoreItem xmlns:ds="http://schemas.openxmlformats.org/officeDocument/2006/customXml" ds:itemID="{10127F0B-EA07-4AFF-8549-55D4D4284DC4}">
+<ds:datastoreItem xmlns:ds="http://schemas.openxmlformats.org/officeDocument/2006/customXml" ds:itemID="{328FAD76-43D1-414B-B6EC-7811CDF23869}">
   <ds:schemaRefs>
-    <ds:schemaRef ds:uri="http://schemas.microsoft.com/sharepoint/v3/contenttype/forms"/>
+    <ds:schemaRef ds:uri="http://schemas.microsoft.com/office/2006/metadata/contentType"/>
+    <ds:schemaRef ds:uri="http://schemas.microsoft.com/office/2006/metadata/properties/metaAttributes"/>
+    <ds:schemaRef ds:uri="http://www.w3.org/2001/XMLSchema"/>
+    <ds:schemaRef ds:uri="http://schemas.microsoft.com/office/2006/metadata/properties"/>
+    <ds:schemaRef ds:uri="c0477a94-a81b-4865-9707-6c9300ae147f"/>
+    <ds:schemaRef ds:uri="45fda36c-df07-4f55-9922-29409b58d9d3"/>
+    <ds:schemaRef ds:uri="http://schemas.microsoft.com/office/2006/documentManagement/types"/>
+    <ds:schemaRef ds:uri="http://schemas.microsoft.com/office/infopath/2007/PartnerControls"/>
+    <ds:schemaRef ds:uri="http://schemas.openxmlformats.org/package/2006/metadata/core-properties"/>
+    <ds:schemaRef ds:uri="http://purl.org/dc/elements/1.1/"/>
+    <ds:schemaRef ds:uri="http://purl.org/dc/terms/"/>
+    <ds:schemaRef ds:uri="http://schemas.microsoft.com/internal/obd"/>
   </ds:schemaRefs>
 </ds:datastoreItem>
 </file>
</xml_diff>

<commit_message>
up date git install for windows
</commit_message>
<xml_diff>
--- a/VM_instructions.pptx
+++ b/VM_instructions.pptx
@@ -6691,7 +6691,21 @@
                 <a:latin typeface="Arial" panose="020B0604020202020204" pitchFamily="34" charset="0"/>
                 <a:cs typeface="Arial" panose="020B0604020202020204" pitchFamily="34" charset="0"/>
               </a:rPr>
-              <a:t> notebook server is running on your VM you can then open a browser and copy and paste the URL that starts with </a:t>
+              <a:t> notebook server is running on your VM you can then open a browser and </a:t>
+            </a:r>
+            <a:r>
+              <a:rPr lang="en-AU" dirty="0" smtClean="0">
+                <a:latin typeface="Arial" panose="020B0604020202020204" pitchFamily="34" charset="0"/>
+                <a:cs typeface="Arial" panose="020B0604020202020204" pitchFamily="34" charset="0"/>
+              </a:rPr>
+              <a:t>copy then </a:t>
+            </a:r>
+            <a:r>
+              <a:rPr lang="en-AU" dirty="0" smtClean="0">
+                <a:latin typeface="Arial" panose="020B0604020202020204" pitchFamily="34" charset="0"/>
+                <a:cs typeface="Arial" panose="020B0604020202020204" pitchFamily="34" charset="0"/>
+              </a:rPr>
+              <a:t>paste the URL that starts with </a:t>
             </a:r>
             <a:r>
               <a:rPr lang="en-AU" dirty="0" smtClean="0">
@@ -9672,15 +9686,15 @@
 <ds:datastoreItem xmlns:ds="http://schemas.openxmlformats.org/officeDocument/2006/customXml" ds:itemID="{DC2CE541-9384-4F78-A2DC-081CEDD5EAE8}">
   <ds:schemaRefs>
     <ds:schemaRef ds:uri="http://purl.org/dc/elements/1.1/"/>
+    <ds:schemaRef ds:uri="45fda36c-df07-4f55-9922-29409b58d9d3"/>
+    <ds:schemaRef ds:uri="c0477a94-a81b-4865-9707-6c9300ae147f"/>
     <ds:schemaRef ds:uri="http://schemas.microsoft.com/office/2006/metadata/properties"/>
-    <ds:schemaRef ds:uri="c0477a94-a81b-4865-9707-6c9300ae147f"/>
-    <ds:schemaRef ds:uri="http://schemas.microsoft.com/office/2006/documentManagement/types"/>
     <ds:schemaRef ds:uri="http://purl.org/dc/terms/"/>
     <ds:schemaRef ds:uri="http://schemas.openxmlformats.org/package/2006/metadata/core-properties"/>
-    <ds:schemaRef ds:uri="http://purl.org/dc/dcmitype/"/>
-    <ds:schemaRef ds:uri="45fda36c-df07-4f55-9922-29409b58d9d3"/>
+    <ds:schemaRef ds:uri="http://schemas.microsoft.com/office/2006/documentManagement/types"/>
     <ds:schemaRef ds:uri="http://schemas.microsoft.com/office/infopath/2007/PartnerControls"/>
     <ds:schemaRef ds:uri="http://www.w3.org/XML/1998/namespace"/>
+    <ds:schemaRef ds:uri="http://purl.org/dc/dcmitype/"/>
   </ds:schemaRefs>
 </ds:datastoreItem>
 </file>

</xml_diff>

<commit_message>
update ppt and Vagrantfiel
</commit_message>
<xml_diff>
--- a/VM_instructions.pptx
+++ b/VM_instructions.pptx
@@ -9,14 +9,15 @@
     <p:sldId id="257" r:id="rId6"/>
     <p:sldId id="258" r:id="rId7"/>
     <p:sldId id="259" r:id="rId8"/>
-    <p:sldId id="260" r:id="rId9"/>
-    <p:sldId id="261" r:id="rId10"/>
-    <p:sldId id="262" r:id="rId11"/>
-    <p:sldId id="265" r:id="rId12"/>
-    <p:sldId id="263" r:id="rId13"/>
-    <p:sldId id="266" r:id="rId14"/>
-    <p:sldId id="267" r:id="rId15"/>
-    <p:sldId id="264" r:id="rId16"/>
+    <p:sldId id="268" r:id="rId9"/>
+    <p:sldId id="260" r:id="rId10"/>
+    <p:sldId id="261" r:id="rId11"/>
+    <p:sldId id="262" r:id="rId12"/>
+    <p:sldId id="265" r:id="rId13"/>
+    <p:sldId id="263" r:id="rId14"/>
+    <p:sldId id="266" r:id="rId15"/>
+    <p:sldId id="267" r:id="rId16"/>
+    <p:sldId id="264" r:id="rId17"/>
   </p:sldIdLst>
   <p:sldSz cx="12192000" cy="6858000"/>
   <p:notesSz cx="6858000" cy="9144000"/>
@@ -123,6 +124,18 @@
 </p:presentation>
 </file>
 
+<file path=ppt/commentAuthors.xml><?xml version="1.0" encoding="utf-8"?>
+<p:cmAuthorLst xmlns:a="http://schemas.openxmlformats.org/drawingml/2006/main" xmlns:r="http://schemas.openxmlformats.org/officeDocument/2006/relationships" xmlns:p="http://schemas.openxmlformats.org/presentationml/2006/main">
+  <p:cmAuthor id="1" name="Chris Bording" initials="CB" lastIdx="0" clrIdx="0">
+    <p:extLst>
+      <p:ext uri="{19B8F6BF-5375-455C-9EA6-DF929625EA0E}">
+        <p15:presenceInfo xmlns:p15="http://schemas.microsoft.com/office/powerpoint/2012/main" userId="S-1-5-21-905479342-1514983418-1536837410-222023" providerId="AD"/>
+      </p:ext>
+    </p:extLst>
+  </p:cmAuthor>
+</p:cmAuthorLst>
+</file>
+
 <file path=ppt/slideLayouts/slideLayout1.xml><?xml version="1.0" encoding="utf-8"?>
 <p:sldLayout xmlns:a="http://schemas.openxmlformats.org/drawingml/2006/main" xmlns:r="http://schemas.openxmlformats.org/officeDocument/2006/relationships" xmlns:p="http://schemas.openxmlformats.org/presentationml/2006/main" type="title" preserve="1">
   <p:cSld name="Title Slide">
@@ -294,7 +307,7 @@
           <a:p>
             <a:fld id="{A97D098C-81A2-4741-849D-B3F04101F1CD}" type="datetimeFigureOut">
               <a:rPr lang="en-AU" smtClean="0"/>
-              <a:t>24/02/2021</a:t>
+              <a:t>1/03/2021</a:t>
             </a:fld>
             <a:endParaRPr lang="en-AU"/>
           </a:p>
@@ -609,7 +622,7 @@
           <a:p>
             <a:fld id="{A97D098C-81A2-4741-849D-B3F04101F1CD}" type="datetimeFigureOut">
               <a:rPr lang="en-AU" smtClean="0"/>
-              <a:t>24/02/2021</a:t>
+              <a:t>1/03/2021</a:t>
             </a:fld>
             <a:endParaRPr lang="en-AU"/>
           </a:p>
@@ -831,7 +844,7 @@
           <a:p>
             <a:fld id="{A97D098C-81A2-4741-849D-B3F04101F1CD}" type="datetimeFigureOut">
               <a:rPr lang="en-AU" smtClean="0"/>
-              <a:t>24/02/2021</a:t>
+              <a:t>1/03/2021</a:t>
             </a:fld>
             <a:endParaRPr lang="en-AU"/>
           </a:p>
@@ -1122,7 +1135,7 @@
           <a:p>
             <a:fld id="{A97D098C-81A2-4741-849D-B3F04101F1CD}" type="datetimeFigureOut">
               <a:rPr lang="en-AU" smtClean="0"/>
-              <a:t>24/02/2021</a:t>
+              <a:t>1/03/2021</a:t>
             </a:fld>
             <a:endParaRPr lang="en-AU"/>
           </a:p>
@@ -1576,7 +1589,7 @@
           <a:p>
             <a:fld id="{A97D098C-81A2-4741-849D-B3F04101F1CD}" type="datetimeFigureOut">
               <a:rPr lang="en-AU" smtClean="0"/>
-              <a:t>24/02/2021</a:t>
+              <a:t>1/03/2021</a:t>
             </a:fld>
             <a:endParaRPr lang="en-AU"/>
           </a:p>
@@ -2152,7 +2165,7 @@
           <a:p>
             <a:fld id="{A97D098C-81A2-4741-849D-B3F04101F1CD}" type="datetimeFigureOut">
               <a:rPr lang="en-AU" smtClean="0"/>
-              <a:t>24/02/2021</a:t>
+              <a:t>1/03/2021</a:t>
             </a:fld>
             <a:endParaRPr lang="en-AU"/>
           </a:p>
@@ -3013,7 +3026,7 @@
           <a:p>
             <a:fld id="{A97D098C-81A2-4741-849D-B3F04101F1CD}" type="datetimeFigureOut">
               <a:rPr lang="en-AU" smtClean="0"/>
-              <a:t>24/02/2021</a:t>
+              <a:t>1/03/2021</a:t>
             </a:fld>
             <a:endParaRPr lang="en-AU"/>
           </a:p>
@@ -3218,7 +3231,7 @@
           <a:p>
             <a:fld id="{A97D098C-81A2-4741-849D-B3F04101F1CD}" type="datetimeFigureOut">
               <a:rPr lang="en-AU" smtClean="0"/>
-              <a:t>24/02/2021</a:t>
+              <a:t>1/03/2021</a:t>
             </a:fld>
             <a:endParaRPr lang="en-AU"/>
           </a:p>
@@ -3432,7 +3445,7 @@
           <a:p>
             <a:fld id="{A97D098C-81A2-4741-849D-B3F04101F1CD}" type="datetimeFigureOut">
               <a:rPr lang="en-AU" smtClean="0"/>
-              <a:t>24/02/2021</a:t>
+              <a:t>1/03/2021</a:t>
             </a:fld>
             <a:endParaRPr lang="en-AU"/>
           </a:p>
@@ -3637,7 +3650,7 @@
           <a:p>
             <a:fld id="{A97D098C-81A2-4741-849D-B3F04101F1CD}" type="datetimeFigureOut">
               <a:rPr lang="en-AU" smtClean="0"/>
-              <a:t>24/02/2021</a:t>
+              <a:t>1/03/2021</a:t>
             </a:fld>
             <a:endParaRPr lang="en-AU"/>
           </a:p>
@@ -3917,7 +3930,7 @@
           <a:p>
             <a:fld id="{A97D098C-81A2-4741-849D-B3F04101F1CD}" type="datetimeFigureOut">
               <a:rPr lang="en-AU" smtClean="0"/>
-              <a:t>24/02/2021</a:t>
+              <a:t>1/03/2021</a:t>
             </a:fld>
             <a:endParaRPr lang="en-AU"/>
           </a:p>
@@ -4184,7 +4197,7 @@
           <a:p>
             <a:fld id="{A97D098C-81A2-4741-849D-B3F04101F1CD}" type="datetimeFigureOut">
               <a:rPr lang="en-AU" smtClean="0"/>
-              <a:t>24/02/2021</a:t>
+              <a:t>1/03/2021</a:t>
             </a:fld>
             <a:endParaRPr lang="en-AU"/>
           </a:p>
@@ -4599,7 +4612,7 @@
           <a:p>
             <a:fld id="{A97D098C-81A2-4741-849D-B3F04101F1CD}" type="datetimeFigureOut">
               <a:rPr lang="en-AU" smtClean="0"/>
-              <a:t>24/02/2021</a:t>
+              <a:t>1/03/2021</a:t>
             </a:fld>
             <a:endParaRPr lang="en-AU"/>
           </a:p>
@@ -4747,7 +4760,7 @@
           <a:p>
             <a:fld id="{A97D098C-81A2-4741-849D-B3F04101F1CD}" type="datetimeFigureOut">
               <a:rPr lang="en-AU" smtClean="0"/>
-              <a:t>24/02/2021</a:t>
+              <a:t>1/03/2021</a:t>
             </a:fld>
             <a:endParaRPr lang="en-AU"/>
           </a:p>
@@ -4872,7 +4885,7 @@
           <a:p>
             <a:fld id="{A97D098C-81A2-4741-849D-B3F04101F1CD}" type="datetimeFigureOut">
               <a:rPr lang="en-AU" smtClean="0"/>
-              <a:t>24/02/2021</a:t>
+              <a:t>1/03/2021</a:t>
             </a:fld>
             <a:endParaRPr lang="en-AU"/>
           </a:p>
@@ -5151,7 +5164,7 @@
           <a:p>
             <a:fld id="{A97D098C-81A2-4741-849D-B3F04101F1CD}" type="datetimeFigureOut">
               <a:rPr lang="en-AU" smtClean="0"/>
-              <a:t>24/02/2021</a:t>
+              <a:t>1/03/2021</a:t>
             </a:fld>
             <a:endParaRPr lang="en-AU"/>
           </a:p>
@@ -5466,7 +5479,7 @@
           <a:p>
             <a:fld id="{A97D098C-81A2-4741-849D-B3F04101F1CD}" type="datetimeFigureOut">
               <a:rPr lang="en-AU" smtClean="0"/>
-              <a:t>24/02/2021</a:t>
+              <a:t>1/03/2021</a:t>
             </a:fld>
             <a:endParaRPr lang="en-AU"/>
           </a:p>
@@ -5719,7 +5732,7 @@
           <a:p>
             <a:fld id="{A97D098C-81A2-4741-849D-B3F04101F1CD}" type="datetimeFigureOut">
               <a:rPr lang="en-AU" smtClean="0"/>
-              <a:t>24/02/2021</a:t>
+              <a:t>1/03/2021</a:t>
             </a:fld>
             <a:endParaRPr lang="en-AU"/>
           </a:p>
@@ -6289,7 +6302,7 @@
               <a:rPr lang="en-AU" dirty="0" smtClean="0">
                 <a:latin typeface="Lucida Sans Typewriter" panose="020B0509030504030204" pitchFamily="49" charset="0"/>
               </a:rPr>
-              <a:t>Data1001</a:t>
+              <a:t>Data1001 and stat1400</a:t>
             </a:r>
             <a:endParaRPr lang="en-AU" dirty="0">
               <a:latin typeface="Lucida Sans Typewriter" panose="020B0509030504030204" pitchFamily="49" charset="0"/>
@@ -6346,20 +6359,14 @@
         </p:nvSpPr>
         <p:spPr/>
         <p:txBody>
-          <a:bodyPr/>
+          <a:bodyPr>
+            <a:normAutofit/>
+          </a:bodyPr>
           <a:lstStyle/>
           <a:p>
             <a:r>
               <a:rPr lang="en-AU" dirty="0" smtClean="0"/>
-              <a:t>Starting the </a:t>
-            </a:r>
-            <a:r>
-              <a:rPr lang="en-AU" dirty="0" err="1" smtClean="0"/>
-              <a:t>Jupyter</a:t>
-            </a:r>
-            <a:r>
-              <a:rPr lang="en-AU" dirty="0" smtClean="0"/>
-              <a:t> Notebook Server</a:t>
+              <a:t>Accessing your VM</a:t>
             </a:r>
             <a:endParaRPr lang="en-AU" dirty="0"/>
           </a:p>
@@ -6367,14 +6374,14 @@
       </p:sp>
       <p:sp>
         <p:nvSpPr>
-          <p:cNvPr id="3" name="TextBox 2"/>
+          <p:cNvPr id="5" name="TextBox 4"/>
           <p:cNvSpPr txBox="1"/>
           <p:nvPr/>
         </p:nvSpPr>
         <p:spPr>
           <a:xfrm>
-            <a:off x="1287312" y="1782146"/>
-            <a:ext cx="9417963" cy="1200329"/>
+            <a:off x="1337805" y="1709350"/>
+            <a:ext cx="9516388" cy="923330"/>
           </a:xfrm>
           <a:prstGeom prst="rect">
             <a:avLst/>
@@ -6392,169 +6399,58 @@
                 <a:latin typeface="Arial" panose="020B0604020202020204" pitchFamily="34" charset="0"/>
                 <a:cs typeface="Arial" panose="020B0604020202020204" pitchFamily="34" charset="0"/>
               </a:rPr>
-              <a:t>Step </a:t>
-            </a:r>
-            <a:r>
-              <a:rPr lang="en-AU" dirty="0">
-                <a:latin typeface="Arial" panose="020B0604020202020204" pitchFamily="34" charset="0"/>
-                <a:cs typeface="Arial" panose="020B0604020202020204" pitchFamily="34" charset="0"/>
-              </a:rPr>
-              <a:t>5</a:t>
-            </a:r>
+              <a:t>Step 4: Secure Shell (SSH) is used to login to your VM.  This process of accessing you VM </a:t>
+            </a:r>
+          </a:p>
+          <a:p>
             <a:r>
               <a:rPr lang="en-AU" dirty="0" smtClean="0">
                 <a:latin typeface="Arial" panose="020B0604020202020204" pitchFamily="34" charset="0"/>
                 <a:cs typeface="Arial" panose="020B0604020202020204" pitchFamily="34" charset="0"/>
               </a:rPr>
-              <a:t>: Starting the </a:t>
-            </a:r>
-            <a:r>
-              <a:rPr lang="en-AU" dirty="0" err="1" smtClean="0">
-                <a:latin typeface="Arial" panose="020B0604020202020204" pitchFamily="34" charset="0"/>
-                <a:cs typeface="Arial" panose="020B0604020202020204" pitchFamily="34" charset="0"/>
-              </a:rPr>
-              <a:t>jupyter</a:t>
-            </a:r>
-            <a:r>
-              <a:rPr lang="en-AU" dirty="0" smtClean="0">
-                <a:latin typeface="Arial" panose="020B0604020202020204" pitchFamily="34" charset="0"/>
-                <a:cs typeface="Arial" panose="020B0604020202020204" pitchFamily="34" charset="0"/>
-              </a:rPr>
-              <a:t> notebook server </a:t>
-            </a:r>
-            <a:r>
-              <a:rPr lang="en-AU" dirty="0">
-                <a:latin typeface="Arial" panose="020B0604020202020204" pitchFamily="34" charset="0"/>
-                <a:cs typeface="Arial" panose="020B0604020202020204" pitchFamily="34" charset="0"/>
-              </a:rPr>
-              <a:t>your VM.  </a:t>
-            </a:r>
-            <a:r>
-              <a:rPr lang="en-AU" dirty="0" smtClean="0">
-                <a:latin typeface="Arial" panose="020B0604020202020204" pitchFamily="34" charset="0"/>
-                <a:cs typeface="Arial" panose="020B0604020202020204" pitchFamily="34" charset="0"/>
-              </a:rPr>
-              <a:t>From the command line on your VM</a:t>
-            </a:r>
-          </a:p>
-          <a:p>
-            <a:r>
-              <a:rPr lang="en-AU" dirty="0">
-                <a:latin typeface="Arial" panose="020B0604020202020204" pitchFamily="34" charset="0"/>
-                <a:cs typeface="Arial" panose="020B0604020202020204" pitchFamily="34" charset="0"/>
-              </a:rPr>
-              <a:t>	</a:t>
-            </a:r>
-            <a:r>
-              <a:rPr lang="en-AU" dirty="0" smtClean="0">
-                <a:latin typeface="Arial" panose="020B0604020202020204" pitchFamily="34" charset="0"/>
-                <a:cs typeface="Arial" panose="020B0604020202020204" pitchFamily="34" charset="0"/>
-              </a:rPr>
-              <a:t>the command to start the </a:t>
-            </a:r>
-            <a:r>
-              <a:rPr lang="en-AU" dirty="0" err="1" smtClean="0">
-                <a:latin typeface="Arial" panose="020B0604020202020204" pitchFamily="34" charset="0"/>
-                <a:cs typeface="Arial" panose="020B0604020202020204" pitchFamily="34" charset="0"/>
-              </a:rPr>
-              <a:t>jupyter</a:t>
-            </a:r>
-            <a:r>
-              <a:rPr lang="en-AU" dirty="0" smtClean="0">
-                <a:latin typeface="Arial" panose="020B0604020202020204" pitchFamily="34" charset="0"/>
-                <a:cs typeface="Arial" panose="020B0604020202020204" pitchFamily="34" charset="0"/>
-              </a:rPr>
-              <a:t> notebook server is:</a:t>
-            </a:r>
-          </a:p>
-          <a:p>
-            <a:r>
-              <a:rPr lang="en-AU" dirty="0">
-                <a:latin typeface="Arial" panose="020B0604020202020204" pitchFamily="34" charset="0"/>
-                <a:cs typeface="Arial" panose="020B0604020202020204" pitchFamily="34" charset="0"/>
-              </a:rPr>
-              <a:t> </a:t>
-            </a:r>
-            <a:r>
-              <a:rPr lang="en-AU" dirty="0" smtClean="0">
-                <a:latin typeface="Arial" panose="020B0604020202020204" pitchFamily="34" charset="0"/>
-                <a:cs typeface="Arial" panose="020B0604020202020204" pitchFamily="34" charset="0"/>
-              </a:rPr>
-              <a:t>  &gt; </a:t>
-            </a:r>
-            <a:r>
-              <a:rPr lang="en-AU" dirty="0" err="1" smtClean="0">
-                <a:latin typeface="Arial" panose="020B0604020202020204" pitchFamily="34" charset="0"/>
-                <a:cs typeface="Arial" panose="020B0604020202020204" pitchFamily="34" charset="0"/>
-              </a:rPr>
-              <a:t>juptyer</a:t>
-            </a:r>
-            <a:r>
-              <a:rPr lang="en-AU" dirty="0" smtClean="0">
-                <a:latin typeface="Arial" panose="020B0604020202020204" pitchFamily="34" charset="0"/>
-                <a:cs typeface="Arial" panose="020B0604020202020204" pitchFamily="34" charset="0"/>
-              </a:rPr>
-              <a:t> notebook  --</a:t>
-            </a:r>
-            <a:r>
-              <a:rPr lang="en-AU" dirty="0" err="1" smtClean="0">
-                <a:latin typeface="Arial" panose="020B0604020202020204" pitchFamily="34" charset="0"/>
-                <a:cs typeface="Arial" panose="020B0604020202020204" pitchFamily="34" charset="0"/>
-              </a:rPr>
-              <a:t>ip</a:t>
-            </a:r>
-            <a:r>
-              <a:rPr lang="en-AU" dirty="0" smtClean="0">
-                <a:latin typeface="Arial" panose="020B0604020202020204" pitchFamily="34" charset="0"/>
-                <a:cs typeface="Arial" panose="020B0604020202020204" pitchFamily="34" charset="0"/>
-              </a:rPr>
-              <a:t>=0.0.0.0 --no-browser</a:t>
+              <a:t>has been greatly simplified with Vagrant.  The command is:</a:t>
             </a:r>
             <a:endParaRPr lang="en-AU" dirty="0">
-              <a:latin typeface="Lucida Sans" panose="020B0602030504020204" pitchFamily="34" charset="0"/>
+              <a:latin typeface="Arial" panose="020B0604020202020204" pitchFamily="34" charset="0"/>
               <a:cs typeface="Arial" panose="020B0604020202020204" pitchFamily="34" charset="0"/>
             </a:endParaRPr>
           </a:p>
           <a:p>
-            <a:r>
-              <a:rPr lang="en-AU" dirty="0" smtClean="0"/>
-              <a:t>   </a:t>
+            <a:pPr lvl="1"/>
+            <a:r>
+              <a:rPr lang="en-AU" dirty="0">
+                <a:latin typeface="Lucida Sans" panose="020B0602030504020204" pitchFamily="34" charset="0"/>
+                <a:cs typeface="Arial" panose="020B0604020202020204" pitchFamily="34" charset="0"/>
+              </a:rPr>
+              <a:t>&gt;</a:t>
             </a:r>
             <a:r>
               <a:rPr lang="en-AU" dirty="0" smtClean="0">
-                <a:solidFill>
-                  <a:srgbClr val="FFFF00"/>
-                </a:solidFill>
-              </a:rPr>
-              <a:t>NOTE: there are 2 dashes before “</a:t>
+                <a:latin typeface="Lucida Sans" panose="020B0602030504020204" pitchFamily="34" charset="0"/>
+                <a:cs typeface="Arial" panose="020B0604020202020204" pitchFamily="34" charset="0"/>
+              </a:rPr>
+              <a:t> vagrant </a:t>
             </a:r>
             <a:r>
               <a:rPr lang="en-AU" dirty="0" err="1" smtClean="0">
-                <a:solidFill>
-                  <a:srgbClr val="FFFF00"/>
-                </a:solidFill>
-              </a:rPr>
-              <a:t>ip</a:t>
+                <a:latin typeface="Lucida Sans" panose="020B0602030504020204" pitchFamily="34" charset="0"/>
+                <a:cs typeface="Arial" panose="020B0604020202020204" pitchFamily="34" charset="0"/>
+              </a:rPr>
+              <a:t>ssh</a:t>
             </a:r>
             <a:r>
               <a:rPr lang="en-AU" dirty="0" smtClean="0">
-                <a:solidFill>
-                  <a:srgbClr val="FFFF00"/>
-                </a:solidFill>
-              </a:rPr>
-              <a:t>” and “no-browser”</a:t>
-            </a:r>
-            <a:endParaRPr lang="en-AU" dirty="0">
-              <a:solidFill>
-                <a:srgbClr val="FFFF00"/>
-              </a:solidFill>
-            </a:endParaRPr>
+                <a:latin typeface="Lucida Sans" panose="020B0602030504020204" pitchFamily="34" charset="0"/>
+                <a:cs typeface="Arial" panose="020B0604020202020204" pitchFamily="34" charset="0"/>
+              </a:rPr>
+              <a:t> </a:t>
+            </a:r>
           </a:p>
         </p:txBody>
       </p:sp>
       <p:pic>
         <p:nvPicPr>
-          <p:cNvPr id="4" name="Picture 3"/>
+          <p:cNvPr id="3" name="Picture 2"/>
           <p:cNvPicPr>
             <a:picLocks noChangeAspect="1"/>
           </p:cNvPicPr>
@@ -6574,8 +6470,8 @@
         </p:blipFill>
         <p:spPr>
           <a:xfrm>
-            <a:off x="1287312" y="2982476"/>
-            <a:ext cx="9330925" cy="2439686"/>
+            <a:off x="1601967" y="2632680"/>
+            <a:ext cx="8988064" cy="3133638"/>
           </a:xfrm>
           <a:prstGeom prst="rect">
             <a:avLst/>
@@ -6585,7 +6481,7 @@
     </p:spTree>
     <p:extLst>
       <p:ext uri="{BB962C8B-B14F-4D97-AF65-F5344CB8AC3E}">
-        <p14:creationId xmlns:p14="http://schemas.microsoft.com/office/powerpoint/2010/main" val="1246425237"/>
+        <p14:creationId xmlns:p14="http://schemas.microsoft.com/office/powerpoint/2010/main" val="14571371"/>
       </p:ext>
     </p:extLst>
   </p:cSld>
@@ -6636,7 +6532,7 @@
           <a:p>
             <a:r>
               <a:rPr lang="en-AU" dirty="0" smtClean="0"/>
-              <a:t>Open the </a:t>
+              <a:t>Starting the </a:t>
             </a:r>
             <a:r>
               <a:rPr lang="en-AU" dirty="0" err="1" smtClean="0"/>
@@ -6644,7 +6540,7 @@
             </a:r>
             <a:r>
               <a:rPr lang="en-AU" dirty="0" smtClean="0"/>
-              <a:t> Notebook Server on a browser</a:t>
+              <a:t> Notebook Server</a:t>
             </a:r>
             <a:endParaRPr lang="en-AU" dirty="0"/>
           </a:p>
@@ -6658,8 +6554,8 @@
         </p:nvSpPr>
         <p:spPr>
           <a:xfrm>
-            <a:off x="1276582" y="1869255"/>
-            <a:ext cx="9638835" cy="3693319"/>
+            <a:off x="1287312" y="1782146"/>
+            <a:ext cx="9417963" cy="1200329"/>
           </a:xfrm>
           <a:prstGeom prst="rect">
             <a:avLst/>
@@ -6667,7 +6563,7 @@
           <a:noFill/>
         </p:spPr>
         <p:txBody>
-          <a:bodyPr wrap="square" rtlCol="0">
+          <a:bodyPr wrap="none" rtlCol="0">
             <a:spAutoFit/>
           </a:bodyPr>
           <a:lstStyle/>
@@ -6677,7 +6573,21 @@
                 <a:latin typeface="Arial" panose="020B0604020202020204" pitchFamily="34" charset="0"/>
                 <a:cs typeface="Arial" panose="020B0604020202020204" pitchFamily="34" charset="0"/>
               </a:rPr>
-              <a:t>Step 6: Once the </a:t>
+              <a:t>Step </a:t>
+            </a:r>
+            <a:r>
+              <a:rPr lang="en-AU" dirty="0">
+                <a:latin typeface="Arial" panose="020B0604020202020204" pitchFamily="34" charset="0"/>
+                <a:cs typeface="Arial" panose="020B0604020202020204" pitchFamily="34" charset="0"/>
+              </a:rPr>
+              <a:t>5</a:t>
+            </a:r>
+            <a:r>
+              <a:rPr lang="en-AU" dirty="0" smtClean="0">
+                <a:latin typeface="Arial" panose="020B0604020202020204" pitchFamily="34" charset="0"/>
+                <a:cs typeface="Arial" panose="020B0604020202020204" pitchFamily="34" charset="0"/>
+              </a:rPr>
+              <a:t>: Starting the </a:t>
             </a:r>
             <a:r>
               <a:rPr lang="en-AU" dirty="0" err="1" smtClean="0">
@@ -6691,30 +6601,54 @@
                 <a:latin typeface="Arial" panose="020B0604020202020204" pitchFamily="34" charset="0"/>
                 <a:cs typeface="Arial" panose="020B0604020202020204" pitchFamily="34" charset="0"/>
               </a:rPr>
-              <a:t> notebook server is running on your VM you can then open a browser and </a:t>
+              <a:t> notebook server </a:t>
+            </a:r>
+            <a:r>
+              <a:rPr lang="en-AU" dirty="0">
+                <a:latin typeface="Arial" panose="020B0604020202020204" pitchFamily="34" charset="0"/>
+                <a:cs typeface="Arial" panose="020B0604020202020204" pitchFamily="34" charset="0"/>
+              </a:rPr>
+              <a:t>your VM.  </a:t>
             </a:r>
             <a:r>
               <a:rPr lang="en-AU" dirty="0" smtClean="0">
                 <a:latin typeface="Arial" panose="020B0604020202020204" pitchFamily="34" charset="0"/>
                 <a:cs typeface="Arial" panose="020B0604020202020204" pitchFamily="34" charset="0"/>
               </a:rPr>
-              <a:t>copy then </a:t>
+              <a:t>From the command line on your VM</a:t>
+            </a:r>
+          </a:p>
+          <a:p>
+            <a:r>
+              <a:rPr lang="en-AU" dirty="0">
+                <a:latin typeface="Arial" panose="020B0604020202020204" pitchFamily="34" charset="0"/>
+                <a:cs typeface="Arial" panose="020B0604020202020204" pitchFamily="34" charset="0"/>
+              </a:rPr>
+              <a:t>	</a:t>
             </a:r>
             <a:r>
               <a:rPr lang="en-AU" dirty="0" smtClean="0">
                 <a:latin typeface="Arial" panose="020B0604020202020204" pitchFamily="34" charset="0"/>
                 <a:cs typeface="Arial" panose="020B0604020202020204" pitchFamily="34" charset="0"/>
               </a:rPr>
-              <a:t>paste the URL that starts with </a:t>
+              <a:t>the command to start the </a:t>
+            </a:r>
+            <a:r>
+              <a:rPr lang="en-AU" dirty="0" err="1" smtClean="0">
+                <a:latin typeface="Arial" panose="020B0604020202020204" pitchFamily="34" charset="0"/>
+                <a:cs typeface="Arial" panose="020B0604020202020204" pitchFamily="34" charset="0"/>
+              </a:rPr>
+              <a:t>jupyter</a:t>
             </a:r>
             <a:r>
               <a:rPr lang="en-AU" dirty="0" smtClean="0">
                 <a:latin typeface="Arial" panose="020B0604020202020204" pitchFamily="34" charset="0"/>
                 <a:cs typeface="Arial" panose="020B0604020202020204" pitchFamily="34" charset="0"/>
-                <a:hlinkClick r:id="rId2"/>
-              </a:rPr>
-              <a:t>http://127.0.0.1:8888/?token=...</a:t>
-            </a:r>
+              </a:rPr>
+              <a:t> notebook server is:</a:t>
+            </a:r>
+          </a:p>
+          <a:p>
             <a:r>
               <a:rPr lang="en-AU" dirty="0">
                 <a:latin typeface="Arial" panose="020B0604020202020204" pitchFamily="34" charset="0"/>
@@ -6727,129 +6661,88 @@
                 <a:latin typeface="Arial" panose="020B0604020202020204" pitchFamily="34" charset="0"/>
                 <a:cs typeface="Arial" panose="020B0604020202020204" pitchFamily="34" charset="0"/>
               </a:rPr>
-              <a:t>into </a:t>
-            </a:r>
-          </a:p>
-          <a:p>
+              <a:t>  &gt; </a:t>
+            </a:r>
+            <a:r>
+              <a:rPr lang="en-AU" dirty="0" err="1" smtClean="0">
+                <a:latin typeface="Arial" panose="020B0604020202020204" pitchFamily="34" charset="0"/>
+                <a:cs typeface="Arial" panose="020B0604020202020204" pitchFamily="34" charset="0"/>
+              </a:rPr>
+              <a:t>juptyer</a:t>
+            </a:r>
             <a:r>
               <a:rPr lang="en-AU" dirty="0" smtClean="0">
                 <a:latin typeface="Arial" panose="020B0604020202020204" pitchFamily="34" charset="0"/>
                 <a:cs typeface="Arial" panose="020B0604020202020204" pitchFamily="34" charset="0"/>
               </a:rPr>
-              <a:t>your address bar. </a:t>
-            </a:r>
-          </a:p>
-          <a:p>
-            <a:endParaRPr lang="en-AU" dirty="0" smtClean="0">
-              <a:latin typeface="Arial" panose="020B0604020202020204" pitchFamily="34" charset="0"/>
+              <a:t> notebook  --</a:t>
+            </a:r>
+            <a:r>
+              <a:rPr lang="en-AU" dirty="0" err="1" smtClean="0">
+                <a:latin typeface="Arial" panose="020B0604020202020204" pitchFamily="34" charset="0"/>
+                <a:cs typeface="Arial" panose="020B0604020202020204" pitchFamily="34" charset="0"/>
+              </a:rPr>
+              <a:t>ip</a:t>
+            </a:r>
+            <a:r>
+              <a:rPr lang="en-AU" dirty="0" smtClean="0">
+                <a:latin typeface="Arial" panose="020B0604020202020204" pitchFamily="34" charset="0"/>
+                <a:cs typeface="Arial" panose="020B0604020202020204" pitchFamily="34" charset="0"/>
+              </a:rPr>
+              <a:t>=0.0.0.0 --no-browser</a:t>
+            </a:r>
+            <a:endParaRPr lang="en-AU" dirty="0">
+              <a:latin typeface="Lucida Sans" panose="020B0602030504020204" pitchFamily="34" charset="0"/>
               <a:cs typeface="Arial" panose="020B0604020202020204" pitchFamily="34" charset="0"/>
             </a:endParaRPr>
           </a:p>
           <a:p>
-            <a:endParaRPr lang="en-AU" dirty="0" smtClean="0">
-              <a:latin typeface="Arial" panose="020B0604020202020204" pitchFamily="34" charset="0"/>
-              <a:cs typeface="Arial" panose="020B0604020202020204" pitchFamily="34" charset="0"/>
+            <a:r>
+              <a:rPr lang="en-AU" dirty="0" smtClean="0"/>
+              <a:t>   </a:t>
+            </a:r>
+            <a:r>
+              <a:rPr lang="en-AU" dirty="0" smtClean="0">
+                <a:solidFill>
+                  <a:srgbClr val="FFFF00"/>
+                </a:solidFill>
+              </a:rPr>
+              <a:t>NOTE: there are 2 dashes before “</a:t>
+            </a:r>
+            <a:r>
+              <a:rPr lang="en-AU" dirty="0" err="1" smtClean="0">
+                <a:solidFill>
+                  <a:srgbClr val="FFFF00"/>
+                </a:solidFill>
+              </a:rPr>
+              <a:t>ip</a:t>
+            </a:r>
+            <a:r>
+              <a:rPr lang="en-AU" dirty="0" smtClean="0">
+                <a:solidFill>
+                  <a:srgbClr val="FFFF00"/>
+                </a:solidFill>
+              </a:rPr>
+              <a:t>” and “no-browser”</a:t>
+            </a:r>
+            <a:endParaRPr lang="en-AU" dirty="0">
+              <a:solidFill>
+                <a:srgbClr val="FFFF00"/>
+              </a:solidFill>
             </a:endParaRPr>
-          </a:p>
-          <a:p>
-            <a:endParaRPr lang="en-AU" dirty="0">
-              <a:latin typeface="Arial" panose="020B0604020202020204" pitchFamily="34" charset="0"/>
-              <a:cs typeface="Arial" panose="020B0604020202020204" pitchFamily="34" charset="0"/>
-            </a:endParaRPr>
-          </a:p>
-          <a:p>
-            <a:endParaRPr lang="en-AU" dirty="0" smtClean="0">
-              <a:latin typeface="Arial" panose="020B0604020202020204" pitchFamily="34" charset="0"/>
-              <a:cs typeface="Arial" panose="020B0604020202020204" pitchFamily="34" charset="0"/>
-            </a:endParaRPr>
-          </a:p>
-          <a:p>
-            <a:endParaRPr lang="en-AU" dirty="0">
-              <a:latin typeface="Arial" panose="020B0604020202020204" pitchFamily="34" charset="0"/>
-              <a:cs typeface="Arial" panose="020B0604020202020204" pitchFamily="34" charset="0"/>
-            </a:endParaRPr>
-          </a:p>
-          <a:p>
-            <a:r>
-              <a:rPr lang="en-AU" dirty="0" smtClean="0">
-                <a:latin typeface="Arial" panose="020B0604020202020204" pitchFamily="34" charset="0"/>
-                <a:cs typeface="Arial" panose="020B0604020202020204" pitchFamily="34" charset="0"/>
-              </a:rPr>
-              <a:t>The token number is unique to a </a:t>
-            </a:r>
-            <a:r>
-              <a:rPr lang="en-AU" dirty="0" err="1" smtClean="0">
-                <a:latin typeface="Arial" panose="020B0604020202020204" pitchFamily="34" charset="0"/>
-                <a:cs typeface="Arial" panose="020B0604020202020204" pitchFamily="34" charset="0"/>
-              </a:rPr>
-              <a:t>juptyer</a:t>
-            </a:r>
-            <a:r>
-              <a:rPr lang="en-AU" dirty="0" smtClean="0">
-                <a:latin typeface="Arial" panose="020B0604020202020204" pitchFamily="34" charset="0"/>
-                <a:cs typeface="Arial" panose="020B0604020202020204" pitchFamily="34" charset="0"/>
-              </a:rPr>
-              <a:t> notebook lab SESSION while you are running the </a:t>
-            </a:r>
-            <a:r>
-              <a:rPr lang="en-AU" dirty="0" err="1" smtClean="0">
-                <a:latin typeface="Arial" panose="020B0604020202020204" pitchFamily="34" charset="0"/>
-                <a:cs typeface="Arial" panose="020B0604020202020204" pitchFamily="34" charset="0"/>
-              </a:rPr>
-              <a:t>juypter</a:t>
-            </a:r>
-            <a:r>
-              <a:rPr lang="en-AU" dirty="0" smtClean="0">
-                <a:latin typeface="Arial" panose="020B0604020202020204" pitchFamily="34" charset="0"/>
-                <a:cs typeface="Arial" panose="020B0604020202020204" pitchFamily="34" charset="0"/>
-              </a:rPr>
-              <a:t> notebook server.</a:t>
-            </a:r>
-          </a:p>
-          <a:p>
-            <a:endParaRPr lang="en-AU" dirty="0" smtClean="0">
-              <a:latin typeface="Arial" panose="020B0604020202020204" pitchFamily="34" charset="0"/>
-              <a:cs typeface="Arial" panose="020B0604020202020204" pitchFamily="34" charset="0"/>
-            </a:endParaRPr>
-          </a:p>
-          <a:p>
-            <a:r>
-              <a:rPr lang="en-AU" dirty="0" smtClean="0">
-                <a:latin typeface="Arial" panose="020B0604020202020204" pitchFamily="34" charset="0"/>
-                <a:cs typeface="Arial" panose="020B0604020202020204" pitchFamily="34" charset="0"/>
-              </a:rPr>
-              <a:t>Restarting the </a:t>
-            </a:r>
-            <a:r>
-              <a:rPr lang="en-AU" dirty="0" err="1" smtClean="0">
-                <a:latin typeface="Arial" panose="020B0604020202020204" pitchFamily="34" charset="0"/>
-                <a:cs typeface="Arial" panose="020B0604020202020204" pitchFamily="34" charset="0"/>
-              </a:rPr>
-              <a:t>jupyter</a:t>
-            </a:r>
-            <a:r>
-              <a:rPr lang="en-AU" dirty="0" smtClean="0">
-                <a:latin typeface="Arial" panose="020B0604020202020204" pitchFamily="34" charset="0"/>
-                <a:cs typeface="Arial" panose="020B0604020202020204" pitchFamily="34" charset="0"/>
-              </a:rPr>
-              <a:t> notebook will generate a new token! </a:t>
-            </a:r>
-          </a:p>
-          <a:p>
-            <a:endParaRPr lang="en-AU" dirty="0"/>
           </a:p>
         </p:txBody>
       </p:sp>
       <p:pic>
         <p:nvPicPr>
-          <p:cNvPr id="5" name="Picture 4"/>
+          <p:cNvPr id="4" name="Picture 3"/>
           <p:cNvPicPr>
             <a:picLocks noChangeAspect="1"/>
           </p:cNvPicPr>
           <p:nvPr/>
         </p:nvPicPr>
         <p:blipFill>
-          <a:blip r:embed="rId3">
+          <a:blip r:embed="rId2">
             <a:extLst>
               <a:ext uri="{28A0092B-C50C-407E-A947-70E740481C1C}">
                 <a14:useLocalDpi xmlns:a14="http://schemas.microsoft.com/office/drawing/2010/main" val="0"/>
@@ -6862,64 +6755,18 @@
         </p:blipFill>
         <p:spPr>
           <a:xfrm>
-            <a:off x="1356480" y="2782854"/>
-            <a:ext cx="9217022" cy="867747"/>
+            <a:off x="1287312" y="2982476"/>
+            <a:ext cx="9330925" cy="2439686"/>
           </a:xfrm>
           <a:prstGeom prst="rect">
             <a:avLst/>
           </a:prstGeom>
         </p:spPr>
       </p:pic>
-      <p:sp>
-        <p:nvSpPr>
-          <p:cNvPr id="8" name="Rounded Rectangle 7"/>
-          <p:cNvSpPr/>
-          <p:nvPr/>
-        </p:nvSpPr>
-        <p:spPr>
-          <a:xfrm>
-            <a:off x="2181427" y="3195732"/>
-            <a:ext cx="7567127" cy="326572"/>
-          </a:xfrm>
-          <a:prstGeom prst="roundRect">
-            <a:avLst/>
-          </a:prstGeom>
-          <a:noFill/>
-          <a:ln>
-            <a:solidFill>
-              <a:srgbClr val="00B050"/>
-            </a:solidFill>
-          </a:ln>
-        </p:spPr>
-        <p:style>
-          <a:lnRef idx="2">
-            <a:schemeClr val="accent1">
-              <a:shade val="50000"/>
-            </a:schemeClr>
-          </a:lnRef>
-          <a:fillRef idx="1">
-            <a:schemeClr val="accent1"/>
-          </a:fillRef>
-          <a:effectRef idx="0">
-            <a:schemeClr val="accent1"/>
-          </a:effectRef>
-          <a:fontRef idx="minor">
-            <a:schemeClr val="lt1"/>
-          </a:fontRef>
-        </p:style>
-        <p:txBody>
-          <a:bodyPr rtlCol="0" anchor="ctr"/>
-          <a:lstStyle/>
-          <a:p>
-            <a:pPr algn="ctr"/>
-            <a:endParaRPr lang="en-AU"/>
-          </a:p>
-        </p:txBody>
-      </p:sp>
     </p:spTree>
     <p:extLst>
       <p:ext uri="{BB962C8B-B14F-4D97-AF65-F5344CB8AC3E}">
-        <p14:creationId xmlns:p14="http://schemas.microsoft.com/office/powerpoint/2010/main" val="2306365248"/>
+        <p14:creationId xmlns:p14="http://schemas.microsoft.com/office/powerpoint/2010/main" val="1246425237"/>
       </p:ext>
     </p:extLst>
   </p:cSld>
@@ -6963,25 +6810,24 @@
             <p:ph type="title"/>
           </p:nvPr>
         </p:nvSpPr>
-        <p:spPr>
-          <a:xfrm>
-            <a:off x="989972" y="282341"/>
-            <a:ext cx="10364451" cy="1210283"/>
-          </a:xfrm>
-        </p:spPr>
+        <p:spPr/>
         <p:txBody>
           <a:bodyPr/>
           <a:lstStyle/>
           <a:p>
             <a:r>
-              <a:rPr lang="en-AU" b="1" dirty="0" smtClean="0">
-                <a:latin typeface="Lucida Sans Typewriter" panose="020B0509030504030204" pitchFamily="49" charset="0"/>
-              </a:rPr>
-              <a:t>Summary of commands	</a:t>
-            </a:r>
-            <a:endParaRPr lang="en-AU" b="1" dirty="0">
-              <a:latin typeface="Lucida Sans Typewriter" panose="020B0509030504030204" pitchFamily="49" charset="0"/>
-            </a:endParaRPr>
+              <a:rPr lang="en-AU" dirty="0" smtClean="0"/>
+              <a:t>Open the </a:t>
+            </a:r>
+            <a:r>
+              <a:rPr lang="en-AU" dirty="0" err="1" smtClean="0"/>
+              <a:t>Jupyter</a:t>
+            </a:r>
+            <a:r>
+              <a:rPr lang="en-AU" dirty="0" smtClean="0"/>
+              <a:t> Notebook Server on a browser</a:t>
+            </a:r>
+            <a:endParaRPr lang="en-AU" dirty="0"/>
           </a:p>
         </p:txBody>
       </p:sp>
@@ -6993,8 +6839,8 @@
         </p:nvSpPr>
         <p:spPr>
           <a:xfrm>
-            <a:off x="1559856" y="1690688"/>
-            <a:ext cx="9224685" cy="3970318"/>
+            <a:off x="1276582" y="1869255"/>
+            <a:ext cx="9638835" cy="3693319"/>
           </a:xfrm>
           <a:prstGeom prst="rect">
             <a:avLst/>
@@ -7012,6 +6858,327 @@
                 <a:latin typeface="Arial" panose="020B0604020202020204" pitchFamily="34" charset="0"/>
                 <a:cs typeface="Arial" panose="020B0604020202020204" pitchFamily="34" charset="0"/>
               </a:rPr>
+              <a:t>Step 6: Once the </a:t>
+            </a:r>
+            <a:r>
+              <a:rPr lang="en-AU" dirty="0" err="1" smtClean="0">
+                <a:latin typeface="Arial" panose="020B0604020202020204" pitchFamily="34" charset="0"/>
+                <a:cs typeface="Arial" panose="020B0604020202020204" pitchFamily="34" charset="0"/>
+              </a:rPr>
+              <a:t>jupyter</a:t>
+            </a:r>
+            <a:r>
+              <a:rPr lang="en-AU" dirty="0" smtClean="0">
+                <a:latin typeface="Arial" panose="020B0604020202020204" pitchFamily="34" charset="0"/>
+                <a:cs typeface="Arial" panose="020B0604020202020204" pitchFamily="34" charset="0"/>
+              </a:rPr>
+              <a:t> notebook server is running on your VM you can then open a browser and copy and paste the URL that starts with </a:t>
+            </a:r>
+            <a:r>
+              <a:rPr lang="en-AU" dirty="0" smtClean="0">
+                <a:latin typeface="Arial" panose="020B0604020202020204" pitchFamily="34" charset="0"/>
+                <a:cs typeface="Arial" panose="020B0604020202020204" pitchFamily="34" charset="0"/>
+                <a:hlinkClick r:id="rId2"/>
+              </a:rPr>
+              <a:t>http://127.0.0.1:8888/?token=...</a:t>
+            </a:r>
+            <a:r>
+              <a:rPr lang="en-AU" dirty="0">
+                <a:latin typeface="Arial" panose="020B0604020202020204" pitchFamily="34" charset="0"/>
+                <a:cs typeface="Arial" panose="020B0604020202020204" pitchFamily="34" charset="0"/>
+              </a:rPr>
+              <a:t> </a:t>
+            </a:r>
+            <a:r>
+              <a:rPr lang="en-AU" dirty="0" smtClean="0">
+                <a:latin typeface="Arial" panose="020B0604020202020204" pitchFamily="34" charset="0"/>
+                <a:cs typeface="Arial" panose="020B0604020202020204" pitchFamily="34" charset="0"/>
+              </a:rPr>
+              <a:t>into </a:t>
+            </a:r>
+          </a:p>
+          <a:p>
+            <a:r>
+              <a:rPr lang="en-AU" dirty="0" smtClean="0">
+                <a:latin typeface="Arial" panose="020B0604020202020204" pitchFamily="34" charset="0"/>
+                <a:cs typeface="Arial" panose="020B0604020202020204" pitchFamily="34" charset="0"/>
+              </a:rPr>
+              <a:t>your address bar. </a:t>
+            </a:r>
+          </a:p>
+          <a:p>
+            <a:endParaRPr lang="en-AU" dirty="0" smtClean="0">
+              <a:latin typeface="Arial" panose="020B0604020202020204" pitchFamily="34" charset="0"/>
+              <a:cs typeface="Arial" panose="020B0604020202020204" pitchFamily="34" charset="0"/>
+            </a:endParaRPr>
+          </a:p>
+          <a:p>
+            <a:endParaRPr lang="en-AU" dirty="0" smtClean="0">
+              <a:latin typeface="Arial" panose="020B0604020202020204" pitchFamily="34" charset="0"/>
+              <a:cs typeface="Arial" panose="020B0604020202020204" pitchFamily="34" charset="0"/>
+            </a:endParaRPr>
+          </a:p>
+          <a:p>
+            <a:endParaRPr lang="en-AU" dirty="0">
+              <a:latin typeface="Arial" panose="020B0604020202020204" pitchFamily="34" charset="0"/>
+              <a:cs typeface="Arial" panose="020B0604020202020204" pitchFamily="34" charset="0"/>
+            </a:endParaRPr>
+          </a:p>
+          <a:p>
+            <a:endParaRPr lang="en-AU" dirty="0" smtClean="0">
+              <a:latin typeface="Arial" panose="020B0604020202020204" pitchFamily="34" charset="0"/>
+              <a:cs typeface="Arial" panose="020B0604020202020204" pitchFamily="34" charset="0"/>
+            </a:endParaRPr>
+          </a:p>
+          <a:p>
+            <a:endParaRPr lang="en-AU" dirty="0">
+              <a:latin typeface="Arial" panose="020B0604020202020204" pitchFamily="34" charset="0"/>
+              <a:cs typeface="Arial" panose="020B0604020202020204" pitchFamily="34" charset="0"/>
+            </a:endParaRPr>
+          </a:p>
+          <a:p>
+            <a:r>
+              <a:rPr lang="en-AU" dirty="0" smtClean="0">
+                <a:latin typeface="Arial" panose="020B0604020202020204" pitchFamily="34" charset="0"/>
+                <a:cs typeface="Arial" panose="020B0604020202020204" pitchFamily="34" charset="0"/>
+              </a:rPr>
+              <a:t>The token number is unique to a </a:t>
+            </a:r>
+            <a:r>
+              <a:rPr lang="en-AU" dirty="0" err="1" smtClean="0">
+                <a:latin typeface="Arial" panose="020B0604020202020204" pitchFamily="34" charset="0"/>
+                <a:cs typeface="Arial" panose="020B0604020202020204" pitchFamily="34" charset="0"/>
+              </a:rPr>
+              <a:t>juptyer</a:t>
+            </a:r>
+            <a:r>
+              <a:rPr lang="en-AU" dirty="0" smtClean="0">
+                <a:latin typeface="Arial" panose="020B0604020202020204" pitchFamily="34" charset="0"/>
+                <a:cs typeface="Arial" panose="020B0604020202020204" pitchFamily="34" charset="0"/>
+              </a:rPr>
+              <a:t> notebook lab SESSION while you are running the </a:t>
+            </a:r>
+            <a:r>
+              <a:rPr lang="en-AU" dirty="0" err="1" smtClean="0">
+                <a:latin typeface="Arial" panose="020B0604020202020204" pitchFamily="34" charset="0"/>
+                <a:cs typeface="Arial" panose="020B0604020202020204" pitchFamily="34" charset="0"/>
+              </a:rPr>
+              <a:t>juypter</a:t>
+            </a:r>
+            <a:r>
+              <a:rPr lang="en-AU" dirty="0" smtClean="0">
+                <a:latin typeface="Arial" panose="020B0604020202020204" pitchFamily="34" charset="0"/>
+                <a:cs typeface="Arial" panose="020B0604020202020204" pitchFamily="34" charset="0"/>
+              </a:rPr>
+              <a:t> notebook server.</a:t>
+            </a:r>
+          </a:p>
+          <a:p>
+            <a:endParaRPr lang="en-AU" dirty="0" smtClean="0">
+              <a:latin typeface="Arial" panose="020B0604020202020204" pitchFamily="34" charset="0"/>
+              <a:cs typeface="Arial" panose="020B0604020202020204" pitchFamily="34" charset="0"/>
+            </a:endParaRPr>
+          </a:p>
+          <a:p>
+            <a:r>
+              <a:rPr lang="en-AU" dirty="0" smtClean="0">
+                <a:latin typeface="Arial" panose="020B0604020202020204" pitchFamily="34" charset="0"/>
+                <a:cs typeface="Arial" panose="020B0604020202020204" pitchFamily="34" charset="0"/>
+              </a:rPr>
+              <a:t>Restarting the </a:t>
+            </a:r>
+            <a:r>
+              <a:rPr lang="en-AU" dirty="0" err="1" smtClean="0">
+                <a:latin typeface="Arial" panose="020B0604020202020204" pitchFamily="34" charset="0"/>
+                <a:cs typeface="Arial" panose="020B0604020202020204" pitchFamily="34" charset="0"/>
+              </a:rPr>
+              <a:t>jupyter</a:t>
+            </a:r>
+            <a:r>
+              <a:rPr lang="en-AU" dirty="0" smtClean="0">
+                <a:latin typeface="Arial" panose="020B0604020202020204" pitchFamily="34" charset="0"/>
+                <a:cs typeface="Arial" panose="020B0604020202020204" pitchFamily="34" charset="0"/>
+              </a:rPr>
+              <a:t> notebook will generate a new token! </a:t>
+            </a:r>
+          </a:p>
+          <a:p>
+            <a:endParaRPr lang="en-AU" dirty="0"/>
+          </a:p>
+        </p:txBody>
+      </p:sp>
+      <p:pic>
+        <p:nvPicPr>
+          <p:cNvPr id="5" name="Picture 4"/>
+          <p:cNvPicPr>
+            <a:picLocks noChangeAspect="1"/>
+          </p:cNvPicPr>
+          <p:nvPr/>
+        </p:nvPicPr>
+        <p:blipFill>
+          <a:blip r:embed="rId3">
+            <a:extLst>
+              <a:ext uri="{28A0092B-C50C-407E-A947-70E740481C1C}">
+                <a14:useLocalDpi xmlns:a14="http://schemas.microsoft.com/office/drawing/2010/main" val="0"/>
+              </a:ext>
+            </a:extLst>
+          </a:blip>
+          <a:stretch>
+            <a:fillRect/>
+          </a:stretch>
+        </p:blipFill>
+        <p:spPr>
+          <a:xfrm>
+            <a:off x="1356480" y="2782854"/>
+            <a:ext cx="9217022" cy="867747"/>
+          </a:xfrm>
+          <a:prstGeom prst="rect">
+            <a:avLst/>
+          </a:prstGeom>
+        </p:spPr>
+      </p:pic>
+      <p:sp>
+        <p:nvSpPr>
+          <p:cNvPr id="8" name="Rounded Rectangle 7"/>
+          <p:cNvSpPr/>
+          <p:nvPr/>
+        </p:nvSpPr>
+        <p:spPr>
+          <a:xfrm>
+            <a:off x="2181427" y="3195732"/>
+            <a:ext cx="7567127" cy="326572"/>
+          </a:xfrm>
+          <a:prstGeom prst="roundRect">
+            <a:avLst/>
+          </a:prstGeom>
+          <a:noFill/>
+          <a:ln>
+            <a:solidFill>
+              <a:srgbClr val="00B050"/>
+            </a:solidFill>
+          </a:ln>
+        </p:spPr>
+        <p:style>
+          <a:lnRef idx="2">
+            <a:schemeClr val="accent1">
+              <a:shade val="50000"/>
+            </a:schemeClr>
+          </a:lnRef>
+          <a:fillRef idx="1">
+            <a:schemeClr val="accent1"/>
+          </a:fillRef>
+          <a:effectRef idx="0">
+            <a:schemeClr val="accent1"/>
+          </a:effectRef>
+          <a:fontRef idx="minor">
+            <a:schemeClr val="lt1"/>
+          </a:fontRef>
+        </p:style>
+        <p:txBody>
+          <a:bodyPr rtlCol="0" anchor="ctr"/>
+          <a:lstStyle/>
+          <a:p>
+            <a:pPr algn="ctr"/>
+            <a:endParaRPr lang="en-AU"/>
+          </a:p>
+        </p:txBody>
+      </p:sp>
+    </p:spTree>
+    <p:extLst>
+      <p:ext uri="{BB962C8B-B14F-4D97-AF65-F5344CB8AC3E}">
+        <p14:creationId xmlns:p14="http://schemas.microsoft.com/office/powerpoint/2010/main" val="2306365248"/>
+      </p:ext>
+    </p:extLst>
+  </p:cSld>
+  <p:clrMapOvr>
+    <a:masterClrMapping/>
+  </p:clrMapOvr>
+  <p:timing>
+    <p:tnLst>
+      <p:par>
+        <p:cTn id="1" dur="indefinite" restart="never" nodeType="tmRoot"/>
+      </p:par>
+    </p:tnLst>
+  </p:timing>
+</p:sld>
+</file>
+
+<file path=ppt/slides/slide13.xml><?xml version="1.0" encoding="utf-8"?>
+<p:sld xmlns:a="http://schemas.openxmlformats.org/drawingml/2006/main" xmlns:r="http://schemas.openxmlformats.org/officeDocument/2006/relationships" xmlns:p="http://schemas.openxmlformats.org/presentationml/2006/main">
+  <p:cSld>
+    <p:spTree>
+      <p:nvGrpSpPr>
+        <p:cNvPr id="1" name=""/>
+        <p:cNvGrpSpPr/>
+        <p:nvPr/>
+      </p:nvGrpSpPr>
+      <p:grpSpPr>
+        <a:xfrm>
+          <a:off x="0" y="0"/>
+          <a:ext cx="0" cy="0"/>
+          <a:chOff x="0" y="0"/>
+          <a:chExt cx="0" cy="0"/>
+        </a:xfrm>
+      </p:grpSpPr>
+      <p:sp>
+        <p:nvSpPr>
+          <p:cNvPr id="2" name="Title 1"/>
+          <p:cNvSpPr>
+            <a:spLocks noGrp="1"/>
+          </p:cNvSpPr>
+          <p:nvPr>
+            <p:ph type="title"/>
+          </p:nvPr>
+        </p:nvSpPr>
+        <p:spPr>
+          <a:xfrm>
+            <a:off x="989972" y="282341"/>
+            <a:ext cx="10364451" cy="1210283"/>
+          </a:xfrm>
+        </p:spPr>
+        <p:txBody>
+          <a:bodyPr/>
+          <a:lstStyle/>
+          <a:p>
+            <a:r>
+              <a:rPr lang="en-AU" b="1" dirty="0" smtClean="0">
+                <a:latin typeface="Lucida Sans Typewriter" panose="020B0509030504030204" pitchFamily="49" charset="0"/>
+              </a:rPr>
+              <a:t>Summary of commands	</a:t>
+            </a:r>
+            <a:endParaRPr lang="en-AU" b="1" dirty="0">
+              <a:latin typeface="Lucida Sans Typewriter" panose="020B0509030504030204" pitchFamily="49" charset="0"/>
+            </a:endParaRPr>
+          </a:p>
+        </p:txBody>
+      </p:sp>
+      <p:sp>
+        <p:nvSpPr>
+          <p:cNvPr id="3" name="TextBox 2"/>
+          <p:cNvSpPr txBox="1"/>
+          <p:nvPr/>
+        </p:nvSpPr>
+        <p:spPr>
+          <a:xfrm>
+            <a:off x="1559856" y="1690688"/>
+            <a:ext cx="9224685" cy="3970318"/>
+          </a:xfrm>
+          <a:prstGeom prst="rect">
+            <a:avLst/>
+          </a:prstGeom>
+          <a:noFill/>
+        </p:spPr>
+        <p:txBody>
+          <a:bodyPr wrap="square" rtlCol="0">
+            <a:spAutoFit/>
+          </a:bodyPr>
+          <a:lstStyle/>
+          <a:p>
+            <a:r>
+              <a:rPr lang="en-AU" dirty="0" smtClean="0">
+                <a:latin typeface="Arial" panose="020B0604020202020204" pitchFamily="34" charset="0"/>
+                <a:cs typeface="Arial" panose="020B0604020202020204" pitchFamily="34" charset="0"/>
+              </a:rPr>
               <a:t>Step 1  - Create the project directory</a:t>
             </a:r>
           </a:p>
@@ -7102,7 +7269,7 @@
                 <a:cs typeface="Arial" panose="020B0604020202020204" pitchFamily="34" charset="0"/>
                 <a:hlinkClick r:id="rId2"/>
               </a:rPr>
-              <a:t>github.com/chrisbpawsey/Data1001.git</a:t>
+              <a:t>github.com/adrianopolpo/stat1400.git</a:t>
             </a:r>
             <a:endParaRPr lang="en-AU" dirty="0" smtClean="0">
               <a:latin typeface="Lucida Sans Typewriter" panose="020B0509030504030204" pitchFamily="49" charset="0"/>
@@ -7128,7 +7295,7 @@
                 <a:latin typeface="Lucida Sans Typewriter" panose="020B0509030504030204" pitchFamily="49" charset="0"/>
                 <a:cs typeface="Arial" panose="020B0604020202020204" pitchFamily="34" charset="0"/>
               </a:rPr>
-              <a:t>cd Data1001</a:t>
+              <a:t>cd stat1400</a:t>
             </a:r>
           </a:p>
           <a:p>
@@ -7225,19 +7392,8 @@
                 <a:latin typeface="Arial" panose="020B0604020202020204" pitchFamily="34" charset="0"/>
                 <a:cs typeface="Arial" panose="020B0604020202020204" pitchFamily="34" charset="0"/>
               </a:rPr>
-              <a:t> notebook server in your </a:t>
-            </a:r>
-            <a:r>
-              <a:rPr lang="en-AU" smtClean="0">
-                <a:latin typeface="Arial" panose="020B0604020202020204" pitchFamily="34" charset="0"/>
-                <a:cs typeface="Arial" panose="020B0604020202020204" pitchFamily="34" charset="0"/>
-              </a:rPr>
-              <a:t>virtual machine (VM)</a:t>
-            </a:r>
-            <a:endParaRPr lang="en-AU" dirty="0" smtClean="0">
-              <a:latin typeface="Arial" panose="020B0604020202020204" pitchFamily="34" charset="0"/>
-              <a:cs typeface="Arial" panose="020B0604020202020204" pitchFamily="34" charset="0"/>
-            </a:endParaRPr>
+              <a:t> notebook server in your virtual machine (VM)</a:t>
+            </a:r>
           </a:p>
           <a:p>
             <a:pPr marL="742950" lvl="1" indent="-285750">
@@ -7263,7 +7419,7 @@
                 <a:latin typeface="Lucida Sans Typewriter" panose="020B0509030504030204" pitchFamily="49" charset="0"/>
                 <a:cs typeface="Arial" panose="020B0604020202020204" pitchFamily="34" charset="0"/>
               </a:rPr>
-              <a:t> notebook –</a:t>
+              <a:t> notebook –-</a:t>
             </a:r>
             <a:r>
               <a:rPr lang="en-AU" dirty="0" err="1" smtClean="0">
@@ -7751,7 +7907,7 @@
         <p:spPr>
           <a:xfrm>
             <a:off x="1008529" y="5647764"/>
-            <a:ext cx="7221071" cy="369332"/>
+            <a:ext cx="7221071" cy="646331"/>
           </a:xfrm>
           <a:prstGeom prst="rect">
             <a:avLst/>
@@ -7766,7 +7922,7 @@
           <a:p>
             <a:r>
               <a:rPr lang="en-AU" dirty="0" smtClean="0"/>
-              <a:t>If it returns the version number as shown above you are good to go! </a:t>
+              <a:t>If it returns the version number as shown above you are almost there!  Next test if git is installed. </a:t>
             </a:r>
           </a:p>
         </p:txBody>
@@ -7848,14 +8004,24 @@
             <p:ph type="title"/>
           </p:nvPr>
         </p:nvSpPr>
-        <p:spPr/>
+        <p:spPr>
+          <a:xfrm>
+            <a:off x="913775" y="618517"/>
+            <a:ext cx="10364451" cy="722603"/>
+          </a:xfrm>
+        </p:spPr>
         <p:txBody>
           <a:bodyPr/>
           <a:lstStyle/>
           <a:p>
+            <a:pPr algn="l"/>
             <a:r>
               <a:rPr lang="en-AU" dirty="0" smtClean="0"/>
-              <a:t>Test git on Windows	</a:t>
+              <a:t>Test for git </a:t>
+            </a:r>
+            <a:r>
+              <a:rPr lang="en-AU" dirty="0" smtClean="0"/>
+              <a:t>on Windows	</a:t>
             </a:r>
             <a:endParaRPr lang="en-AU" dirty="0"/>
           </a:p>
@@ -7883,8 +8049,8 @@
         </p:blipFill>
         <p:spPr>
           <a:xfrm>
-            <a:off x="3630716" y="1606364"/>
-            <a:ext cx="4930567" cy="1562235"/>
+            <a:off x="913775" y="2104389"/>
+            <a:ext cx="5182225" cy="1556862"/>
           </a:xfrm>
           <a:prstGeom prst="rect">
             <a:avLst/>
@@ -7899,8 +8065,8 @@
         </p:nvSpPr>
         <p:spPr>
           <a:xfrm>
-            <a:off x="3097133" y="3809673"/>
-            <a:ext cx="5997732" cy="1231106"/>
+            <a:off x="6524309" y="1911248"/>
+            <a:ext cx="4863441" cy="2215991"/>
           </a:xfrm>
           <a:prstGeom prst="rect">
             <a:avLst/>
@@ -7908,40 +8074,215 @@
           <a:noFill/>
         </p:spPr>
         <p:txBody>
+          <a:bodyPr wrap="square" rtlCol="0">
+            <a:spAutoFit/>
+          </a:bodyPr>
+          <a:lstStyle/>
+          <a:p>
+            <a:pPr algn="ctr"/>
+            <a:r>
+              <a:rPr lang="en-AU" dirty="0" smtClean="0"/>
+              <a:t>If it is does return something similar to the example shown.  </a:t>
+            </a:r>
+            <a:r>
+              <a:rPr lang="en-AU" dirty="0"/>
+              <a:t>H</a:t>
+            </a:r>
+            <a:r>
+              <a:rPr lang="en-AU" dirty="0" smtClean="0"/>
+              <a:t>ere </a:t>
+            </a:r>
+            <a:r>
+              <a:rPr lang="en-AU" dirty="0"/>
+              <a:t>is a </a:t>
+            </a:r>
+            <a:r>
+              <a:rPr lang="en-AU" dirty="0" smtClean="0"/>
+              <a:t>link to the </a:t>
+            </a:r>
+            <a:r>
+              <a:rPr lang="en-AU" dirty="0" smtClean="0"/>
+              <a:t>current version (2.30.1) of the software. I</a:t>
+            </a:r>
+            <a:r>
+              <a:rPr lang="en-AU" dirty="0" smtClean="0"/>
+              <a:t>t does not need to be the exact same version as shown!</a:t>
+            </a:r>
+            <a:endParaRPr lang="en-AU" dirty="0"/>
+          </a:p>
+          <a:p>
+            <a:pPr algn="ctr"/>
+            <a:endParaRPr lang="en-AU" dirty="0"/>
+          </a:p>
+          <a:p>
+            <a:pPr marL="342900" indent="-342900" algn="ctr">
+              <a:buFont typeface="Arial" panose="020B0604020202020204" pitchFamily="34" charset="0"/>
+              <a:buChar char="•"/>
+            </a:pPr>
+            <a:r>
+              <a:rPr lang="en-AU" sz="2400" dirty="0">
+                <a:hlinkClick r:id="rId3"/>
+              </a:rPr>
+              <a:t>https://gitforwindows.org</a:t>
+            </a:r>
+            <a:r>
+              <a:rPr lang="en-AU" sz="2400" dirty="0" smtClean="0">
+                <a:hlinkClick r:id="rId3"/>
+              </a:rPr>
+              <a:t>/</a:t>
+            </a:r>
+            <a:endParaRPr lang="en-AU" sz="2400" dirty="0" smtClean="0"/>
+          </a:p>
+          <a:p>
+            <a:endParaRPr lang="en-AU" sz="2400" dirty="0" smtClean="0"/>
+          </a:p>
+        </p:txBody>
+      </p:sp>
+      <p:sp>
+        <p:nvSpPr>
+          <p:cNvPr id="7" name="TextBox 6"/>
+          <p:cNvSpPr txBox="1"/>
+          <p:nvPr/>
+        </p:nvSpPr>
+        <p:spPr>
+          <a:xfrm>
+            <a:off x="913775" y="1482851"/>
+            <a:ext cx="6608284" cy="369332"/>
+          </a:xfrm>
+          <a:prstGeom prst="rect">
+            <a:avLst/>
+          </a:prstGeom>
+          <a:noFill/>
+        </p:spPr>
+        <p:txBody>
           <a:bodyPr wrap="none" rtlCol="0">
             <a:spAutoFit/>
           </a:bodyPr>
           <a:lstStyle/>
           <a:p>
-            <a:pPr algn="ctr"/>
-            <a:r>
-              <a:rPr lang="en-AU" dirty="0"/>
-              <a:t>Windows may or may not have git installed if not here is a link.</a:t>
-            </a:r>
-          </a:p>
-          <a:p>
-            <a:pPr algn="ctr"/>
-            <a:endParaRPr lang="en-AU" dirty="0"/>
-          </a:p>
-          <a:p>
-            <a:pPr marL="342900" indent="-342900" algn="ctr">
-              <a:buFont typeface="Arial" panose="020B0604020202020204" pitchFamily="34" charset="0"/>
-              <a:buChar char="•"/>
-            </a:pPr>
-            <a:r>
-              <a:rPr lang="en-AU" sz="2000" dirty="0">
-                <a:hlinkClick r:id="rId3"/>
-              </a:rPr>
-              <a:t>https://gitforwindows.org/</a:t>
-            </a:r>
-            <a:endParaRPr lang="en-AU" sz="2000" dirty="0"/>
-          </a:p>
-          <a:p>
-            <a:pPr algn="ctr"/>
-            <a:endParaRPr lang="en-AU" dirty="0"/>
-          </a:p>
-        </p:txBody>
-      </p:sp>
+            <a:r>
+              <a:rPr lang="en-AU" dirty="0" smtClean="0"/>
+              <a:t>To check if Git is install on your computer us the command </a:t>
+            </a:r>
+            <a:r>
+              <a:rPr lang="en-AU" dirty="0" smtClean="0">
+                <a:solidFill>
+                  <a:srgbClr val="FFFF00"/>
+                </a:solidFill>
+              </a:rPr>
+              <a:t>git --version</a:t>
+            </a:r>
+            <a:endParaRPr lang="en-AU" dirty="0">
+              <a:solidFill>
+                <a:srgbClr val="FFFF00"/>
+              </a:solidFill>
+            </a:endParaRPr>
+          </a:p>
+        </p:txBody>
+      </p:sp>
+      <p:pic>
+        <p:nvPicPr>
+          <p:cNvPr id="9" name="Picture 8"/>
+          <p:cNvPicPr>
+            <a:picLocks noChangeAspect="1"/>
+          </p:cNvPicPr>
+          <p:nvPr/>
+        </p:nvPicPr>
+        <p:blipFill>
+          <a:blip r:embed="rId4">
+            <a:extLst>
+              <a:ext uri="{28A0092B-C50C-407E-A947-70E740481C1C}">
+                <a14:useLocalDpi xmlns:a14="http://schemas.microsoft.com/office/drawing/2010/main" val="0"/>
+              </a:ext>
+            </a:extLst>
+          </a:blip>
+          <a:stretch>
+            <a:fillRect/>
+          </a:stretch>
+        </p:blipFill>
+        <p:spPr>
+          <a:xfrm>
+            <a:off x="913775" y="3792772"/>
+            <a:ext cx="5275122" cy="2857358"/>
+          </a:xfrm>
+          <a:prstGeom prst="rect">
+            <a:avLst/>
+          </a:prstGeom>
+        </p:spPr>
+      </p:pic>
+      <p:sp>
+        <p:nvSpPr>
+          <p:cNvPr id="11" name="TextBox 10"/>
+          <p:cNvSpPr txBox="1"/>
+          <p:nvPr/>
+        </p:nvSpPr>
+        <p:spPr>
+          <a:xfrm>
+            <a:off x="6731540" y="4562272"/>
+            <a:ext cx="4423903" cy="369332"/>
+          </a:xfrm>
+          <a:prstGeom prst="rect">
+            <a:avLst/>
+          </a:prstGeom>
+          <a:noFill/>
+        </p:spPr>
+        <p:txBody>
+          <a:bodyPr wrap="none" rtlCol="0">
+            <a:spAutoFit/>
+          </a:bodyPr>
+          <a:lstStyle/>
+          <a:p>
+            <a:r>
+              <a:rPr lang="en-AU" dirty="0" smtClean="0">
+                <a:solidFill>
+                  <a:srgbClr val="92D050"/>
+                </a:solidFill>
+              </a:rPr>
+              <a:t>Recommend the 64-bit Git for Windows Setup</a:t>
+            </a:r>
+            <a:endParaRPr lang="en-AU" dirty="0">
+              <a:solidFill>
+                <a:srgbClr val="92D050"/>
+              </a:solidFill>
+            </a:endParaRPr>
+          </a:p>
+        </p:txBody>
+      </p:sp>
+      <p:cxnSp>
+        <p:nvCxnSpPr>
+          <p:cNvPr id="13" name="Straight Arrow Connector 12"/>
+          <p:cNvCxnSpPr>
+            <a:stCxn id="11" idx="1"/>
+          </p:cNvCxnSpPr>
+          <p:nvPr/>
+        </p:nvCxnSpPr>
+        <p:spPr>
+          <a:xfrm flipH="1">
+            <a:off x="3949430" y="4746938"/>
+            <a:ext cx="2782110" cy="963198"/>
+          </a:xfrm>
+          <a:prstGeom prst="straightConnector1">
+            <a:avLst/>
+          </a:prstGeom>
+          <a:ln w="57150">
+            <a:tailEnd type="triangle"/>
+          </a:ln>
+        </p:spPr>
+        <p:style>
+          <a:lnRef idx="1">
+            <a:schemeClr val="accent1"/>
+          </a:lnRef>
+          <a:fillRef idx="0">
+            <a:schemeClr val="accent1"/>
+          </a:fillRef>
+          <a:effectRef idx="0">
+            <a:schemeClr val="accent1"/>
+          </a:effectRef>
+          <a:fontRef idx="minor">
+            <a:schemeClr val="tx1"/>
+          </a:fontRef>
+        </p:style>
+      </p:cxnSp>
     </p:spTree>
     <p:extLst>
       <p:ext uri="{BB962C8B-B14F-4D97-AF65-F5344CB8AC3E}">
@@ -7995,12 +8336,8 @@
           <a:lstStyle/>
           <a:p>
             <a:r>
-              <a:rPr lang="en-AU" dirty="0"/>
-              <a:t> </a:t>
-            </a:r>
-            <a:r>
               <a:rPr lang="en-AU" dirty="0" smtClean="0"/>
-              <a:t>Setup VM	</a:t>
+              <a:t>GIT INSTALLATION ISSUE for Windows</a:t>
             </a:r>
             <a:endParaRPr lang="en-AU" dirty="0"/>
           </a:p>
@@ -8014,8 +8351,8 @@
         </p:nvSpPr>
         <p:spPr>
           <a:xfrm>
-            <a:off x="1681233" y="1690688"/>
-            <a:ext cx="9011954" cy="3970318"/>
+            <a:off x="797747" y="2054681"/>
+            <a:ext cx="5147178" cy="2308324"/>
           </a:xfrm>
           <a:prstGeom prst="rect">
             <a:avLst/>
@@ -8030,270 +8367,144 @@
           <a:p>
             <a:r>
               <a:rPr lang="en-AU" dirty="0" smtClean="0">
-                <a:latin typeface="Arial" panose="020B0604020202020204" pitchFamily="34" charset="0"/>
-                <a:cs typeface="Arial" panose="020B0604020202020204" pitchFamily="34" charset="0"/>
-              </a:rPr>
-              <a:t>Once Vagrant </a:t>
+                <a:solidFill>
+                  <a:srgbClr val="FF0000"/>
+                </a:solidFill>
+              </a:rPr>
+              <a:t>CAUTION!!</a:t>
+            </a:r>
+          </a:p>
+          <a:p>
+            <a:r>
+              <a:rPr lang="en-AU" dirty="0" smtClean="0"/>
+              <a:t>In the Git Setup /</a:t>
+            </a:r>
+            <a:r>
+              <a:rPr lang="en-AU" dirty="0"/>
+              <a:t> </a:t>
+            </a:r>
+            <a:r>
+              <a:rPr lang="en-AU" dirty="0" smtClean="0"/>
+              <a:t>installation step:</a:t>
+            </a:r>
+          </a:p>
+          <a:p>
+            <a:r>
+              <a:rPr lang="en-AU" dirty="0" smtClean="0">
+                <a:solidFill>
+                  <a:srgbClr val="FFFF00"/>
+                </a:solidFill>
+              </a:rPr>
+              <a:t>Configuring the terminal emulator to use with Git Bash</a:t>
+            </a:r>
+          </a:p>
+          <a:p>
+            <a:endParaRPr lang="en-AU" dirty="0">
+              <a:solidFill>
+                <a:srgbClr val="FFFF00"/>
+              </a:solidFill>
+            </a:endParaRPr>
+          </a:p>
+          <a:p>
+            <a:r>
+              <a:rPr lang="en-AU" dirty="0" smtClean="0"/>
+              <a:t>Select the “</a:t>
+            </a:r>
+            <a:r>
+              <a:rPr lang="en-AU" dirty="0" smtClean="0">
+                <a:solidFill>
+                  <a:srgbClr val="00B050"/>
+                </a:solidFill>
+              </a:rPr>
+              <a:t>Use Windows’ default console window</a:t>
+            </a:r>
+            <a:r>
+              <a:rPr lang="en-AU" dirty="0" smtClean="0"/>
+              <a:t>”  </a:t>
+            </a:r>
+          </a:p>
+          <a:p>
+            <a:r>
+              <a:rPr lang="en-AU" dirty="0" smtClean="0"/>
+              <a:t>Not the </a:t>
+            </a:r>
+            <a:r>
+              <a:rPr lang="en-AU" smtClean="0"/>
+              <a:t>default which is </a:t>
+            </a:r>
+            <a:r>
+              <a:rPr lang="en-AU" dirty="0" smtClean="0"/>
+              <a:t>set to “</a:t>
+            </a:r>
+            <a:r>
+              <a:rPr lang="en-AU" dirty="0" smtClean="0">
+                <a:solidFill>
+                  <a:srgbClr val="FF0000"/>
+                </a:solidFill>
+              </a:rPr>
+              <a:t>Use </a:t>
             </a:r>
             <a:r>
               <a:rPr lang="en-AU" dirty="0" err="1" smtClean="0">
-                <a:latin typeface="Arial" panose="020B0604020202020204" pitchFamily="34" charset="0"/>
-                <a:cs typeface="Arial" panose="020B0604020202020204" pitchFamily="34" charset="0"/>
-              </a:rPr>
-              <a:t>VirtualBox</a:t>
-            </a:r>
-            <a:r>
-              <a:rPr lang="en-AU" dirty="0" smtClean="0">
-                <a:latin typeface="Arial" panose="020B0604020202020204" pitchFamily="34" charset="0"/>
-                <a:cs typeface="Arial" panose="020B0604020202020204" pitchFamily="34" charset="0"/>
-              </a:rPr>
-              <a:t> and Git are installed and working, you can then begin setting </a:t>
-            </a:r>
-          </a:p>
-          <a:p>
-            <a:r>
-              <a:rPr lang="en-AU" dirty="0">
-                <a:latin typeface="Arial" panose="020B0604020202020204" pitchFamily="34" charset="0"/>
-                <a:cs typeface="Arial" panose="020B0604020202020204" pitchFamily="34" charset="0"/>
-              </a:rPr>
-              <a:t> </a:t>
-            </a:r>
-            <a:r>
-              <a:rPr lang="en-AU" dirty="0" smtClean="0">
-                <a:latin typeface="Arial" panose="020B0604020202020204" pitchFamily="34" charset="0"/>
-                <a:cs typeface="Arial" panose="020B0604020202020204" pitchFamily="34" charset="0"/>
-              </a:rPr>
-              <a:t>up a Virtual Machine or VM that will run locally on your laptop.</a:t>
-            </a:r>
-          </a:p>
-          <a:p>
-            <a:endParaRPr lang="en-AU" dirty="0" smtClean="0">
-              <a:latin typeface="Arial" panose="020B0604020202020204" pitchFamily="34" charset="0"/>
-              <a:cs typeface="Arial" panose="020B0604020202020204" pitchFamily="34" charset="0"/>
-            </a:endParaRPr>
-          </a:p>
-          <a:p>
-            <a:r>
-              <a:rPr lang="en-AU" dirty="0" smtClean="0">
-                <a:latin typeface="Arial" panose="020B0604020202020204" pitchFamily="34" charset="0"/>
-                <a:cs typeface="Arial" panose="020B0604020202020204" pitchFamily="34" charset="0"/>
-              </a:rPr>
-              <a:t>Step 1 – create the directory structure for this project. </a:t>
-            </a:r>
-          </a:p>
-          <a:p>
-            <a:r>
-              <a:rPr lang="en-AU" dirty="0" smtClean="0">
-                <a:latin typeface="Arial" panose="020B0604020202020204" pitchFamily="34" charset="0"/>
-                <a:cs typeface="Arial" panose="020B0604020202020204" pitchFamily="34" charset="0"/>
-              </a:rPr>
-              <a:t>For Windows using the </a:t>
-            </a:r>
-            <a:r>
-              <a:rPr lang="en-AU" dirty="0">
-                <a:latin typeface="Arial" panose="020B0604020202020204" pitchFamily="34" charset="0"/>
-                <a:cs typeface="Arial" panose="020B0604020202020204" pitchFamily="34" charset="0"/>
-              </a:rPr>
-              <a:t>C</a:t>
-            </a:r>
-            <a:r>
-              <a:rPr lang="en-AU" dirty="0" smtClean="0">
-                <a:latin typeface="Arial" panose="020B0604020202020204" pitchFamily="34" charset="0"/>
-                <a:cs typeface="Arial" panose="020B0604020202020204" pitchFamily="34" charset="0"/>
-              </a:rPr>
-              <a:t>ommand </a:t>
-            </a:r>
-            <a:r>
-              <a:rPr lang="en-AU" dirty="0">
-                <a:latin typeface="Arial" panose="020B0604020202020204" pitchFamily="34" charset="0"/>
-                <a:cs typeface="Arial" panose="020B0604020202020204" pitchFamily="34" charset="0"/>
-              </a:rPr>
-              <a:t>P</a:t>
-            </a:r>
-            <a:r>
-              <a:rPr lang="en-AU" dirty="0" smtClean="0">
-                <a:latin typeface="Arial" panose="020B0604020202020204" pitchFamily="34" charset="0"/>
-                <a:cs typeface="Arial" panose="020B0604020202020204" pitchFamily="34" charset="0"/>
-              </a:rPr>
-              <a:t>rompt terminal the command is:</a:t>
-            </a:r>
-          </a:p>
-          <a:p>
-            <a:pPr lvl="1"/>
-            <a:r>
-              <a:rPr lang="en-AU" dirty="0">
-                <a:latin typeface="Lucida Sans" panose="020B0602030504020204" pitchFamily="34" charset="0"/>
-                <a:cs typeface="Arial" panose="020B0604020202020204" pitchFamily="34" charset="0"/>
-              </a:rPr>
-              <a:t>%</a:t>
-            </a:r>
-            <a:r>
-              <a:rPr lang="en-AU" dirty="0" smtClean="0">
-                <a:latin typeface="Lucida Sans" panose="020B0602030504020204" pitchFamily="34" charset="0"/>
-                <a:cs typeface="Arial" panose="020B0604020202020204" pitchFamily="34" charset="0"/>
-              </a:rPr>
-              <a:t> </a:t>
-            </a:r>
-            <a:r>
-              <a:rPr lang="en-AU" dirty="0" err="1" smtClean="0">
-                <a:latin typeface="Lucida Sans" panose="020B0602030504020204" pitchFamily="34" charset="0"/>
-                <a:cs typeface="Arial" panose="020B0604020202020204" pitchFamily="34" charset="0"/>
-              </a:rPr>
-              <a:t>mkdir</a:t>
-            </a:r>
-            <a:r>
-              <a:rPr lang="en-AU" dirty="0" smtClean="0">
-                <a:latin typeface="Lucida Sans" panose="020B0602030504020204" pitchFamily="34" charset="0"/>
-                <a:cs typeface="Arial" panose="020B0604020202020204" pitchFamily="34" charset="0"/>
-              </a:rPr>
-              <a:t> Courses</a:t>
-            </a:r>
-          </a:p>
-          <a:p>
-            <a:pPr marL="285750" indent="-285750">
-              <a:buFont typeface="Wingdings" panose="05000000000000000000" pitchFamily="2" charset="2"/>
-              <a:buChar char="Ø"/>
-            </a:pPr>
-            <a:endParaRPr lang="en-AU" dirty="0" smtClean="0">
-              <a:latin typeface="Arial" panose="020B0604020202020204" pitchFamily="34" charset="0"/>
-              <a:cs typeface="Arial" panose="020B0604020202020204" pitchFamily="34" charset="0"/>
-            </a:endParaRPr>
-          </a:p>
-          <a:p>
-            <a:r>
-              <a:rPr lang="en-AU" dirty="0" smtClean="0">
-                <a:latin typeface="Arial" panose="020B0604020202020204" pitchFamily="34" charset="0"/>
-                <a:cs typeface="Arial" panose="020B0604020202020204" pitchFamily="34" charset="0"/>
-              </a:rPr>
-              <a:t>For </a:t>
-            </a:r>
-            <a:r>
-              <a:rPr lang="en-AU" dirty="0" err="1" smtClean="0">
-                <a:latin typeface="Arial" panose="020B0604020202020204" pitchFamily="34" charset="0"/>
-                <a:cs typeface="Arial" panose="020B0604020202020204" pitchFamily="34" charset="0"/>
-              </a:rPr>
-              <a:t>MacOS</a:t>
-            </a:r>
-            <a:r>
-              <a:rPr lang="en-AU" dirty="0" smtClean="0">
-                <a:latin typeface="Arial" panose="020B0604020202020204" pitchFamily="34" charset="0"/>
-                <a:cs typeface="Arial" panose="020B0604020202020204" pitchFamily="34" charset="0"/>
-              </a:rPr>
-              <a:t> and </a:t>
-            </a:r>
-            <a:r>
-              <a:rPr lang="en-AU" dirty="0" err="1" smtClean="0">
-                <a:latin typeface="Arial" panose="020B0604020202020204" pitchFamily="34" charset="0"/>
-                <a:cs typeface="Arial" panose="020B0604020202020204" pitchFamily="34" charset="0"/>
-              </a:rPr>
-              <a:t>linux</a:t>
-            </a:r>
-            <a:r>
-              <a:rPr lang="en-AU" dirty="0" smtClean="0">
-                <a:latin typeface="Arial" panose="020B0604020202020204" pitchFamily="34" charset="0"/>
-                <a:cs typeface="Arial" panose="020B0604020202020204" pitchFamily="34" charset="0"/>
-              </a:rPr>
-              <a:t> the command is:</a:t>
-            </a:r>
-          </a:p>
-          <a:p>
-            <a:pPr lvl="1"/>
-            <a:r>
-              <a:rPr lang="en-AU" dirty="0" smtClean="0">
-                <a:latin typeface="Lucida Sans" panose="020B0602030504020204" pitchFamily="34" charset="0"/>
-                <a:cs typeface="Arial" panose="020B0604020202020204" pitchFamily="34" charset="0"/>
-              </a:rPr>
-              <a:t>% </a:t>
-            </a:r>
-            <a:r>
-              <a:rPr lang="en-AU" dirty="0" err="1" smtClean="0">
-                <a:latin typeface="Lucida Sans" panose="020B0602030504020204" pitchFamily="34" charset="0"/>
-                <a:cs typeface="Arial" panose="020B0604020202020204" pitchFamily="34" charset="0"/>
-              </a:rPr>
-              <a:t>mkdir</a:t>
-            </a:r>
-            <a:r>
-              <a:rPr lang="en-AU" dirty="0" smtClean="0">
-                <a:latin typeface="Lucida Sans" panose="020B0602030504020204" pitchFamily="34" charset="0"/>
-                <a:cs typeface="Arial" panose="020B0604020202020204" pitchFamily="34" charset="0"/>
-              </a:rPr>
-              <a:t> Courses</a:t>
-            </a:r>
-          </a:p>
-          <a:p>
-            <a:pPr marL="285750" indent="-285750">
-              <a:buFont typeface="Wingdings" panose="05000000000000000000" pitchFamily="2" charset="2"/>
-              <a:buChar char="Ø"/>
-            </a:pPr>
-            <a:endParaRPr lang="en-AU" dirty="0" smtClean="0">
-              <a:latin typeface="Arial" panose="020B0604020202020204" pitchFamily="34" charset="0"/>
-              <a:cs typeface="Arial" panose="020B0604020202020204" pitchFamily="34" charset="0"/>
-            </a:endParaRPr>
-          </a:p>
-          <a:p>
-            <a:r>
-              <a:rPr lang="en-AU" dirty="0" smtClean="0">
-                <a:latin typeface="Arial" panose="020B0604020202020204" pitchFamily="34" charset="0"/>
-                <a:cs typeface="Arial" panose="020B0604020202020204" pitchFamily="34" charset="0"/>
-              </a:rPr>
-              <a:t>To make the courses directory the working directory, use the command “cd” </a:t>
-            </a:r>
-          </a:p>
-          <a:p>
-            <a:r>
-              <a:rPr lang="en-AU" dirty="0" smtClean="0">
-                <a:latin typeface="Arial" panose="020B0604020202020204" pitchFamily="34" charset="0"/>
-                <a:cs typeface="Arial" panose="020B0604020202020204" pitchFamily="34" charset="0"/>
-              </a:rPr>
-              <a:t>it is the same for Windows and </a:t>
-            </a:r>
-            <a:r>
-              <a:rPr lang="en-AU" dirty="0" err="1" smtClean="0">
-                <a:latin typeface="Arial" panose="020B0604020202020204" pitchFamily="34" charset="0"/>
-                <a:cs typeface="Arial" panose="020B0604020202020204" pitchFamily="34" charset="0"/>
-              </a:rPr>
-              <a:t>MacOS</a:t>
-            </a:r>
-            <a:r>
-              <a:rPr lang="en-AU" dirty="0" smtClean="0">
-                <a:latin typeface="Arial" panose="020B0604020202020204" pitchFamily="34" charset="0"/>
-                <a:cs typeface="Arial" panose="020B0604020202020204" pitchFamily="34" charset="0"/>
-              </a:rPr>
-              <a:t> </a:t>
-            </a:r>
-          </a:p>
-          <a:p>
-            <a:pPr lvl="1"/>
-            <a:r>
-              <a:rPr lang="en-AU" dirty="0" smtClean="0">
-                <a:latin typeface="Lucida Sans" panose="020B0602030504020204" pitchFamily="34" charset="0"/>
-                <a:cs typeface="Arial" panose="020B0604020202020204" pitchFamily="34" charset="0"/>
-              </a:rPr>
-              <a:t>% cd Courses</a:t>
-            </a:r>
+                <a:solidFill>
+                  <a:srgbClr val="FF0000"/>
+                </a:solidFill>
+              </a:rPr>
+              <a:t>MinTTY</a:t>
+            </a:r>
+            <a:r>
+              <a:rPr lang="en-AU" dirty="0" smtClean="0"/>
+              <a:t>” </a:t>
+            </a:r>
+          </a:p>
+          <a:p>
+            <a:endParaRPr lang="en-AU" dirty="0" smtClean="0"/>
           </a:p>
           <a:p>
             <a:endParaRPr lang="en-AU" dirty="0"/>
           </a:p>
         </p:txBody>
       </p:sp>
+      <p:pic>
+        <p:nvPicPr>
+          <p:cNvPr id="4" name="Picture 3"/>
+          <p:cNvPicPr>
+            <a:picLocks noChangeAspect="1"/>
+          </p:cNvPicPr>
+          <p:nvPr/>
+        </p:nvPicPr>
+        <p:blipFill>
+          <a:blip r:embed="rId2">
+            <a:extLst>
+              <a:ext uri="{28A0092B-C50C-407E-A947-70E740481C1C}">
+                <a14:useLocalDpi xmlns:a14="http://schemas.microsoft.com/office/drawing/2010/main" val="0"/>
+              </a:ext>
+            </a:extLst>
+          </a:blip>
+          <a:stretch>
+            <a:fillRect/>
+          </a:stretch>
+        </p:blipFill>
+        <p:spPr>
+          <a:xfrm>
+            <a:off x="6539133" y="2054681"/>
+            <a:ext cx="3895537" cy="3128436"/>
+          </a:xfrm>
+          <a:prstGeom prst="rect">
+            <a:avLst/>
+          </a:prstGeom>
+        </p:spPr>
+      </p:pic>
     </p:spTree>
     <p:extLst>
       <p:ext uri="{BB962C8B-B14F-4D97-AF65-F5344CB8AC3E}">
-        <p14:creationId xmlns:p14="http://schemas.microsoft.com/office/powerpoint/2010/main" val="3217932423"/>
+        <p14:creationId xmlns:p14="http://schemas.microsoft.com/office/powerpoint/2010/main" val="97873477"/>
       </p:ext>
     </p:extLst>
   </p:cSld>
   <p:clrMapOvr>
     <a:masterClrMapping/>
   </p:clrMapOvr>
-  <p:timing>
-    <p:tnLst>
-      <p:par>
-        <p:cTn id="1" dur="indefinite" restart="never" nodeType="tmRoot"/>
-      </p:par>
-    </p:tnLst>
-  </p:timing>
 </p:sld>
 </file>
 
@@ -8330,8 +8541,12 @@
           <a:lstStyle/>
           <a:p>
             <a:r>
+              <a:rPr lang="en-AU" dirty="0"/>
+              <a:t> </a:t>
+            </a:r>
+            <a:r>
               <a:rPr lang="en-AU" dirty="0" smtClean="0"/>
-              <a:t>Setup VM - continued</a:t>
+              <a:t>Setup VM	</a:t>
             </a:r>
             <a:endParaRPr lang="en-AU" dirty="0"/>
           </a:p>
@@ -8345,8 +8560,8 @@
         </p:nvSpPr>
         <p:spPr>
           <a:xfrm>
-            <a:off x="1504999" y="1596559"/>
-            <a:ext cx="8701319" cy="3970318"/>
+            <a:off x="1681233" y="1690688"/>
+            <a:ext cx="9011954" cy="3970318"/>
           </a:xfrm>
           <a:prstGeom prst="rect">
             <a:avLst/>
@@ -8354,159 +8569,264 @@
           <a:noFill/>
         </p:spPr>
         <p:txBody>
-          <a:bodyPr wrap="square" rtlCol="0">
+          <a:bodyPr wrap="none" rtlCol="0">
             <a:spAutoFit/>
           </a:bodyPr>
           <a:lstStyle/>
           <a:p>
             <a:r>
-              <a:rPr lang="en-AU" dirty="0" smtClean="0"/>
-              <a:t>Step 2: clone the vagrant file repository from </a:t>
-            </a:r>
-            <a:r>
-              <a:rPr lang="en-AU" dirty="0" err="1" smtClean="0"/>
-              <a:t>github</a:t>
-            </a:r>
-            <a:endParaRPr lang="en-AU" dirty="0" smtClean="0"/>
-          </a:p>
-          <a:p>
-            <a:r>
-              <a:rPr lang="en-AU" dirty="0" smtClean="0"/>
-              <a:t>For Windows and Macs this step the command is identical.</a:t>
+              <a:rPr lang="en-AU" dirty="0" smtClean="0">
+                <a:latin typeface="Arial" panose="020B0604020202020204" pitchFamily="34" charset="0"/>
+                <a:cs typeface="Arial" panose="020B0604020202020204" pitchFamily="34" charset="0"/>
+              </a:rPr>
+              <a:t>Once Vagrant </a:t>
+            </a:r>
+            <a:r>
+              <a:rPr lang="en-AU" dirty="0" err="1" smtClean="0">
+                <a:latin typeface="Arial" panose="020B0604020202020204" pitchFamily="34" charset="0"/>
+                <a:cs typeface="Arial" panose="020B0604020202020204" pitchFamily="34" charset="0"/>
+              </a:rPr>
+              <a:t>VirtualBox</a:t>
+            </a:r>
+            <a:r>
+              <a:rPr lang="en-AU" dirty="0" smtClean="0">
+                <a:latin typeface="Arial" panose="020B0604020202020204" pitchFamily="34" charset="0"/>
+                <a:cs typeface="Arial" panose="020B0604020202020204" pitchFamily="34" charset="0"/>
+              </a:rPr>
+              <a:t> and Git are installed and working, you can then begin setting </a:t>
+            </a:r>
+          </a:p>
+          <a:p>
+            <a:r>
+              <a:rPr lang="en-AU" dirty="0">
+                <a:latin typeface="Arial" panose="020B0604020202020204" pitchFamily="34" charset="0"/>
+                <a:cs typeface="Arial" panose="020B0604020202020204" pitchFamily="34" charset="0"/>
+              </a:rPr>
+              <a:t> </a:t>
+            </a:r>
+            <a:r>
+              <a:rPr lang="en-AU" dirty="0" smtClean="0">
+                <a:latin typeface="Arial" panose="020B0604020202020204" pitchFamily="34" charset="0"/>
+                <a:cs typeface="Arial" panose="020B0604020202020204" pitchFamily="34" charset="0"/>
+              </a:rPr>
+              <a:t>up a Virtual Machine or VM that will run locally on your laptop.</a:t>
+            </a:r>
+          </a:p>
+          <a:p>
+            <a:endParaRPr lang="en-AU" dirty="0" smtClean="0">
+              <a:latin typeface="Arial" panose="020B0604020202020204" pitchFamily="34" charset="0"/>
+              <a:cs typeface="Arial" panose="020B0604020202020204" pitchFamily="34" charset="0"/>
+            </a:endParaRPr>
+          </a:p>
+          <a:p>
+            <a:r>
+              <a:rPr lang="en-AU" dirty="0" smtClean="0">
+                <a:latin typeface="Arial" panose="020B0604020202020204" pitchFamily="34" charset="0"/>
+                <a:cs typeface="Arial" panose="020B0604020202020204" pitchFamily="34" charset="0"/>
+              </a:rPr>
+              <a:t>Step 1 – create the directory structure for this project. </a:t>
+            </a:r>
+          </a:p>
+          <a:p>
+            <a:r>
+              <a:rPr lang="en-AU" dirty="0" smtClean="0">
+                <a:latin typeface="Arial" panose="020B0604020202020204" pitchFamily="34" charset="0"/>
+                <a:cs typeface="Arial" panose="020B0604020202020204" pitchFamily="34" charset="0"/>
+              </a:rPr>
+              <a:t>For Windows using the </a:t>
+            </a:r>
+            <a:r>
+              <a:rPr lang="en-AU" dirty="0">
+                <a:latin typeface="Arial" panose="020B0604020202020204" pitchFamily="34" charset="0"/>
+                <a:cs typeface="Arial" panose="020B0604020202020204" pitchFamily="34" charset="0"/>
+              </a:rPr>
+              <a:t>C</a:t>
+            </a:r>
+            <a:r>
+              <a:rPr lang="en-AU" dirty="0" smtClean="0">
+                <a:latin typeface="Arial" panose="020B0604020202020204" pitchFamily="34" charset="0"/>
+                <a:cs typeface="Arial" panose="020B0604020202020204" pitchFamily="34" charset="0"/>
+              </a:rPr>
+              <a:t>ommand </a:t>
+            </a:r>
+            <a:r>
+              <a:rPr lang="en-AU" dirty="0">
+                <a:latin typeface="Arial" panose="020B0604020202020204" pitchFamily="34" charset="0"/>
+                <a:cs typeface="Arial" panose="020B0604020202020204" pitchFamily="34" charset="0"/>
+              </a:rPr>
+              <a:t>P</a:t>
+            </a:r>
+            <a:r>
+              <a:rPr lang="en-AU" dirty="0" smtClean="0">
+                <a:latin typeface="Arial" panose="020B0604020202020204" pitchFamily="34" charset="0"/>
+                <a:cs typeface="Arial" panose="020B0604020202020204" pitchFamily="34" charset="0"/>
+              </a:rPr>
+              <a:t>rompt terminal the command is:</a:t>
             </a:r>
           </a:p>
           <a:p>
             <a:pPr lvl="1"/>
+            <a:r>
+              <a:rPr lang="en-AU" dirty="0">
+                <a:latin typeface="Lucida Sans" panose="020B0602030504020204" pitchFamily="34" charset="0"/>
+                <a:cs typeface="Arial" panose="020B0604020202020204" pitchFamily="34" charset="0"/>
+              </a:rPr>
+              <a:t>%</a:t>
+            </a:r>
             <a:r>
               <a:rPr lang="en-AU" dirty="0" smtClean="0">
                 <a:latin typeface="Lucida Sans" panose="020B0602030504020204" pitchFamily="34" charset="0"/>
                 <a:cs typeface="Arial" panose="020B0604020202020204" pitchFamily="34" charset="0"/>
               </a:rPr>
-              <a:t>% git clone https</a:t>
-            </a:r>
-            <a:r>
-              <a:rPr lang="en-AU" dirty="0">
+              <a:t> </a:t>
+            </a:r>
+            <a:r>
+              <a:rPr lang="en-AU" dirty="0" err="1" smtClean="0">
                 <a:latin typeface="Lucida Sans" panose="020B0602030504020204" pitchFamily="34" charset="0"/>
                 <a:cs typeface="Arial" panose="020B0604020202020204" pitchFamily="34" charset="0"/>
               </a:rPr>
-              <a:t>://</a:t>
+              <a:t>mkdir</a:t>
             </a:r>
             <a:r>
               <a:rPr lang="en-AU" dirty="0" smtClean="0">
                 <a:latin typeface="Lucida Sans" panose="020B0602030504020204" pitchFamily="34" charset="0"/>
                 <a:cs typeface="Arial" panose="020B0604020202020204" pitchFamily="34" charset="0"/>
               </a:rPr>
-              <a:t>github.com/chrisbpawsey/Data1001.git</a:t>
-            </a:r>
-          </a:p>
-          <a:p>
-            <a:pPr lvl="1"/>
+              <a:t> Courses</a:t>
+            </a:r>
+          </a:p>
+          <a:p>
+            <a:pPr marL="285750" indent="-285750">
+              <a:buFont typeface="Wingdings" panose="05000000000000000000" pitchFamily="2" charset="2"/>
+              <a:buChar char="Ø"/>
+            </a:pPr>
             <a:endParaRPr lang="en-AU" dirty="0" smtClean="0">
-              <a:latin typeface="Lucida Sans" panose="020B0602030504020204" pitchFamily="34" charset="0"/>
+              <a:latin typeface="Arial" panose="020B0604020202020204" pitchFamily="34" charset="0"/>
               <a:cs typeface="Arial" panose="020B0604020202020204" pitchFamily="34" charset="0"/>
             </a:endParaRPr>
           </a:p>
           <a:p>
             <a:r>
-              <a:rPr lang="en-AU" dirty="0" smtClean="0"/>
-              <a:t>To verify that the command worked you can inspect the current directory for the new folder.</a:t>
-            </a:r>
-          </a:p>
-          <a:p>
-            <a:r>
-              <a:rPr lang="en-AU" dirty="0" smtClean="0"/>
-              <a:t>On Windows:</a:t>
-            </a:r>
-          </a:p>
-          <a:p>
-            <a:pPr marL="742950" lvl="1" indent="-285750">
-              <a:buFont typeface="Arial" panose="020B0604020202020204" pitchFamily="34" charset="0"/>
-              <a:buChar char="•"/>
-            </a:pPr>
+              <a:rPr lang="en-AU" dirty="0" smtClean="0">
+                <a:latin typeface="Arial" panose="020B0604020202020204" pitchFamily="34" charset="0"/>
+                <a:cs typeface="Arial" panose="020B0604020202020204" pitchFamily="34" charset="0"/>
+              </a:rPr>
+              <a:t>For </a:t>
+            </a:r>
+            <a:r>
+              <a:rPr lang="en-AU" dirty="0" err="1" smtClean="0">
+                <a:latin typeface="Arial" panose="020B0604020202020204" pitchFamily="34" charset="0"/>
+                <a:cs typeface="Arial" panose="020B0604020202020204" pitchFamily="34" charset="0"/>
+              </a:rPr>
+              <a:t>MacOS</a:t>
+            </a:r>
+            <a:r>
+              <a:rPr lang="en-AU" dirty="0" smtClean="0">
+                <a:latin typeface="Arial" panose="020B0604020202020204" pitchFamily="34" charset="0"/>
+                <a:cs typeface="Arial" panose="020B0604020202020204" pitchFamily="34" charset="0"/>
+              </a:rPr>
+              <a:t> and </a:t>
+            </a:r>
+            <a:r>
+              <a:rPr lang="en-AU" dirty="0" err="1" smtClean="0">
+                <a:latin typeface="Arial" panose="020B0604020202020204" pitchFamily="34" charset="0"/>
+                <a:cs typeface="Arial" panose="020B0604020202020204" pitchFamily="34" charset="0"/>
+              </a:rPr>
+              <a:t>linux</a:t>
+            </a:r>
+            <a:r>
+              <a:rPr lang="en-AU" dirty="0" smtClean="0">
+                <a:latin typeface="Arial" panose="020B0604020202020204" pitchFamily="34" charset="0"/>
+                <a:cs typeface="Arial" panose="020B0604020202020204" pitchFamily="34" charset="0"/>
+              </a:rPr>
+              <a:t> the command is:</a:t>
+            </a:r>
+          </a:p>
+          <a:p>
+            <a:pPr lvl="1"/>
+            <a:r>
+              <a:rPr lang="en-AU" dirty="0" smtClean="0">
+                <a:latin typeface="Lucida Sans" panose="020B0602030504020204" pitchFamily="34" charset="0"/>
+                <a:cs typeface="Arial" panose="020B0604020202020204" pitchFamily="34" charset="0"/>
+              </a:rPr>
+              <a:t>% </a:t>
+            </a:r>
             <a:r>
               <a:rPr lang="en-AU" dirty="0" err="1" smtClean="0">
                 <a:latin typeface="Lucida Sans" panose="020B0602030504020204" pitchFamily="34" charset="0"/>
                 <a:cs typeface="Arial" panose="020B0604020202020204" pitchFamily="34" charset="0"/>
               </a:rPr>
-              <a:t>dir</a:t>
-            </a:r>
+              <a:t>mkdir</a:t>
+            </a:r>
+            <a:r>
+              <a:rPr lang="en-AU" dirty="0" smtClean="0">
+                <a:latin typeface="Lucida Sans" panose="020B0602030504020204" pitchFamily="34" charset="0"/>
+                <a:cs typeface="Arial" panose="020B0604020202020204" pitchFamily="34" charset="0"/>
+              </a:rPr>
+              <a:t> Courses</a:t>
+            </a:r>
+          </a:p>
+          <a:p>
+            <a:pPr marL="285750" indent="-285750">
+              <a:buFont typeface="Wingdings" panose="05000000000000000000" pitchFamily="2" charset="2"/>
+              <a:buChar char="Ø"/>
+            </a:pPr>
+            <a:endParaRPr lang="en-AU" dirty="0" smtClean="0">
+              <a:latin typeface="Arial" panose="020B0604020202020204" pitchFamily="34" charset="0"/>
+              <a:cs typeface="Arial" panose="020B0604020202020204" pitchFamily="34" charset="0"/>
+            </a:endParaRPr>
+          </a:p>
+          <a:p>
             <a:r>
               <a:rPr lang="en-AU" dirty="0" smtClean="0">
                 <a:latin typeface="Arial" panose="020B0604020202020204" pitchFamily="34" charset="0"/>
                 <a:cs typeface="Arial" panose="020B0604020202020204" pitchFamily="34" charset="0"/>
               </a:rPr>
+              <a:t>To make the courses directory the working directory, use the command “cd” </a:t>
+            </a:r>
+          </a:p>
+          <a:p>
+            <a:r>
+              <a:rPr lang="en-AU" dirty="0" smtClean="0">
+                <a:latin typeface="Arial" panose="020B0604020202020204" pitchFamily="34" charset="0"/>
+                <a:cs typeface="Arial" panose="020B0604020202020204" pitchFamily="34" charset="0"/>
+              </a:rPr>
+              <a:t>it is the same for Windows and </a:t>
+            </a:r>
+            <a:r>
+              <a:rPr lang="en-AU" dirty="0" err="1" smtClean="0">
+                <a:latin typeface="Arial" panose="020B0604020202020204" pitchFamily="34" charset="0"/>
+                <a:cs typeface="Arial" panose="020B0604020202020204" pitchFamily="34" charset="0"/>
+              </a:rPr>
+              <a:t>MacOS</a:t>
+            </a:r>
+            <a:r>
+              <a:rPr lang="en-AU" dirty="0" smtClean="0">
+                <a:latin typeface="Arial" panose="020B0604020202020204" pitchFamily="34" charset="0"/>
+                <a:cs typeface="Arial" panose="020B0604020202020204" pitchFamily="34" charset="0"/>
+              </a:rPr>
               <a:t> </a:t>
             </a:r>
-            <a:r>
-              <a:rPr lang="en-AU" dirty="0" smtClean="0"/>
-              <a:t>   --- this shows all the files and sub-directories in the current folder</a:t>
-            </a:r>
-          </a:p>
-          <a:p>
-            <a:r>
-              <a:rPr lang="en-AU" dirty="0" smtClean="0"/>
-              <a:t>On </a:t>
-            </a:r>
-            <a:r>
-              <a:rPr lang="en-AU" dirty="0" err="1" smtClean="0"/>
-              <a:t>Macbooks</a:t>
-            </a:r>
-            <a:r>
-              <a:rPr lang="en-AU" dirty="0" smtClean="0"/>
-              <a:t>/Linux</a:t>
-            </a:r>
-          </a:p>
-          <a:p>
-            <a:pPr marL="742950" lvl="1" indent="-285750">
-              <a:buFont typeface="Arial" panose="020B0604020202020204" pitchFamily="34" charset="0"/>
-              <a:buChar char="•"/>
-            </a:pPr>
+          </a:p>
+          <a:p>
+            <a:pPr lvl="1"/>
             <a:r>
               <a:rPr lang="en-AU" dirty="0" smtClean="0">
                 <a:latin typeface="Lucida Sans" panose="020B0602030504020204" pitchFamily="34" charset="0"/>
                 <a:cs typeface="Arial" panose="020B0604020202020204" pitchFamily="34" charset="0"/>
               </a:rPr>
-              <a:t>ls</a:t>
-            </a:r>
-            <a:r>
-              <a:rPr lang="en-AU" dirty="0" smtClean="0">
-                <a:latin typeface="Arial" panose="020B0604020202020204" pitchFamily="34" charset="0"/>
-                <a:cs typeface="Arial" panose="020B0604020202020204" pitchFamily="34" charset="0"/>
-              </a:rPr>
-              <a:t> </a:t>
-            </a:r>
-            <a:r>
-              <a:rPr lang="en-AU" dirty="0" smtClean="0"/>
-              <a:t> -- LIST so that is lower case L </a:t>
-            </a:r>
+              <a:t>% cd Courses</a:t>
+            </a:r>
+          </a:p>
+          <a:p>
             <a:endParaRPr lang="en-AU" dirty="0"/>
-          </a:p>
-          <a:p>
-            <a:pPr lvl="1"/>
-            <a:endParaRPr lang="en-AU" dirty="0" smtClean="0"/>
-          </a:p>
-          <a:p>
-            <a:r>
-              <a:rPr lang="en-AU" dirty="0" smtClean="0"/>
-              <a:t>You should see a directory Data1001.</a:t>
-            </a:r>
-          </a:p>
-          <a:p>
-            <a:endParaRPr lang="en-AU" dirty="0" smtClean="0"/>
-          </a:p>
-          <a:p>
-            <a:pPr lvl="1"/>
-            <a:endParaRPr lang="en-AU" dirty="0" smtClean="0"/>
-          </a:p>
-          <a:p>
-            <a:endParaRPr lang="en-AU" dirty="0" smtClean="0"/>
           </a:p>
         </p:txBody>
       </p:sp>
     </p:spTree>
     <p:extLst>
       <p:ext uri="{BB962C8B-B14F-4D97-AF65-F5344CB8AC3E}">
-        <p14:creationId xmlns:p14="http://schemas.microsoft.com/office/powerpoint/2010/main" val="424716276"/>
+        <p14:creationId xmlns:p14="http://schemas.microsoft.com/office/powerpoint/2010/main" val="3217932423"/>
       </p:ext>
     </p:extLst>
   </p:cSld>
@@ -8550,12 +8870,7 @@
             <p:ph type="title"/>
           </p:nvPr>
         </p:nvSpPr>
-        <p:spPr>
-          <a:xfrm>
-            <a:off x="777062" y="375493"/>
-            <a:ext cx="10364451" cy="1206165"/>
-          </a:xfrm>
-        </p:spPr>
+        <p:spPr/>
         <p:txBody>
           <a:bodyPr/>
           <a:lstStyle/>
@@ -8576,8 +8891,8 @@
         </p:nvSpPr>
         <p:spPr>
           <a:xfrm>
-            <a:off x="838200" y="1385047"/>
-            <a:ext cx="10378888" cy="4370427"/>
+            <a:off x="1504999" y="1596559"/>
+            <a:ext cx="8701319" cy="3970318"/>
           </a:xfrm>
           <a:prstGeom prst="rect">
             <a:avLst/>
@@ -8591,159 +8906,47 @@
           <a:lstStyle/>
           <a:p>
             <a:r>
-              <a:rPr lang="en-AU" dirty="0" smtClean="0">
-                <a:latin typeface="Arial" panose="020B0604020202020204" pitchFamily="34" charset="0"/>
-                <a:cs typeface="Arial" panose="020B0604020202020204" pitchFamily="34" charset="0"/>
-              </a:rPr>
-              <a:t>Step 3: Change director into the course/Data1001 directory</a:t>
-            </a:r>
-          </a:p>
-          <a:p>
-            <a:pPr lvl="2"/>
+              <a:rPr lang="en-AU" dirty="0" smtClean="0"/>
+              <a:t>Step 2: clone the vagrant file repository from </a:t>
+            </a:r>
+            <a:r>
+              <a:rPr lang="en-AU" dirty="0" err="1" smtClean="0"/>
+              <a:t>github</a:t>
+            </a:r>
+            <a:endParaRPr lang="en-AU" dirty="0" smtClean="0"/>
+          </a:p>
+          <a:p>
+            <a:r>
+              <a:rPr lang="en-AU" dirty="0" smtClean="0"/>
+              <a:t>For Windows and Macs this step the command is identical.</a:t>
+            </a:r>
+          </a:p>
+          <a:p>
+            <a:pPr lvl="1"/>
             <a:r>
               <a:rPr lang="en-AU" dirty="0" smtClean="0">
                 <a:latin typeface="Lucida Sans" panose="020B0602030504020204" pitchFamily="34" charset="0"/>
                 <a:cs typeface="Arial" panose="020B0604020202020204" pitchFamily="34" charset="0"/>
               </a:rPr>
-              <a:t>% cd Course </a:t>
-            </a:r>
-          </a:p>
-          <a:p>
-            <a:r>
-              <a:rPr lang="en-AU" dirty="0" smtClean="0">
-                <a:latin typeface="Arial" panose="020B0604020202020204" pitchFamily="34" charset="0"/>
-                <a:cs typeface="Arial" panose="020B0604020202020204" pitchFamily="34" charset="0"/>
-              </a:rPr>
-              <a:t>You can check that it worked using the “ls” or “</a:t>
-            </a:r>
-            <a:r>
-              <a:rPr lang="en-AU" dirty="0" err="1" smtClean="0">
-                <a:latin typeface="Arial" panose="020B0604020202020204" pitchFamily="34" charset="0"/>
-                <a:cs typeface="Arial" panose="020B0604020202020204" pitchFamily="34" charset="0"/>
-              </a:rPr>
-              <a:t>dir</a:t>
-            </a:r>
-            <a:r>
-              <a:rPr lang="en-AU" dirty="0" smtClean="0">
-                <a:latin typeface="Arial" panose="020B0604020202020204" pitchFamily="34" charset="0"/>
-                <a:cs typeface="Arial" panose="020B0604020202020204" pitchFamily="34" charset="0"/>
-              </a:rPr>
-              <a:t>” command and you should see a file named</a:t>
-            </a:r>
-          </a:p>
-          <a:p>
-            <a:r>
-              <a:rPr lang="en-AU" dirty="0" smtClean="0">
-                <a:latin typeface="Arial" panose="020B0604020202020204" pitchFamily="34" charset="0"/>
-                <a:cs typeface="Arial" panose="020B0604020202020204" pitchFamily="34" charset="0"/>
-              </a:rPr>
-              <a:t>“</a:t>
-            </a:r>
-            <a:r>
-              <a:rPr lang="en-AU" dirty="0" err="1" smtClean="0">
-                <a:latin typeface="Arial" panose="020B0604020202020204" pitchFamily="34" charset="0"/>
-                <a:cs typeface="Arial" panose="020B0604020202020204" pitchFamily="34" charset="0"/>
-              </a:rPr>
-              <a:t>Vagrantfile</a:t>
-            </a:r>
-            <a:r>
-              <a:rPr lang="en-AU" dirty="0" smtClean="0">
-                <a:latin typeface="Arial" panose="020B0604020202020204" pitchFamily="34" charset="0"/>
-                <a:cs typeface="Arial" panose="020B0604020202020204" pitchFamily="34" charset="0"/>
-              </a:rPr>
-              <a:t>”  it contains the instructions to setup the Virtual Machine.  You don’t need to make </a:t>
-            </a:r>
-          </a:p>
-          <a:p>
-            <a:r>
-              <a:rPr lang="en-AU" dirty="0" smtClean="0">
-                <a:latin typeface="Arial" panose="020B0604020202020204" pitchFamily="34" charset="0"/>
-                <a:cs typeface="Arial" panose="020B0604020202020204" pitchFamily="34" charset="0"/>
-              </a:rPr>
-              <a:t>changes to it.</a:t>
-            </a:r>
-          </a:p>
-          <a:p>
-            <a:endParaRPr lang="en-AU" dirty="0" smtClean="0">
-              <a:latin typeface="Arial" panose="020B0604020202020204" pitchFamily="34" charset="0"/>
-              <a:cs typeface="Arial" panose="020B0604020202020204" pitchFamily="34" charset="0"/>
-            </a:endParaRPr>
-          </a:p>
-          <a:p>
-            <a:r>
-              <a:rPr lang="en-AU" dirty="0" smtClean="0">
-                <a:latin typeface="Arial" panose="020B0604020202020204" pitchFamily="34" charset="0"/>
-                <a:cs typeface="Arial" panose="020B0604020202020204" pitchFamily="34" charset="0"/>
-              </a:rPr>
-              <a:t>Step 3a: Creating the VM</a:t>
-            </a:r>
-            <a:endParaRPr lang="en-AU" dirty="0">
-              <a:latin typeface="Arial" panose="020B0604020202020204" pitchFamily="34" charset="0"/>
-              <a:cs typeface="Arial" panose="020B0604020202020204" pitchFamily="34" charset="0"/>
-            </a:endParaRPr>
-          </a:p>
-          <a:p>
-            <a:r>
-              <a:rPr lang="en-AU" dirty="0" smtClean="0">
-                <a:latin typeface="Arial" panose="020B0604020202020204" pitchFamily="34" charset="0"/>
-                <a:cs typeface="Arial" panose="020B0604020202020204" pitchFamily="34" charset="0"/>
-              </a:rPr>
-              <a:t>To create the VM, you must be in same directory as </a:t>
-            </a:r>
-            <a:r>
-              <a:rPr lang="en-AU" dirty="0" err="1" smtClean="0">
-                <a:latin typeface="Arial" panose="020B0604020202020204" pitchFamily="34" charset="0"/>
-                <a:cs typeface="Arial" panose="020B0604020202020204" pitchFamily="34" charset="0"/>
-              </a:rPr>
-              <a:t>Vagrantfile</a:t>
-            </a:r>
-            <a:r>
-              <a:rPr lang="en-AU" dirty="0" smtClean="0">
-                <a:latin typeface="Arial" panose="020B0604020202020204" pitchFamily="34" charset="0"/>
-                <a:cs typeface="Arial" panose="020B0604020202020204" pitchFamily="34" charset="0"/>
-              </a:rPr>
-              <a:t> which is the </a:t>
-            </a:r>
-            <a:r>
-              <a:rPr lang="en-AU" b="1" dirty="0" smtClean="0">
-                <a:latin typeface="Arial" panose="020B0604020202020204" pitchFamily="34" charset="0"/>
-                <a:cs typeface="Arial" panose="020B0604020202020204" pitchFamily="34" charset="0"/>
-              </a:rPr>
-              <a:t>Data1001 </a:t>
-            </a:r>
-            <a:r>
-              <a:rPr lang="en-AU" dirty="0" smtClean="0">
-                <a:latin typeface="Arial" panose="020B0604020202020204" pitchFamily="34" charset="0"/>
-                <a:cs typeface="Arial" panose="020B0604020202020204" pitchFamily="34" charset="0"/>
-              </a:rPr>
-              <a:t>directory.</a:t>
-            </a:r>
-          </a:p>
-          <a:p>
-            <a:r>
-              <a:rPr lang="en-AU" dirty="0" smtClean="0">
-                <a:latin typeface="Arial" panose="020B0604020202020204" pitchFamily="34" charset="0"/>
-                <a:cs typeface="Arial" panose="020B0604020202020204" pitchFamily="34" charset="0"/>
-              </a:rPr>
-              <a:t>To create the VM the Vagrant command is </a:t>
-            </a:r>
-            <a:endParaRPr lang="en-AU" dirty="0">
-              <a:latin typeface="Arial" panose="020B0604020202020204" pitchFamily="34" charset="0"/>
-              <a:cs typeface="Arial" panose="020B0604020202020204" pitchFamily="34" charset="0"/>
-            </a:endParaRPr>
-          </a:p>
-          <a:p>
-            <a:pPr lvl="2"/>
+              <a:t>% git clone https</a:t>
+            </a:r>
+            <a:r>
+              <a:rPr lang="en-AU" dirty="0">
+                <a:latin typeface="Lucida Sans" panose="020B0602030504020204" pitchFamily="34" charset="0"/>
+                <a:cs typeface="Arial" panose="020B0604020202020204" pitchFamily="34" charset="0"/>
+              </a:rPr>
+              <a:t>://</a:t>
+            </a:r>
             <a:r>
               <a:rPr lang="en-AU" dirty="0" smtClean="0">
                 <a:latin typeface="Lucida Sans" panose="020B0602030504020204" pitchFamily="34" charset="0"/>
                 <a:cs typeface="Arial" panose="020B0604020202020204" pitchFamily="34" charset="0"/>
               </a:rPr>
-              <a:t>% vagrant up</a:t>
-            </a:r>
-          </a:p>
-          <a:p>
-            <a:pPr lvl="2"/>
+              <a:t>github.com/adrianopolpo/stat1400.git</a:t>
+            </a:r>
+          </a:p>
+          <a:p>
+            <a:pPr lvl="1"/>
             <a:endParaRPr lang="en-AU" dirty="0" smtClean="0">
               <a:latin typeface="Lucida Sans" panose="020B0602030504020204" pitchFamily="34" charset="0"/>
               <a:cs typeface="Arial" panose="020B0604020202020204" pitchFamily="34" charset="0"/>
@@ -8751,63 +8954,105 @@
           </a:p>
           <a:p>
             <a:r>
-              <a:rPr lang="en-AU" sz="2000" dirty="0" smtClean="0">
-                <a:solidFill>
-                  <a:srgbClr val="FF0000"/>
-                </a:solidFill>
+              <a:rPr lang="en-AU" dirty="0" smtClean="0"/>
+              <a:t>To verify that the command worked you can inspect the current directory for the new folder.</a:t>
+            </a:r>
+          </a:p>
+          <a:p>
+            <a:r>
+              <a:rPr lang="en-AU" dirty="0" smtClean="0"/>
+              <a:t>On Windows:</a:t>
+            </a:r>
+          </a:p>
+          <a:p>
+            <a:pPr marL="742950" lvl="1" indent="-285750">
+              <a:buFont typeface="Arial" panose="020B0604020202020204" pitchFamily="34" charset="0"/>
+              <a:buChar char="•"/>
+            </a:pPr>
+            <a:r>
+              <a:rPr lang="en-AU" dirty="0" err="1" smtClean="0">
+                <a:latin typeface="Lucida Sans" panose="020B0602030504020204" pitchFamily="34" charset="0"/>
+                <a:cs typeface="Arial" panose="020B0604020202020204" pitchFamily="34" charset="0"/>
+              </a:rPr>
+              <a:t>dir</a:t>
+            </a:r>
+            <a:r>
+              <a:rPr lang="en-AU" dirty="0" smtClean="0">
                 <a:latin typeface="Arial" panose="020B0604020202020204" pitchFamily="34" charset="0"/>
                 <a:cs typeface="Arial" panose="020B0604020202020204" pitchFamily="34" charset="0"/>
               </a:rPr>
-              <a:t>Coffee/Tea Break:</a:t>
-            </a:r>
-          </a:p>
-          <a:p>
-            <a:r>
-              <a:rPr lang="en-AU" sz="2000" dirty="0" smtClean="0">
-                <a:solidFill>
-                  <a:srgbClr val="FF0000"/>
-                </a:solidFill>
+              <a:t> </a:t>
+            </a:r>
+            <a:r>
+              <a:rPr lang="en-AU" dirty="0" smtClean="0"/>
+              <a:t>   --- this shows all the files and sub-directories in the current folder</a:t>
+            </a:r>
+          </a:p>
+          <a:p>
+            <a:r>
+              <a:rPr lang="en-AU" dirty="0" smtClean="0"/>
+              <a:t>On </a:t>
+            </a:r>
+            <a:r>
+              <a:rPr lang="en-AU" dirty="0" err="1" smtClean="0"/>
+              <a:t>Macbooks</a:t>
+            </a:r>
+            <a:r>
+              <a:rPr lang="en-AU" dirty="0" smtClean="0"/>
+              <a:t>/Linux</a:t>
+            </a:r>
+          </a:p>
+          <a:p>
+            <a:pPr marL="742950" lvl="1" indent="-285750">
+              <a:buFont typeface="Arial" panose="020B0604020202020204" pitchFamily="34" charset="0"/>
+              <a:buChar char="•"/>
+            </a:pPr>
+            <a:r>
+              <a:rPr lang="en-AU" dirty="0" smtClean="0">
+                <a:latin typeface="Lucida Sans" panose="020B0602030504020204" pitchFamily="34" charset="0"/>
+                <a:cs typeface="Arial" panose="020B0604020202020204" pitchFamily="34" charset="0"/>
+              </a:rPr>
+              <a:t>ls</a:t>
+            </a:r>
+            <a:r>
+              <a:rPr lang="en-AU" dirty="0" smtClean="0">
                 <a:latin typeface="Arial" panose="020B0604020202020204" pitchFamily="34" charset="0"/>
                 <a:cs typeface="Arial" panose="020B0604020202020204" pitchFamily="34" charset="0"/>
               </a:rPr>
-              <a:t>This </a:t>
-            </a:r>
-            <a:r>
-              <a:rPr lang="en-AU" sz="2000" b="1" dirty="0" smtClean="0">
-                <a:solidFill>
-                  <a:srgbClr val="FF0000"/>
-                </a:solidFill>
-                <a:latin typeface="Arial" panose="020B0604020202020204" pitchFamily="34" charset="0"/>
-                <a:cs typeface="Arial" panose="020B0604020202020204" pitchFamily="34" charset="0"/>
-              </a:rPr>
-              <a:t>will take some time</a:t>
-            </a:r>
-            <a:r>
-              <a:rPr lang="en-AU" sz="2000" dirty="0" smtClean="0">
-                <a:solidFill>
-                  <a:srgbClr val="FF0000"/>
-                </a:solidFill>
-                <a:latin typeface="Arial" panose="020B0604020202020204" pitchFamily="34" charset="0"/>
-                <a:cs typeface="Arial" panose="020B0604020202020204" pitchFamily="34" charset="0"/>
-              </a:rPr>
-              <a:t> as it automatically downloading and configuring the base Ubuntu OS image that is used for your VM</a:t>
-            </a:r>
-            <a:r>
-              <a:rPr lang="en-AU" sz="2000" dirty="0" smtClean="0">
-                <a:solidFill>
-                  <a:srgbClr val="FF0000"/>
-                </a:solidFill>
-                <a:latin typeface="Lucida Sans" panose="020B0602030504020204" pitchFamily="34" charset="0"/>
-              </a:rPr>
-              <a:t>.  It is dependent on your internet connection and laptop.</a:t>
-            </a:r>
+              <a:t> </a:t>
+            </a:r>
+            <a:r>
+              <a:rPr lang="en-AU" dirty="0" smtClean="0"/>
+              <a:t> -- LIST so that is lower case L </a:t>
+            </a:r>
+            <a:endParaRPr lang="en-AU" dirty="0"/>
+          </a:p>
+          <a:p>
+            <a:pPr lvl="1"/>
+            <a:endParaRPr lang="en-AU" dirty="0" smtClean="0"/>
+          </a:p>
+          <a:p>
+            <a:r>
+              <a:rPr lang="en-AU" dirty="0" smtClean="0"/>
+              <a:t>You should see a directory stat1400.</a:t>
+            </a:r>
+          </a:p>
+          <a:p>
+            <a:endParaRPr lang="en-AU" dirty="0" smtClean="0"/>
+          </a:p>
+          <a:p>
+            <a:pPr lvl="1"/>
+            <a:endParaRPr lang="en-AU" dirty="0" smtClean="0"/>
+          </a:p>
+          <a:p>
+            <a:endParaRPr lang="en-AU" dirty="0" smtClean="0"/>
           </a:p>
         </p:txBody>
       </p:sp>
     </p:spTree>
     <p:extLst>
       <p:ext uri="{BB962C8B-B14F-4D97-AF65-F5344CB8AC3E}">
-        <p14:creationId xmlns:p14="http://schemas.microsoft.com/office/powerpoint/2010/main" val="1038201013"/>
+        <p14:creationId xmlns:p14="http://schemas.microsoft.com/office/powerpoint/2010/main" val="424716276"/>
       </p:ext>
     </p:extLst>
   </p:cSld>
@@ -8863,7 +9108,7 @@
           <a:p>
             <a:r>
               <a:rPr lang="en-AU" dirty="0" smtClean="0"/>
-              <a:t>VM success</a:t>
+              <a:t>Setup VM - continued</a:t>
             </a:r>
             <a:endParaRPr lang="en-AU" dirty="0"/>
           </a:p>
@@ -8877,8 +9122,8 @@
         </p:nvSpPr>
         <p:spPr>
           <a:xfrm>
-            <a:off x="762625" y="1581658"/>
-            <a:ext cx="10378888" cy="2554545"/>
+            <a:off x="838200" y="1385047"/>
+            <a:ext cx="10378888" cy="4370427"/>
           </a:xfrm>
           <a:prstGeom prst="rect">
             <a:avLst/>
@@ -8890,6 +9135,166 @@
             <a:spAutoFit/>
           </a:bodyPr>
           <a:lstStyle/>
+          <a:p>
+            <a:r>
+              <a:rPr lang="en-AU" dirty="0" smtClean="0">
+                <a:latin typeface="Arial" panose="020B0604020202020204" pitchFamily="34" charset="0"/>
+                <a:cs typeface="Arial" panose="020B0604020202020204" pitchFamily="34" charset="0"/>
+              </a:rPr>
+              <a:t>Step 3: Change director into the course/stat1400 directory</a:t>
+            </a:r>
+          </a:p>
+          <a:p>
+            <a:pPr lvl="2"/>
+            <a:r>
+              <a:rPr lang="en-AU" dirty="0" smtClean="0">
+                <a:latin typeface="Lucida Sans" panose="020B0602030504020204" pitchFamily="34" charset="0"/>
+                <a:cs typeface="Arial" panose="020B0604020202020204" pitchFamily="34" charset="0"/>
+              </a:rPr>
+              <a:t>% cd Course </a:t>
+            </a:r>
+          </a:p>
+          <a:p>
+            <a:r>
+              <a:rPr lang="en-AU" dirty="0" smtClean="0">
+                <a:latin typeface="Arial" panose="020B0604020202020204" pitchFamily="34" charset="0"/>
+                <a:cs typeface="Arial" panose="020B0604020202020204" pitchFamily="34" charset="0"/>
+              </a:rPr>
+              <a:t>You can check that it worked using the “ls” or “</a:t>
+            </a:r>
+            <a:r>
+              <a:rPr lang="en-AU" dirty="0" err="1" smtClean="0">
+                <a:latin typeface="Arial" panose="020B0604020202020204" pitchFamily="34" charset="0"/>
+                <a:cs typeface="Arial" panose="020B0604020202020204" pitchFamily="34" charset="0"/>
+              </a:rPr>
+              <a:t>dir</a:t>
+            </a:r>
+            <a:r>
+              <a:rPr lang="en-AU" dirty="0" smtClean="0">
+                <a:latin typeface="Arial" panose="020B0604020202020204" pitchFamily="34" charset="0"/>
+                <a:cs typeface="Arial" panose="020B0604020202020204" pitchFamily="34" charset="0"/>
+              </a:rPr>
+              <a:t>” command and you should see a file named</a:t>
+            </a:r>
+          </a:p>
+          <a:p>
+            <a:r>
+              <a:rPr lang="en-AU" dirty="0" smtClean="0">
+                <a:latin typeface="Arial" panose="020B0604020202020204" pitchFamily="34" charset="0"/>
+                <a:cs typeface="Arial" panose="020B0604020202020204" pitchFamily="34" charset="0"/>
+              </a:rPr>
+              <a:t>“</a:t>
+            </a:r>
+            <a:r>
+              <a:rPr lang="en-AU" dirty="0" err="1" smtClean="0">
+                <a:latin typeface="Arial" panose="020B0604020202020204" pitchFamily="34" charset="0"/>
+                <a:cs typeface="Arial" panose="020B0604020202020204" pitchFamily="34" charset="0"/>
+              </a:rPr>
+              <a:t>Vagrantfile</a:t>
+            </a:r>
+            <a:r>
+              <a:rPr lang="en-AU" dirty="0" smtClean="0">
+                <a:latin typeface="Arial" panose="020B0604020202020204" pitchFamily="34" charset="0"/>
+                <a:cs typeface="Arial" panose="020B0604020202020204" pitchFamily="34" charset="0"/>
+              </a:rPr>
+              <a:t>”  it contains the instructions to setup the Virtual Machine.  You don’t need to make </a:t>
+            </a:r>
+          </a:p>
+          <a:p>
+            <a:r>
+              <a:rPr lang="en-AU" dirty="0" smtClean="0">
+                <a:latin typeface="Arial" panose="020B0604020202020204" pitchFamily="34" charset="0"/>
+                <a:cs typeface="Arial" panose="020B0604020202020204" pitchFamily="34" charset="0"/>
+              </a:rPr>
+              <a:t>changes to it.</a:t>
+            </a:r>
+          </a:p>
+          <a:p>
+            <a:endParaRPr lang="en-AU" dirty="0" smtClean="0">
+              <a:latin typeface="Arial" panose="020B0604020202020204" pitchFamily="34" charset="0"/>
+              <a:cs typeface="Arial" panose="020B0604020202020204" pitchFamily="34" charset="0"/>
+            </a:endParaRPr>
+          </a:p>
+          <a:p>
+            <a:r>
+              <a:rPr lang="en-AU" dirty="0" smtClean="0">
+                <a:latin typeface="Arial" panose="020B0604020202020204" pitchFamily="34" charset="0"/>
+                <a:cs typeface="Arial" panose="020B0604020202020204" pitchFamily="34" charset="0"/>
+              </a:rPr>
+              <a:t>Step 3a: Creating the VM</a:t>
+            </a:r>
+            <a:endParaRPr lang="en-AU" dirty="0">
+              <a:latin typeface="Arial" panose="020B0604020202020204" pitchFamily="34" charset="0"/>
+              <a:cs typeface="Arial" panose="020B0604020202020204" pitchFamily="34" charset="0"/>
+            </a:endParaRPr>
+          </a:p>
+          <a:p>
+            <a:r>
+              <a:rPr lang="en-AU" dirty="0" smtClean="0">
+                <a:latin typeface="Arial" panose="020B0604020202020204" pitchFamily="34" charset="0"/>
+                <a:cs typeface="Arial" panose="020B0604020202020204" pitchFamily="34" charset="0"/>
+              </a:rPr>
+              <a:t>To create the VM, you must be in same directory as </a:t>
+            </a:r>
+            <a:r>
+              <a:rPr lang="en-AU" dirty="0" err="1" smtClean="0">
+                <a:latin typeface="Arial" panose="020B0604020202020204" pitchFamily="34" charset="0"/>
+                <a:cs typeface="Arial" panose="020B0604020202020204" pitchFamily="34" charset="0"/>
+              </a:rPr>
+              <a:t>Vagrantfile</a:t>
+            </a:r>
+            <a:r>
+              <a:rPr lang="en-AU" dirty="0" smtClean="0">
+                <a:latin typeface="Arial" panose="020B0604020202020204" pitchFamily="34" charset="0"/>
+                <a:cs typeface="Arial" panose="020B0604020202020204" pitchFamily="34" charset="0"/>
+              </a:rPr>
+              <a:t> which is the </a:t>
+            </a:r>
+            <a:r>
+              <a:rPr lang="en-AU" b="1" dirty="0" smtClean="0">
+                <a:latin typeface="Arial" panose="020B0604020202020204" pitchFamily="34" charset="0"/>
+                <a:cs typeface="Arial" panose="020B0604020202020204" pitchFamily="34" charset="0"/>
+              </a:rPr>
+              <a:t>stat1400 </a:t>
+            </a:r>
+            <a:r>
+              <a:rPr lang="en-AU" dirty="0" smtClean="0">
+                <a:latin typeface="Arial" panose="020B0604020202020204" pitchFamily="34" charset="0"/>
+                <a:cs typeface="Arial" panose="020B0604020202020204" pitchFamily="34" charset="0"/>
+              </a:rPr>
+              <a:t>directory.</a:t>
+            </a:r>
+          </a:p>
+          <a:p>
+            <a:r>
+              <a:rPr lang="en-AU" dirty="0" smtClean="0">
+                <a:latin typeface="Arial" panose="020B0604020202020204" pitchFamily="34" charset="0"/>
+                <a:cs typeface="Arial" panose="020B0604020202020204" pitchFamily="34" charset="0"/>
+              </a:rPr>
+              <a:t>To create the VM the Vagrant command is </a:t>
+            </a:r>
+            <a:endParaRPr lang="en-AU" dirty="0">
+              <a:latin typeface="Arial" panose="020B0604020202020204" pitchFamily="34" charset="0"/>
+              <a:cs typeface="Arial" panose="020B0604020202020204" pitchFamily="34" charset="0"/>
+            </a:endParaRPr>
+          </a:p>
+          <a:p>
+            <a:pPr lvl="2"/>
+            <a:r>
+              <a:rPr lang="en-AU" dirty="0" smtClean="0">
+                <a:latin typeface="Lucida Sans" panose="020B0602030504020204" pitchFamily="34" charset="0"/>
+                <a:cs typeface="Arial" panose="020B0604020202020204" pitchFamily="34" charset="0"/>
+              </a:rPr>
+              <a:t>% vagrant up</a:t>
+            </a:r>
+          </a:p>
+          <a:p>
+            <a:pPr lvl="2"/>
+            <a:endParaRPr lang="en-AU" dirty="0" smtClean="0">
+              <a:latin typeface="Lucida Sans" panose="020B0602030504020204" pitchFamily="34" charset="0"/>
+              <a:cs typeface="Arial" panose="020B0604020202020204" pitchFamily="34" charset="0"/>
+            </a:endParaRPr>
+          </a:p>
           <a:p>
             <a:r>
               <a:rPr lang="en-AU" sz="2000" dirty="0" smtClean="0">
@@ -8921,7 +9326,7 @@
                 <a:latin typeface="Arial" panose="020B0604020202020204" pitchFamily="34" charset="0"/>
                 <a:cs typeface="Arial" panose="020B0604020202020204" pitchFamily="34" charset="0"/>
               </a:rPr>
-              <a:t>will take some time (UP to 60 MINUTES!)</a:t>
+              <a:t>will take some time</a:t>
             </a:r>
             <a:r>
               <a:rPr lang="en-AU" sz="2000" dirty="0" smtClean="0">
@@ -8943,89 +9348,12 @@
               <a:t>.  It is dependent on your internet connection and laptop.</a:t>
             </a:r>
           </a:p>
-          <a:p>
-            <a:endParaRPr lang="en-AU" sz="2000" dirty="0" smtClean="0">
-              <a:solidFill>
-                <a:srgbClr val="FF0000"/>
-              </a:solidFill>
-              <a:latin typeface="Lucida Sans" panose="020B0602030504020204" pitchFamily="34" charset="0"/>
-            </a:endParaRPr>
-          </a:p>
-          <a:p>
-            <a:r>
-              <a:rPr lang="en-AU" sz="2000" dirty="0" smtClean="0">
-                <a:latin typeface="Lucida Sans" panose="020B0602030504020204" pitchFamily="34" charset="0"/>
-              </a:rPr>
-              <a:t>When Vagrant up command finishes you should see the follow message!</a:t>
-            </a:r>
-          </a:p>
-          <a:p>
-            <a:r>
-              <a:rPr lang="en-AU" sz="2000" dirty="0" smtClean="0">
-                <a:latin typeface="Lucida Sans" panose="020B0602030504020204" pitchFamily="34" charset="0"/>
-              </a:rPr>
-              <a:t>You are now ready to login to your VM and start your </a:t>
-            </a:r>
-            <a:r>
-              <a:rPr lang="en-AU" sz="2000" dirty="0" err="1" smtClean="0">
-                <a:latin typeface="Lucida Sans" panose="020B0602030504020204" pitchFamily="34" charset="0"/>
-              </a:rPr>
-              <a:t>jupyter</a:t>
-            </a:r>
-            <a:r>
-              <a:rPr lang="en-AU" sz="2000" dirty="0" smtClean="0">
-                <a:latin typeface="Lucida Sans" panose="020B0602030504020204" pitchFamily="34" charset="0"/>
-              </a:rPr>
-              <a:t> notebook!</a:t>
-            </a:r>
-            <a:endParaRPr lang="en-AU" sz="2000" dirty="0">
-              <a:latin typeface="Lucida Sans" panose="020B0602030504020204" pitchFamily="34" charset="0"/>
-            </a:endParaRPr>
-          </a:p>
-          <a:p>
-            <a:endParaRPr lang="en-AU" sz="2000" dirty="0" smtClean="0">
-              <a:solidFill>
-                <a:srgbClr val="FF0000"/>
-              </a:solidFill>
-              <a:latin typeface="Lucida Sans" panose="020B0602030504020204" pitchFamily="34" charset="0"/>
-            </a:endParaRPr>
-          </a:p>
-        </p:txBody>
-      </p:sp>
-      <p:pic>
-        <p:nvPicPr>
-          <p:cNvPr id="4" name="Picture 3"/>
-          <p:cNvPicPr>
-            <a:picLocks noChangeAspect="1"/>
-          </p:cNvPicPr>
-          <p:nvPr/>
-        </p:nvPicPr>
-        <p:blipFill>
-          <a:blip r:embed="rId2">
-            <a:extLst>
-              <a:ext uri="{28A0092B-C50C-407E-A947-70E740481C1C}">
-                <a14:useLocalDpi xmlns:a14="http://schemas.microsoft.com/office/drawing/2010/main" val="0"/>
-              </a:ext>
-            </a:extLst>
-          </a:blip>
-          <a:stretch>
-            <a:fillRect/>
-          </a:stretch>
-        </p:blipFill>
-        <p:spPr>
-          <a:xfrm>
-            <a:off x="2256817" y="4281544"/>
-            <a:ext cx="7390504" cy="1549373"/>
-          </a:xfrm>
-          <a:prstGeom prst="rect">
-            <a:avLst/>
-          </a:prstGeom>
-        </p:spPr>
-      </p:pic>
+        </p:txBody>
+      </p:sp>
     </p:spTree>
     <p:extLst>
       <p:ext uri="{BB962C8B-B14F-4D97-AF65-F5344CB8AC3E}">
-        <p14:creationId xmlns:p14="http://schemas.microsoft.com/office/powerpoint/2010/main" val="2595889104"/>
+        <p14:creationId xmlns:p14="http://schemas.microsoft.com/office/powerpoint/2010/main" val="1038201013"/>
       </p:ext>
     </p:extLst>
   </p:cSld>
@@ -9069,16 +9397,19 @@
             <p:ph type="title"/>
           </p:nvPr>
         </p:nvSpPr>
-        <p:spPr/>
-        <p:txBody>
-          <a:bodyPr>
-            <a:normAutofit/>
-          </a:bodyPr>
+        <p:spPr>
+          <a:xfrm>
+            <a:off x="777062" y="375493"/>
+            <a:ext cx="10364451" cy="1206165"/>
+          </a:xfrm>
+        </p:spPr>
+        <p:txBody>
+          <a:bodyPr/>
           <a:lstStyle/>
           <a:p>
             <a:r>
               <a:rPr lang="en-AU" dirty="0" smtClean="0"/>
-              <a:t>Accessing your VM</a:t>
+              <a:t>VM success</a:t>
             </a:r>
             <a:endParaRPr lang="en-AU" dirty="0"/>
           </a:p>
@@ -9086,14 +9417,14 @@
       </p:sp>
       <p:sp>
         <p:nvSpPr>
-          <p:cNvPr id="5" name="TextBox 4"/>
+          <p:cNvPr id="3" name="TextBox 2"/>
           <p:cNvSpPr txBox="1"/>
           <p:nvPr/>
         </p:nvSpPr>
         <p:spPr>
           <a:xfrm>
-            <a:off x="1337805" y="1709350"/>
-            <a:ext cx="9516388" cy="923330"/>
+            <a:off x="762625" y="1581658"/>
+            <a:ext cx="10378888" cy="2554545"/>
           </a:xfrm>
           <a:prstGeom prst="rect">
             <a:avLst/>
@@ -9101,68 +9432,115 @@
           <a:noFill/>
         </p:spPr>
         <p:txBody>
-          <a:bodyPr wrap="none" rtlCol="0">
+          <a:bodyPr wrap="square" rtlCol="0">
             <a:spAutoFit/>
           </a:bodyPr>
           <a:lstStyle/>
           <a:p>
             <a:r>
-              <a:rPr lang="en-AU" dirty="0" smtClean="0">
+              <a:rPr lang="en-AU" sz="2000" dirty="0" smtClean="0">
+                <a:solidFill>
+                  <a:srgbClr val="FF0000"/>
+                </a:solidFill>
                 <a:latin typeface="Arial" panose="020B0604020202020204" pitchFamily="34" charset="0"/>
                 <a:cs typeface="Arial" panose="020B0604020202020204" pitchFamily="34" charset="0"/>
               </a:rPr>
-              <a:t>Step 4: Secure Shell (SSH) is used to login to your VM.  This process of accessing you VM </a:t>
-            </a:r>
-          </a:p>
-          <a:p>
-            <a:r>
-              <a:rPr lang="en-AU" dirty="0" smtClean="0">
+              <a:t>Coffee/Tea Break:</a:t>
+            </a:r>
+          </a:p>
+          <a:p>
+            <a:r>
+              <a:rPr lang="en-AU" sz="2000" dirty="0" smtClean="0">
+                <a:solidFill>
+                  <a:srgbClr val="FF0000"/>
+                </a:solidFill>
                 <a:latin typeface="Arial" panose="020B0604020202020204" pitchFamily="34" charset="0"/>
                 <a:cs typeface="Arial" panose="020B0604020202020204" pitchFamily="34" charset="0"/>
               </a:rPr>
-              <a:t>has been greatly simplified with Vagrant.  The command is:</a:t>
-            </a:r>
-            <a:endParaRPr lang="en-AU" dirty="0">
-              <a:latin typeface="Arial" panose="020B0604020202020204" pitchFamily="34" charset="0"/>
-              <a:cs typeface="Arial" panose="020B0604020202020204" pitchFamily="34" charset="0"/>
+              <a:t>This </a:t>
+            </a:r>
+            <a:r>
+              <a:rPr lang="en-AU" sz="2000" b="1" dirty="0" smtClean="0">
+                <a:solidFill>
+                  <a:srgbClr val="FF0000"/>
+                </a:solidFill>
+                <a:latin typeface="Arial" panose="020B0604020202020204" pitchFamily="34" charset="0"/>
+                <a:cs typeface="Arial" panose="020B0604020202020204" pitchFamily="34" charset="0"/>
+              </a:rPr>
+              <a:t>will take some time (UP to 60 MINUTES!)</a:t>
+            </a:r>
+            <a:r>
+              <a:rPr lang="en-AU" sz="2000" dirty="0" smtClean="0">
+                <a:solidFill>
+                  <a:srgbClr val="FF0000"/>
+                </a:solidFill>
+                <a:latin typeface="Arial" panose="020B0604020202020204" pitchFamily="34" charset="0"/>
+                <a:cs typeface="Arial" panose="020B0604020202020204" pitchFamily="34" charset="0"/>
+              </a:rPr>
+              <a:t> as it automatically downloading and configuring the base Ubuntu OS image that is used for your VM</a:t>
+            </a:r>
+            <a:r>
+              <a:rPr lang="en-AU" sz="2000" dirty="0" smtClean="0">
+                <a:solidFill>
+                  <a:srgbClr val="FF0000"/>
+                </a:solidFill>
+                <a:latin typeface="Lucida Sans" panose="020B0602030504020204" pitchFamily="34" charset="0"/>
+              </a:rPr>
+              <a:t>.  It is dependent on your internet connection and laptop.</a:t>
+            </a:r>
+          </a:p>
+          <a:p>
+            <a:endParaRPr lang="en-AU" sz="2000" dirty="0" smtClean="0">
+              <a:solidFill>
+                <a:srgbClr val="FF0000"/>
+              </a:solidFill>
+              <a:latin typeface="Lucida Sans" panose="020B0602030504020204" pitchFamily="34" charset="0"/>
             </a:endParaRPr>
           </a:p>
           <a:p>
-            <a:pPr lvl="1"/>
-            <a:r>
-              <a:rPr lang="en-AU" dirty="0">
+            <a:r>
+              <a:rPr lang="en-AU" sz="2000" dirty="0" smtClean="0">
                 <a:latin typeface="Lucida Sans" panose="020B0602030504020204" pitchFamily="34" charset="0"/>
-                <a:cs typeface="Arial" panose="020B0604020202020204" pitchFamily="34" charset="0"/>
-              </a:rPr>
-              <a:t>&gt;</a:t>
-            </a:r>
-            <a:r>
-              <a:rPr lang="en-AU" dirty="0" smtClean="0">
+              </a:rPr>
+              <a:t>When Vagrant up command finishes you should see the follow message!</a:t>
+            </a:r>
+          </a:p>
+          <a:p>
+            <a:r>
+              <a:rPr lang="en-AU" sz="2000" dirty="0" smtClean="0">
                 <a:latin typeface="Lucida Sans" panose="020B0602030504020204" pitchFamily="34" charset="0"/>
-                <a:cs typeface="Arial" panose="020B0604020202020204" pitchFamily="34" charset="0"/>
-              </a:rPr>
-              <a:t> vagrant </a:t>
-            </a:r>
-            <a:r>
-              <a:rPr lang="en-AU" dirty="0" err="1" smtClean="0">
+              </a:rPr>
+              <a:t>You are now ready to login to your VM and start your </a:t>
+            </a:r>
+            <a:r>
+              <a:rPr lang="en-AU" sz="2000" dirty="0" err="1" smtClean="0">
                 <a:latin typeface="Lucida Sans" panose="020B0602030504020204" pitchFamily="34" charset="0"/>
-                <a:cs typeface="Arial" panose="020B0604020202020204" pitchFamily="34" charset="0"/>
-              </a:rPr>
-              <a:t>ssh</a:t>
-            </a:r>
-            <a:r>
-              <a:rPr lang="en-AU" dirty="0" smtClean="0">
+              </a:rPr>
+              <a:t>jupyter</a:t>
+            </a:r>
+            <a:r>
+              <a:rPr lang="en-AU" sz="2000" dirty="0" smtClean="0">
                 <a:latin typeface="Lucida Sans" panose="020B0602030504020204" pitchFamily="34" charset="0"/>
-                <a:cs typeface="Arial" panose="020B0604020202020204" pitchFamily="34" charset="0"/>
-              </a:rPr>
-              <a:t> </a:t>
-            </a:r>
+              </a:rPr>
+              <a:t> notebook!</a:t>
+            </a:r>
+            <a:endParaRPr lang="en-AU" sz="2000" dirty="0">
+              <a:latin typeface="Lucida Sans" panose="020B0602030504020204" pitchFamily="34" charset="0"/>
+            </a:endParaRPr>
+          </a:p>
+          <a:p>
+            <a:endParaRPr lang="en-AU" sz="2000" dirty="0" smtClean="0">
+              <a:solidFill>
+                <a:srgbClr val="FF0000"/>
+              </a:solidFill>
+              <a:latin typeface="Lucida Sans" panose="020B0602030504020204" pitchFamily="34" charset="0"/>
+            </a:endParaRPr>
           </a:p>
         </p:txBody>
       </p:sp>
       <p:pic>
         <p:nvPicPr>
-          <p:cNvPr id="3" name="Picture 2"/>
+          <p:cNvPr id="4" name="Picture 3"/>
           <p:cNvPicPr>
             <a:picLocks noChangeAspect="1"/>
           </p:cNvPicPr>
@@ -9182,8 +9560,8 @@
         </p:blipFill>
         <p:spPr>
           <a:xfrm>
-            <a:off x="1601967" y="2632680"/>
-            <a:ext cx="8988064" cy="3133638"/>
+            <a:off x="2256817" y="4281544"/>
+            <a:ext cx="7390504" cy="1549373"/>
           </a:xfrm>
           <a:prstGeom prst="rect">
             <a:avLst/>
@@ -9193,7 +9571,7 @@
     </p:spTree>
     <p:extLst>
       <p:ext uri="{BB962C8B-B14F-4D97-AF65-F5344CB8AC3E}">
-        <p14:creationId xmlns:p14="http://schemas.microsoft.com/office/powerpoint/2010/main" val="14571371"/>
+        <p14:creationId xmlns:p14="http://schemas.microsoft.com/office/powerpoint/2010/main" val="2595889104"/>
       </p:ext>
     </p:extLst>
   </p:cSld>
@@ -9475,18 +9853,18 @@
 </file>
 
 <file path=customXml/item1.xml><?xml version="1.0" encoding="utf-8"?>
+<p:properties xmlns:p="http://schemas.microsoft.com/office/2006/metadata/properties" xmlns:xsi="http://www.w3.org/2001/XMLSchema-instance" xmlns:pc="http://schemas.microsoft.com/office/infopath/2007/PartnerControls">
+  <documentManagement/>
+</p:properties>
+</file>
+
+<file path=customXml/item2.xml><?xml version="1.0" encoding="utf-8"?>
 <?mso-contentType ?>
 <FormTemplates xmlns="http://schemas.microsoft.com/sharepoint/v3/contenttype/forms">
   <Display>DocumentLibraryForm</Display>
   <Edit>DocumentLibraryForm</Edit>
   <New>DocumentLibraryForm</New>
 </FormTemplates>
-</file>
-
-<file path=customXml/item2.xml><?xml version="1.0" encoding="utf-8"?>
-<p:properties xmlns:p="http://schemas.microsoft.com/office/2006/metadata/properties" xmlns:xsi="http://www.w3.org/2001/XMLSchema-instance" xmlns:pc="http://schemas.microsoft.com/office/infopath/2007/PartnerControls">
-  <documentManagement/>
-</p:properties>
 </file>
 
 <file path=customXml/item3.xml><?xml version="1.0" encoding="utf-8"?>
@@ -9675,26 +10053,26 @@
 </file>
 
 <file path=customXml/itemProps1.xml><?xml version="1.0" encoding="utf-8"?>
-<ds:datastoreItem xmlns:ds="http://schemas.openxmlformats.org/officeDocument/2006/customXml" ds:itemID="{10127F0B-EA07-4AFF-8549-55D4D4284DC4}">
+<ds:datastoreItem xmlns:ds="http://schemas.openxmlformats.org/officeDocument/2006/customXml" ds:itemID="{DC2CE541-9384-4F78-A2DC-081CEDD5EAE8}">
   <ds:schemaRefs>
-    <ds:schemaRef ds:uri="http://schemas.microsoft.com/sharepoint/v3/contenttype/forms"/>
+    <ds:schemaRef ds:uri="http://purl.org/dc/elements/1.1/"/>
+    <ds:schemaRef ds:uri="http://schemas.microsoft.com/office/2006/metadata/properties"/>
+    <ds:schemaRef ds:uri="c0477a94-a81b-4865-9707-6c9300ae147f"/>
+    <ds:schemaRef ds:uri="http://schemas.microsoft.com/office/2006/documentManagement/types"/>
+    <ds:schemaRef ds:uri="http://purl.org/dc/terms/"/>
+    <ds:schemaRef ds:uri="http://schemas.openxmlformats.org/package/2006/metadata/core-properties"/>
+    <ds:schemaRef ds:uri="http://purl.org/dc/dcmitype/"/>
+    <ds:schemaRef ds:uri="45fda36c-df07-4f55-9922-29409b58d9d3"/>
+    <ds:schemaRef ds:uri="http://schemas.microsoft.com/office/infopath/2007/PartnerControls"/>
+    <ds:schemaRef ds:uri="http://www.w3.org/XML/1998/namespace"/>
   </ds:schemaRefs>
 </ds:datastoreItem>
 </file>
 
 <file path=customXml/itemProps2.xml><?xml version="1.0" encoding="utf-8"?>
-<ds:datastoreItem xmlns:ds="http://schemas.openxmlformats.org/officeDocument/2006/customXml" ds:itemID="{DC2CE541-9384-4F78-A2DC-081CEDD5EAE8}">
+<ds:datastoreItem xmlns:ds="http://schemas.openxmlformats.org/officeDocument/2006/customXml" ds:itemID="{10127F0B-EA07-4AFF-8549-55D4D4284DC4}">
   <ds:schemaRefs>
-    <ds:schemaRef ds:uri="http://purl.org/dc/elements/1.1/"/>
-    <ds:schemaRef ds:uri="45fda36c-df07-4f55-9922-29409b58d9d3"/>
-    <ds:schemaRef ds:uri="c0477a94-a81b-4865-9707-6c9300ae147f"/>
-    <ds:schemaRef ds:uri="http://schemas.microsoft.com/office/2006/metadata/properties"/>
-    <ds:schemaRef ds:uri="http://purl.org/dc/terms/"/>
-    <ds:schemaRef ds:uri="http://schemas.openxmlformats.org/package/2006/metadata/core-properties"/>
-    <ds:schemaRef ds:uri="http://schemas.microsoft.com/office/2006/documentManagement/types"/>
-    <ds:schemaRef ds:uri="http://schemas.microsoft.com/office/infopath/2007/PartnerControls"/>
-    <ds:schemaRef ds:uri="http://www.w3.org/XML/1998/namespace"/>
-    <ds:schemaRef ds:uri="http://purl.org/dc/dcmitype/"/>
+    <ds:schemaRef ds:uri="http://schemas.microsoft.com/sharepoint/v3/contenttype/forms"/>
   </ds:schemaRefs>
 </ds:datastoreItem>
 </file>

</xml_diff>